<commit_message>
Updates the slide module number and removed extra master slides
</commit_message>
<xml_diff>
--- a/02-approaches_to_extending_resources.pptx
+++ b/02-approaches_to_extending_resources.pptx
@@ -9684,7 +9684,7 @@
               <a:pPr>
                 <a:defRPr/>
               </a:pPr>
-              <a:t>2016-10-03</a:t>
+              <a:t>2016-10-05</a:t>
             </a:fld>
             <a:endParaRPr lang="en-US" dirty="0"/>
           </a:p>
@@ -9867,7 +9867,7 @@
               <a:pPr>
                 <a:defRPr/>
               </a:pPr>
-              <a:t>2016-10-03</a:t>
+              <a:t>2016-10-05</a:t>
             </a:fld>
             <a:endParaRPr lang="en-US" dirty="0"/>
           </a:p>
@@ -10489,7 +10489,6 @@
               <a:rPr lang="en-US" baseline="0" dirty="0" smtClean="0"/>
               <a:t>Definitions behaves like a compile time macro that is reusable across recipes. Macros all you to write a small amount of code that expands out into the contents of the definition wherever it is found within the recipes. With a definition you give it a name, provide parameters, and specify a block of code.</a:t>
             </a:r>
-            <a:endParaRPr lang="en-US" baseline="0" dirty="0" smtClean="0"/>
           </a:p>
         </p:txBody>
       </p:sp>
@@ -10652,7 +10651,6 @@
               <a:rPr lang="en-US" baseline="0" dirty="0" smtClean="0"/>
               <a:t>.</a:t>
             </a:r>
-            <a:endParaRPr lang="en-US" baseline="0" dirty="0" smtClean="0"/>
           </a:p>
         </p:txBody>
       </p:sp>
@@ -10823,7 +10821,6 @@
               <a:rPr lang="en-US" baseline="0" dirty="0" smtClean="0"/>
               <a:t>`).</a:t>
             </a:r>
-            <a:endParaRPr lang="en-US" baseline="0" dirty="0" smtClean="0"/>
           </a:p>
         </p:txBody>
       </p:sp>
@@ -10978,7 +10975,6 @@
               <a:rPr lang="en-US" baseline="0" dirty="0" smtClean="0"/>
               <a:t>Definitions shipped in the earlier versions of Chef and are still supported today. However, as of Chef 12.5 it is strongly recommended that you choose a solution built with custom resources.</a:t>
             </a:r>
-            <a:endParaRPr lang="en-US" baseline="0" dirty="0" smtClean="0"/>
           </a:p>
         </p:txBody>
       </p:sp>
@@ -11373,7 +11369,6 @@
               <a:rPr lang="en-US" baseline="0" dirty="0" smtClean="0"/>
               <a:t>Within the file in the 'providers' directory you define the implementation for the custom resource. There, within a provider DSL, you specify what happens when an action is chosen.</a:t>
             </a:r>
-            <a:endParaRPr lang="en-US" baseline="0" dirty="0" smtClean="0"/>
           </a:p>
         </p:txBody>
       </p:sp>
@@ -11679,7 +11674,6 @@
               <a:rPr lang="en-US" baseline="0" dirty="0" smtClean="0"/>
               <a:t>Implementing resources with LWRP is not the favored way to develop a resource in later versions of Chef (Chef 12.5). However, they are still in wide use within older cookbooks like those found within the Chef Supermarket.</a:t>
             </a:r>
-            <a:endParaRPr lang="en-US" baseline="0" dirty="0" smtClean="0"/>
           </a:p>
         </p:txBody>
       </p:sp>
@@ -11877,7 +11871,6 @@
               <a:rPr lang="en-US" baseline="0" dirty="0" smtClean="0"/>
               <a:t>An custom resource is as much a resource as the core resources defined in Chef. A custom resource definition is defined in a single file that resides in the 'resources' directory. This file is parsed after the cookbook is synchronized and loaded. The custom resource DSL is then converted into Ruby class at runtime.</a:t>
             </a:r>
-            <a:endParaRPr lang="en-US" baseline="0" dirty="0" smtClean="0"/>
           </a:p>
         </p:txBody>
       </p:sp>
@@ -12032,7 +12025,6 @@
               <a:rPr lang="en-US" baseline="0" dirty="0" smtClean="0"/>
               <a:t>Within the file in the 'resources' directory you define the interface and the implementation for the custom resource. This is written in a custom resource DSL where you can specify the name of the resource, the default action, the properties that may be set, and all the actions that the resource supports.</a:t>
             </a:r>
-            <a:endParaRPr lang="en-US" baseline="0" dirty="0" smtClean="0"/>
           </a:p>
         </p:txBody>
       </p:sp>
@@ -13652,7 +13644,6 @@
               <a:rPr lang="en-US" baseline="0" dirty="0" smtClean="0"/>
               <a:t>When defining the resource for a Heavy-Weight Resource-Provider you sub-class the Chef Resource class. The initialize method is overridden to specify new default values and allows us to configure the class as necessary when the resource is created in memory. Each potential attribute is defined as method which uses a helper to setup the default values, value types it supports, etc.</a:t>
             </a:r>
-            <a:endParaRPr lang="en-US" baseline="0" dirty="0" smtClean="0"/>
           </a:p>
         </p:txBody>
       </p:sp>
@@ -13858,7 +13849,6 @@
               <a:rPr lang="en-US" baseline="0" dirty="0" smtClean="0"/>
               <a:t>Chef provides additional helpers to allow you to shell out to perform operations on the system. You also have the entire Ruby language and any gems that might be packaged with the Chef DK (or you have added to Chef DK) at your disposal.</a:t>
             </a:r>
-            <a:endParaRPr lang="en-US" baseline="0" dirty="0" smtClean="0"/>
           </a:p>
         </p:txBody>
       </p:sp>
@@ -14667,14 +14657,14 @@
           </a:ln>
           <a:extLst>
             <a:ext uri="{909E8E84-426E-40dd-AFC4-6F175D3DCCD1}">
-              <a14:hiddenFill xmlns="" xmlns:a14="http://schemas.microsoft.com/office/drawing/2010/main">
+              <a14:hiddenFill xmlns:a14="http://schemas.microsoft.com/office/drawing/2010/main" xmlns="">
                 <a:solidFill>
                   <a:srgbClr val="FFFFFF"/>
                 </a:solidFill>
               </a14:hiddenFill>
             </a:ext>
             <a:ext uri="{91240B29-F687-4f45-9708-019B960494DF}">
-              <a14:hiddenLine xmlns="" xmlns:a14="http://schemas.microsoft.com/office/drawing/2010/main" w="9525">
+              <a14:hiddenLine xmlns:a14="http://schemas.microsoft.com/office/drawing/2010/main" xmlns="" w="9525">
                 <a:solidFill>
                   <a:srgbClr val="000000"/>
                 </a:solidFill>
@@ -14822,14 +14812,14 @@
           </a:ln>
           <a:extLst>
             <a:ext uri="{909E8E84-426E-40dd-AFC4-6F175D3DCCD1}">
-              <a14:hiddenFill xmlns="" xmlns:a14="http://schemas.microsoft.com/office/drawing/2010/main">
+              <a14:hiddenFill xmlns:a14="http://schemas.microsoft.com/office/drawing/2010/main" xmlns="">
                 <a:solidFill>
                   <a:srgbClr val="FFFFFF"/>
                 </a:solidFill>
               </a14:hiddenFill>
             </a:ext>
             <a:ext uri="{91240B29-F687-4f45-9708-019B960494DF}">
-              <a14:hiddenLine xmlns="" xmlns:a14="http://schemas.microsoft.com/office/drawing/2010/main" w="9525">
+              <a14:hiddenLine xmlns:a14="http://schemas.microsoft.com/office/drawing/2010/main" xmlns="" w="9525">
                 <a:solidFill>
                   <a:srgbClr val="000000"/>
                 </a:solidFill>
@@ -15320,14 +15310,14 @@
           </a:ln>
           <a:extLst>
             <a:ext uri="{909E8E84-426E-40dd-AFC4-6F175D3DCCD1}">
-              <a14:hiddenFill xmlns="" xmlns:a14="http://schemas.microsoft.com/office/drawing/2010/main">
+              <a14:hiddenFill xmlns:a14="http://schemas.microsoft.com/office/drawing/2010/main" xmlns="">
                 <a:solidFill>
                   <a:srgbClr val="FFFFFF"/>
                 </a:solidFill>
               </a14:hiddenFill>
             </a:ext>
             <a:ext uri="{91240B29-F687-4f45-9708-019B960494DF}">
-              <a14:hiddenLine xmlns="" xmlns:a14="http://schemas.microsoft.com/office/drawing/2010/main" w="9525">
+              <a14:hiddenLine xmlns:a14="http://schemas.microsoft.com/office/drawing/2010/main" xmlns="" w="9525">
                 <a:solidFill>
                   <a:srgbClr val="000000"/>
                 </a:solidFill>
@@ -15356,8 +15346,8 @@
 </file>
 
 <file path=ppt/slideLayouts/slideLayout13.xml><?xml version="1.0" encoding="utf-8"?>
-<p:sldLayout xmlns:a="http://schemas.openxmlformats.org/drawingml/2006/main" xmlns:r="http://schemas.openxmlformats.org/officeDocument/2006/relationships" xmlns:p="http://schemas.openxmlformats.org/presentationml/2006/main" userDrawn="1">
-  <p:cSld name="Concept">
+<p:sldLayout xmlns:a="http://schemas.openxmlformats.org/drawingml/2006/main" xmlns:r="http://schemas.openxmlformats.org/officeDocument/2006/relationships" xmlns:p="http://schemas.openxmlformats.org/presentationml/2006/main" preserve="1" userDrawn="1">
+  <p:cSld name="Motivation">
     <p:spTree>
       <p:nvGrpSpPr>
         <p:cNvPr id="1" name=""/>
@@ -15380,8 +15370,8 @@
         </p:nvSpPr>
         <p:spPr bwMode="white">
           <a:xfrm>
-            <a:off x="136961" y="144390"/>
-            <a:ext cx="11554287" cy="2378219"/>
+            <a:off x="136960" y="128323"/>
+            <a:ext cx="13979932" cy="2378219"/>
           </a:xfrm>
           <a:prstGeom prst="rect">
             <a:avLst/>
@@ -15423,14 +15413,14 @@
                 <a:ea typeface="+mn-ea"/>
                 <a:cs typeface="+mn-cs"/>
               </a:rPr>
-              <a:t>CONCEPT</a:t>
+              <a:t>MOTIVATION</a:t>
             </a:r>
           </a:p>
         </p:txBody>
       </p:sp>
       <p:pic>
         <p:nvPicPr>
-          <p:cNvPr id="2" name="Picture 1" descr="concept.gif"/>
+          <p:cNvPr id="2" name="Picture 1" descr="gift.gif"/>
           <p:cNvPicPr>
             <a:picLocks noChangeAspect="1"/>
           </p:cNvPicPr>
@@ -15450,8 +15440,295 @@
         </p:blipFill>
         <p:spPr>
           <a:xfrm>
-            <a:off x="13119426" y="324724"/>
-            <a:ext cx="2717146" cy="2189001"/>
+            <a:off x="13257264" y="215274"/>
+            <a:ext cx="2441471" cy="2407901"/>
+          </a:xfrm>
+          <a:prstGeom prst="rect">
+            <a:avLst/>
+          </a:prstGeom>
+        </p:spPr>
+      </p:pic>
+      <p:sp>
+        <p:nvSpPr>
+          <p:cNvPr id="6" name="Title 1"/>
+          <p:cNvSpPr>
+            <a:spLocks noGrp="1"/>
+          </p:cNvSpPr>
+          <p:nvPr>
+            <p:ph type="ctrTitle" hasCustomPrompt="1"/>
+          </p:nvPr>
+        </p:nvSpPr>
+        <p:spPr bwMode="white">
+          <a:xfrm>
+            <a:off x="1680252" y="2304144"/>
+            <a:ext cx="12310386" cy="852712"/>
+          </a:xfrm>
+        </p:spPr>
+        <p:txBody>
+          <a:bodyPr lIns="91440" tIns="91440" rIns="91440" bIns="91440" anchor="ctr"/>
+          <a:lstStyle>
+            <a:lvl1pPr>
+              <a:lnSpc>
+                <a:spcPct val="90000"/>
+              </a:lnSpc>
+              <a:defRPr sz="6400" b="1" spc="0" baseline="0">
+                <a:solidFill>
+                  <a:schemeClr val="accent1"/>
+                </a:solidFill>
+              </a:defRPr>
+            </a:lvl1pPr>
+          </a:lstStyle>
+          <a:p>
+            <a:r>
+              <a:rPr lang="en-US" dirty="0" smtClean="0"/>
+              <a:t>Motivation</a:t>
+            </a:r>
+            <a:endParaRPr lang="en-US" dirty="0"/>
+          </a:p>
+        </p:txBody>
+      </p:sp>
+      <p:sp>
+        <p:nvSpPr>
+          <p:cNvPr id="14" name="Subtitle 2"/>
+          <p:cNvSpPr>
+            <a:spLocks noGrp="1"/>
+          </p:cNvSpPr>
+          <p:nvPr>
+            <p:ph type="subTitle" idx="1"/>
+          </p:nvPr>
+        </p:nvSpPr>
+        <p:spPr bwMode="white">
+          <a:xfrm>
+            <a:off x="1672167" y="3283868"/>
+            <a:ext cx="12315718" cy="4770049"/>
+          </a:xfrm>
+          <a:prstGeom prst="rect">
+            <a:avLst/>
+          </a:prstGeom>
+        </p:spPr>
+        <p:txBody>
+          <a:bodyPr lIns="91440" tIns="91440" rIns="91440" bIns="91440">
+            <a:noAutofit/>
+          </a:bodyPr>
+          <a:lstStyle>
+            <a:lvl1pPr marL="0" indent="0" algn="l">
+              <a:lnSpc>
+                <a:spcPct val="100000"/>
+              </a:lnSpc>
+              <a:spcBef>
+                <a:spcPts val="0"/>
+              </a:spcBef>
+              <a:buNone/>
+              <a:defRPr sz="2800" baseline="0">
+                <a:solidFill>
+                  <a:schemeClr val="accent3">
+                    <a:lumMod val="50000"/>
+                  </a:schemeClr>
+                </a:solidFill>
+              </a:defRPr>
+            </a:lvl1pPr>
+            <a:lvl2pPr marL="609561" indent="0" algn="ctr">
+              <a:buNone/>
+              <a:defRPr>
+                <a:solidFill>
+                  <a:schemeClr val="tx1">
+                    <a:tint val="75000"/>
+                  </a:schemeClr>
+                </a:solidFill>
+              </a:defRPr>
+            </a:lvl2pPr>
+            <a:lvl3pPr marL="1219120" indent="0" algn="ctr">
+              <a:buNone/>
+              <a:defRPr>
+                <a:solidFill>
+                  <a:schemeClr val="tx1">
+                    <a:tint val="75000"/>
+                  </a:schemeClr>
+                </a:solidFill>
+              </a:defRPr>
+            </a:lvl3pPr>
+            <a:lvl4pPr marL="1828681" indent="0" algn="ctr">
+              <a:buNone/>
+              <a:defRPr>
+                <a:solidFill>
+                  <a:schemeClr val="tx1">
+                    <a:tint val="75000"/>
+                  </a:schemeClr>
+                </a:solidFill>
+              </a:defRPr>
+            </a:lvl4pPr>
+            <a:lvl5pPr marL="2438242" indent="0" algn="ctr">
+              <a:buNone/>
+              <a:defRPr>
+                <a:solidFill>
+                  <a:schemeClr val="tx1">
+                    <a:tint val="75000"/>
+                  </a:schemeClr>
+                </a:solidFill>
+              </a:defRPr>
+            </a:lvl5pPr>
+            <a:lvl6pPr marL="3047802" indent="0" algn="ctr">
+              <a:buNone/>
+              <a:defRPr>
+                <a:solidFill>
+                  <a:schemeClr val="tx1">
+                    <a:tint val="75000"/>
+                  </a:schemeClr>
+                </a:solidFill>
+              </a:defRPr>
+            </a:lvl6pPr>
+            <a:lvl7pPr marL="3657362" indent="0" algn="ctr">
+              <a:buNone/>
+              <a:defRPr>
+                <a:solidFill>
+                  <a:schemeClr val="tx1">
+                    <a:tint val="75000"/>
+                  </a:schemeClr>
+                </a:solidFill>
+              </a:defRPr>
+            </a:lvl7pPr>
+            <a:lvl8pPr marL="4266923" indent="0" algn="ctr">
+              <a:buNone/>
+              <a:defRPr>
+                <a:solidFill>
+                  <a:schemeClr val="tx1">
+                    <a:tint val="75000"/>
+                  </a:schemeClr>
+                </a:solidFill>
+              </a:defRPr>
+            </a:lvl8pPr>
+            <a:lvl9pPr marL="4876483" indent="0" algn="ctr">
+              <a:buNone/>
+              <a:defRPr>
+                <a:solidFill>
+                  <a:schemeClr val="tx1">
+                    <a:tint val="75000"/>
+                  </a:schemeClr>
+                </a:solidFill>
+              </a:defRPr>
+            </a:lvl9pPr>
+          </a:lstStyle>
+          <a:p>
+            <a:r>
+              <a:rPr lang="en-US" dirty="0" smtClean="0"/>
+              <a:t>Click to edit Master subtitle style</a:t>
+            </a:r>
+          </a:p>
+        </p:txBody>
+      </p:sp>
+    </p:spTree>
+    <p:extLst>
+      <p:ext uri="{BB962C8B-B14F-4D97-AF65-F5344CB8AC3E}">
+        <p14:creationId xmlns:p14="http://schemas.microsoft.com/office/powerpoint/2010/main" val="2947928335"/>
+      </p:ext>
+    </p:extLst>
+  </p:cSld>
+  <p:clrMapOvr>
+    <a:masterClrMapping/>
+  </p:clrMapOvr>
+  <p:transition spd="med">
+    <p:fade/>
+  </p:transition>
+</p:sldLayout>
+</file>
+
+<file path=ppt/slideLayouts/slideLayout14.xml><?xml version="1.0" encoding="utf-8"?>
+<p:sldLayout xmlns:a="http://schemas.openxmlformats.org/drawingml/2006/main" xmlns:r="http://schemas.openxmlformats.org/officeDocument/2006/relationships" xmlns:p="http://schemas.openxmlformats.org/presentationml/2006/main" preserve="1" userDrawn="1">
+  <p:cSld name="Problem">
+    <p:spTree>
+      <p:nvGrpSpPr>
+        <p:cNvPr id="1" name=""/>
+        <p:cNvGrpSpPr/>
+        <p:nvPr/>
+      </p:nvGrpSpPr>
+      <p:grpSpPr>
+        <a:xfrm>
+          <a:off x="0" y="0"/>
+          <a:ext cx="0" cy="0"/>
+          <a:chOff x="0" y="0"/>
+          <a:chExt cx="0" cy="0"/>
+        </a:xfrm>
+      </p:grpSpPr>
+      <p:sp>
+        <p:nvSpPr>
+          <p:cNvPr id="5" name="TextBox 4"/>
+          <p:cNvSpPr txBox="1"/>
+          <p:nvPr/>
+        </p:nvSpPr>
+        <p:spPr bwMode="white">
+          <a:xfrm>
+            <a:off x="136960" y="149489"/>
+            <a:ext cx="11781799" cy="2378219"/>
+          </a:xfrm>
+          <a:prstGeom prst="rect">
+            <a:avLst/>
+          </a:prstGeom>
+          <a:noFill/>
+          <a:ln>
+            <a:noFill/>
+          </a:ln>
+          <a:effectLst/>
+        </p:spPr>
+        <p:txBody>
+          <a:bodyPr lIns="121920" tIns="121920" rIns="121920" bIns="121920" anchor="ctr"/>
+          <a:lstStyle/>
+          <a:p>
+            <a:pPr defTabSz="1219120" fontAlgn="auto">
+              <a:spcBef>
+                <a:spcPts val="0"/>
+              </a:spcBef>
+              <a:spcAft>
+                <a:spcPts val="0"/>
+              </a:spcAft>
+              <a:defRPr/>
+            </a:pPr>
+            <a:r>
+              <a:rPr lang="en-US" sz="16933" dirty="0">
+                <a:ln w="18415" cmpd="sng">
+                  <a:solidFill>
+                    <a:srgbClr val="FFFFFF"/>
+                  </a:solidFill>
+                  <a:prstDash val="solid"/>
+                </a:ln>
+                <a:solidFill>
+                  <a:schemeClr val="bg2">
+                    <a:lumMod val="95000"/>
+                    <a:alpha val="50000"/>
+                  </a:schemeClr>
+                </a:solidFill>
+                <a:latin typeface="+mn-lt"/>
+                <a:ea typeface="+mn-ea"/>
+                <a:cs typeface="+mn-cs"/>
+              </a:rPr>
+              <a:t>PROBLEM</a:t>
+            </a:r>
+          </a:p>
+        </p:txBody>
+      </p:sp>
+      <p:pic>
+        <p:nvPicPr>
+          <p:cNvPr id="2" name="Picture 1" descr="splat.gif"/>
+          <p:cNvPicPr>
+            <a:picLocks noChangeAspect="1"/>
+          </p:cNvPicPr>
+          <p:nvPr userDrawn="1"/>
+        </p:nvPicPr>
+        <p:blipFill>
+          <a:blip r:embed="rId2">
+            <a:extLst>
+              <a:ext uri="{28A0092B-C50C-407E-A947-70E740481C1C}">
+                <a14:useLocalDpi xmlns:a14="http://schemas.microsoft.com/office/drawing/2010/main" val="0"/>
+              </a:ext>
+            </a:extLst>
+          </a:blip>
+          <a:stretch>
+            <a:fillRect/>
+          </a:stretch>
+        </p:blipFill>
+        <p:spPr>
+          <a:xfrm>
+            <a:off x="13153654" y="94879"/>
+            <a:ext cx="2648691" cy="2648691"/>
           </a:xfrm>
           <a:prstGeom prst="rect">
             <a:avLst/>
@@ -15491,7 +15768,7 @@
           <a:p>
             <a:r>
               <a:rPr lang="en-US" dirty="0" smtClean="0"/>
-              <a:t>Concept</a:t>
+              <a:t>Problem</a:t>
             </a:r>
             <a:endParaRPr lang="en-US" dirty="0"/>
           </a:p>
@@ -15629,7 +15906,7 @@
     </p:spTree>
     <p:extLst>
       <p:ext uri="{BB962C8B-B14F-4D97-AF65-F5344CB8AC3E}">
-        <p14:creationId xmlns:p14="http://schemas.microsoft.com/office/powerpoint/2010/main" val="395215155"/>
+        <p14:creationId xmlns:p14="http://schemas.microsoft.com/office/powerpoint/2010/main" val="247207333"/>
       </p:ext>
     </p:extLst>
   </p:cSld>
@@ -15642,9 +15919,9 @@
 </p:sldLayout>
 </file>
 
-<file path=ppt/slideLayouts/slideLayout14.xml><?xml version="1.0" encoding="utf-8"?>
+<file path=ppt/slideLayouts/slideLayout15.xml><?xml version="1.0" encoding="utf-8"?>
 <p:sldLayout xmlns:a="http://schemas.openxmlformats.org/drawingml/2006/main" xmlns:r="http://schemas.openxmlformats.org/officeDocument/2006/relationships" xmlns:p="http://schemas.openxmlformats.org/presentationml/2006/main" preserve="1" userDrawn="1">
-  <p:cSld name="Motivation">
+  <p:cSld name="Docs">
     <p:spTree>
       <p:nvGrpSpPr>
         <p:cNvPr id="1" name=""/>
@@ -15661,14 +15938,14 @@
       </p:grpSpPr>
       <p:sp>
         <p:nvSpPr>
-          <p:cNvPr id="5" name="TextBox 4"/>
+          <p:cNvPr id="7" name="TextBox 6"/>
           <p:cNvSpPr txBox="1"/>
           <p:nvPr/>
         </p:nvSpPr>
         <p:spPr bwMode="white">
           <a:xfrm>
-            <a:off x="136960" y="128323"/>
-            <a:ext cx="13979932" cy="2378219"/>
+            <a:off x="136960" y="160072"/>
+            <a:ext cx="13917707" cy="2378219"/>
           </a:xfrm>
           <a:prstGeom prst="rect">
             <a:avLst/>
@@ -15693,7 +15970,7 @@
               <a:defRPr/>
             </a:pPr>
             <a:r>
-              <a:rPr lang="en-US" sz="16933" dirty="0">
+              <a:rPr lang="en-US" sz="16933" dirty="0" smtClean="0">
                 <a:ln w="18415" cmpd="sng">
                   <a:solidFill>
                     <a:srgbClr val="FFFFFF"/>
@@ -15710,14 +15987,31 @@
                 <a:ea typeface="+mn-ea"/>
                 <a:cs typeface="+mn-cs"/>
               </a:rPr>
-              <a:t>MOTIVATION</a:t>
+              <a:t>REFERENCE</a:t>
             </a:r>
+            <a:endParaRPr lang="en-US" sz="16933" dirty="0">
+              <a:ln w="18415" cmpd="sng">
+                <a:solidFill>
+                  <a:srgbClr val="FFFFFF"/>
+                </a:solidFill>
+                <a:prstDash val="solid"/>
+              </a:ln>
+              <a:solidFill>
+                <a:schemeClr val="bg2">
+                  <a:lumMod val="95000"/>
+                  <a:alpha val="50000"/>
+                </a:schemeClr>
+              </a:solidFill>
+              <a:latin typeface="+mn-lt"/>
+              <a:ea typeface="+mn-ea"/>
+              <a:cs typeface="+mn-cs"/>
+            </a:endParaRPr>
           </a:p>
         </p:txBody>
       </p:sp>
       <p:pic>
         <p:nvPicPr>
-          <p:cNvPr id="2" name="Picture 1" descr="gift.gif"/>
+          <p:cNvPr id="2" name="Picture 1" descr="reference.gif"/>
           <p:cNvPicPr>
             <a:picLocks noChangeAspect="1"/>
           </p:cNvPicPr>
@@ -15737,295 +16031,8 @@
         </p:blipFill>
         <p:spPr>
           <a:xfrm>
-            <a:off x="13257264" y="215274"/>
-            <a:ext cx="2441471" cy="2407901"/>
-          </a:xfrm>
-          <a:prstGeom prst="rect">
-            <a:avLst/>
-          </a:prstGeom>
-        </p:spPr>
-      </p:pic>
-      <p:sp>
-        <p:nvSpPr>
-          <p:cNvPr id="6" name="Title 1"/>
-          <p:cNvSpPr>
-            <a:spLocks noGrp="1"/>
-          </p:cNvSpPr>
-          <p:nvPr>
-            <p:ph type="ctrTitle" hasCustomPrompt="1"/>
-          </p:nvPr>
-        </p:nvSpPr>
-        <p:spPr bwMode="white">
-          <a:xfrm>
-            <a:off x="1680252" y="2304144"/>
-            <a:ext cx="12310386" cy="852712"/>
-          </a:xfrm>
-        </p:spPr>
-        <p:txBody>
-          <a:bodyPr lIns="91440" tIns="91440" rIns="91440" bIns="91440" anchor="ctr"/>
-          <a:lstStyle>
-            <a:lvl1pPr>
-              <a:lnSpc>
-                <a:spcPct val="90000"/>
-              </a:lnSpc>
-              <a:defRPr sz="6400" b="1" spc="0" baseline="0">
-                <a:solidFill>
-                  <a:schemeClr val="accent1"/>
-                </a:solidFill>
-              </a:defRPr>
-            </a:lvl1pPr>
-          </a:lstStyle>
-          <a:p>
-            <a:r>
-              <a:rPr lang="en-US" dirty="0" smtClean="0"/>
-              <a:t>Motivation</a:t>
-            </a:r>
-            <a:endParaRPr lang="en-US" dirty="0"/>
-          </a:p>
-        </p:txBody>
-      </p:sp>
-      <p:sp>
-        <p:nvSpPr>
-          <p:cNvPr id="14" name="Subtitle 2"/>
-          <p:cNvSpPr>
-            <a:spLocks noGrp="1"/>
-          </p:cNvSpPr>
-          <p:nvPr>
-            <p:ph type="subTitle" idx="1"/>
-          </p:nvPr>
-        </p:nvSpPr>
-        <p:spPr bwMode="white">
-          <a:xfrm>
-            <a:off x="1672167" y="3283868"/>
-            <a:ext cx="12315718" cy="4770049"/>
-          </a:xfrm>
-          <a:prstGeom prst="rect">
-            <a:avLst/>
-          </a:prstGeom>
-        </p:spPr>
-        <p:txBody>
-          <a:bodyPr lIns="91440" tIns="91440" rIns="91440" bIns="91440">
-            <a:noAutofit/>
-          </a:bodyPr>
-          <a:lstStyle>
-            <a:lvl1pPr marL="0" indent="0" algn="l">
-              <a:lnSpc>
-                <a:spcPct val="100000"/>
-              </a:lnSpc>
-              <a:spcBef>
-                <a:spcPts val="0"/>
-              </a:spcBef>
-              <a:buNone/>
-              <a:defRPr sz="2800" baseline="0">
-                <a:solidFill>
-                  <a:schemeClr val="accent3">
-                    <a:lumMod val="50000"/>
-                  </a:schemeClr>
-                </a:solidFill>
-              </a:defRPr>
-            </a:lvl1pPr>
-            <a:lvl2pPr marL="609561" indent="0" algn="ctr">
-              <a:buNone/>
-              <a:defRPr>
-                <a:solidFill>
-                  <a:schemeClr val="tx1">
-                    <a:tint val="75000"/>
-                  </a:schemeClr>
-                </a:solidFill>
-              </a:defRPr>
-            </a:lvl2pPr>
-            <a:lvl3pPr marL="1219120" indent="0" algn="ctr">
-              <a:buNone/>
-              <a:defRPr>
-                <a:solidFill>
-                  <a:schemeClr val="tx1">
-                    <a:tint val="75000"/>
-                  </a:schemeClr>
-                </a:solidFill>
-              </a:defRPr>
-            </a:lvl3pPr>
-            <a:lvl4pPr marL="1828681" indent="0" algn="ctr">
-              <a:buNone/>
-              <a:defRPr>
-                <a:solidFill>
-                  <a:schemeClr val="tx1">
-                    <a:tint val="75000"/>
-                  </a:schemeClr>
-                </a:solidFill>
-              </a:defRPr>
-            </a:lvl4pPr>
-            <a:lvl5pPr marL="2438242" indent="0" algn="ctr">
-              <a:buNone/>
-              <a:defRPr>
-                <a:solidFill>
-                  <a:schemeClr val="tx1">
-                    <a:tint val="75000"/>
-                  </a:schemeClr>
-                </a:solidFill>
-              </a:defRPr>
-            </a:lvl5pPr>
-            <a:lvl6pPr marL="3047802" indent="0" algn="ctr">
-              <a:buNone/>
-              <a:defRPr>
-                <a:solidFill>
-                  <a:schemeClr val="tx1">
-                    <a:tint val="75000"/>
-                  </a:schemeClr>
-                </a:solidFill>
-              </a:defRPr>
-            </a:lvl6pPr>
-            <a:lvl7pPr marL="3657362" indent="0" algn="ctr">
-              <a:buNone/>
-              <a:defRPr>
-                <a:solidFill>
-                  <a:schemeClr val="tx1">
-                    <a:tint val="75000"/>
-                  </a:schemeClr>
-                </a:solidFill>
-              </a:defRPr>
-            </a:lvl7pPr>
-            <a:lvl8pPr marL="4266923" indent="0" algn="ctr">
-              <a:buNone/>
-              <a:defRPr>
-                <a:solidFill>
-                  <a:schemeClr val="tx1">
-                    <a:tint val="75000"/>
-                  </a:schemeClr>
-                </a:solidFill>
-              </a:defRPr>
-            </a:lvl8pPr>
-            <a:lvl9pPr marL="4876483" indent="0" algn="ctr">
-              <a:buNone/>
-              <a:defRPr>
-                <a:solidFill>
-                  <a:schemeClr val="tx1">
-                    <a:tint val="75000"/>
-                  </a:schemeClr>
-                </a:solidFill>
-              </a:defRPr>
-            </a:lvl9pPr>
-          </a:lstStyle>
-          <a:p>
-            <a:r>
-              <a:rPr lang="en-US" dirty="0" smtClean="0"/>
-              <a:t>Click to edit Master subtitle style</a:t>
-            </a:r>
-          </a:p>
-        </p:txBody>
-      </p:sp>
-    </p:spTree>
-    <p:extLst>
-      <p:ext uri="{BB962C8B-B14F-4D97-AF65-F5344CB8AC3E}">
-        <p14:creationId xmlns:p14="http://schemas.microsoft.com/office/powerpoint/2010/main" val="2947928335"/>
-      </p:ext>
-    </p:extLst>
-  </p:cSld>
-  <p:clrMapOvr>
-    <a:masterClrMapping/>
-  </p:clrMapOvr>
-  <p:transition spd="med">
-    <p:fade/>
-  </p:transition>
-</p:sldLayout>
-</file>
-
-<file path=ppt/slideLayouts/slideLayout15.xml><?xml version="1.0" encoding="utf-8"?>
-<p:sldLayout xmlns:a="http://schemas.openxmlformats.org/drawingml/2006/main" xmlns:r="http://schemas.openxmlformats.org/officeDocument/2006/relationships" xmlns:p="http://schemas.openxmlformats.org/presentationml/2006/main" preserve="1" userDrawn="1">
-  <p:cSld name="Problem">
-    <p:spTree>
-      <p:nvGrpSpPr>
-        <p:cNvPr id="1" name=""/>
-        <p:cNvGrpSpPr/>
-        <p:nvPr/>
-      </p:nvGrpSpPr>
-      <p:grpSpPr>
-        <a:xfrm>
-          <a:off x="0" y="0"/>
-          <a:ext cx="0" cy="0"/>
-          <a:chOff x="0" y="0"/>
-          <a:chExt cx="0" cy="0"/>
-        </a:xfrm>
-      </p:grpSpPr>
-      <p:sp>
-        <p:nvSpPr>
-          <p:cNvPr id="5" name="TextBox 4"/>
-          <p:cNvSpPr txBox="1"/>
-          <p:nvPr/>
-        </p:nvSpPr>
-        <p:spPr bwMode="white">
-          <a:xfrm>
-            <a:off x="136960" y="149489"/>
-            <a:ext cx="11781799" cy="2378219"/>
-          </a:xfrm>
-          <a:prstGeom prst="rect">
-            <a:avLst/>
-          </a:prstGeom>
-          <a:noFill/>
-          <a:ln>
-            <a:noFill/>
-          </a:ln>
-          <a:effectLst/>
-        </p:spPr>
-        <p:txBody>
-          <a:bodyPr lIns="121920" tIns="121920" rIns="121920" bIns="121920" anchor="ctr"/>
-          <a:lstStyle/>
-          <a:p>
-            <a:pPr defTabSz="1219120" fontAlgn="auto">
-              <a:spcBef>
-                <a:spcPts val="0"/>
-              </a:spcBef>
-              <a:spcAft>
-                <a:spcPts val="0"/>
-              </a:spcAft>
-              <a:defRPr/>
-            </a:pPr>
-            <a:r>
-              <a:rPr lang="en-US" sz="16933" dirty="0">
-                <a:ln w="18415" cmpd="sng">
-                  <a:solidFill>
-                    <a:srgbClr val="FFFFFF"/>
-                  </a:solidFill>
-                  <a:prstDash val="solid"/>
-                </a:ln>
-                <a:solidFill>
-                  <a:schemeClr val="bg2">
-                    <a:lumMod val="95000"/>
-                    <a:alpha val="50000"/>
-                  </a:schemeClr>
-                </a:solidFill>
-                <a:latin typeface="+mn-lt"/>
-                <a:ea typeface="+mn-ea"/>
-                <a:cs typeface="+mn-cs"/>
-              </a:rPr>
-              <a:t>PROBLEM</a:t>
-            </a:r>
-          </a:p>
-        </p:txBody>
-      </p:sp>
-      <p:pic>
-        <p:nvPicPr>
-          <p:cNvPr id="2" name="Picture 1" descr="splat.gif"/>
-          <p:cNvPicPr>
-            <a:picLocks noChangeAspect="1"/>
-          </p:cNvPicPr>
-          <p:nvPr userDrawn="1"/>
-        </p:nvPicPr>
-        <p:blipFill>
-          <a:blip r:embed="rId2">
-            <a:extLst>
-              <a:ext uri="{28A0092B-C50C-407E-A947-70E740481C1C}">
-                <a14:useLocalDpi xmlns:a14="http://schemas.microsoft.com/office/drawing/2010/main" val="0"/>
-              </a:ext>
-            </a:extLst>
-          </a:blip>
-          <a:stretch>
-            <a:fillRect/>
-          </a:stretch>
-        </p:blipFill>
-        <p:spPr>
-          <a:xfrm>
-            <a:off x="13153654" y="94879"/>
-            <a:ext cx="2648691" cy="2648691"/>
+            <a:off x="13383499" y="324724"/>
+            <a:ext cx="2189001" cy="2189001"/>
           </a:xfrm>
           <a:prstGeom prst="rect">
             <a:avLst/>
@@ -16065,7 +16072,7 @@
           <a:p>
             <a:r>
               <a:rPr lang="en-US" dirty="0" smtClean="0"/>
-              <a:t>Problem</a:t>
+              <a:t>Documentation</a:t>
             </a:r>
             <a:endParaRPr lang="en-US" dirty="0"/>
           </a:p>
@@ -16073,7 +16080,7 @@
       </p:sp>
       <p:sp>
         <p:nvSpPr>
-          <p:cNvPr id="10" name="Subtitle 2"/>
+          <p:cNvPr id="12" name="Subtitle 2"/>
           <p:cNvSpPr>
             <a:spLocks noGrp="1"/>
           </p:cNvSpPr>
@@ -16200,10 +16207,55 @@
           </a:p>
         </p:txBody>
       </p:sp>
+      <p:sp>
+        <p:nvSpPr>
+          <p:cNvPr id="10" name="Content Placeholder 3"/>
+          <p:cNvSpPr>
+            <a:spLocks noGrp="1"/>
+          </p:cNvSpPr>
+          <p:nvPr>
+            <p:ph sz="quarter" idx="13" hasCustomPrompt="1"/>
+          </p:nvPr>
+        </p:nvSpPr>
+        <p:spPr>
+          <a:xfrm>
+            <a:off x="3921498" y="7164200"/>
+            <a:ext cx="8917577" cy="524133"/>
+          </a:xfrm>
+          <a:prstGeom prst="rect">
+            <a:avLst/>
+          </a:prstGeom>
+        </p:spPr>
+        <p:txBody>
+          <a:bodyPr anchor="ctr"/>
+          <a:lstStyle>
+            <a:lvl1pPr marL="0" indent="0" algn="ctr">
+              <a:buNone/>
+              <a:defRPr sz="2400">
+                <a:solidFill>
+                  <a:schemeClr val="tx1"/>
+                </a:solidFill>
+              </a:defRPr>
+            </a:lvl1pPr>
+          </a:lstStyle>
+          <a:p>
+            <a:pPr lvl="0"/>
+            <a:r>
+              <a:rPr lang="en-US" dirty="0" smtClean="0"/>
+              <a:t>http://</a:t>
+            </a:r>
+            <a:r>
+              <a:rPr lang="en-US" dirty="0" err="1" smtClean="0"/>
+              <a:t>docs.chef.io</a:t>
+            </a:r>
+            <a:endParaRPr lang="en-US" dirty="0" smtClean="0"/>
+          </a:p>
+        </p:txBody>
+      </p:sp>
     </p:spTree>
     <p:extLst>
       <p:ext uri="{BB962C8B-B14F-4D97-AF65-F5344CB8AC3E}">
-        <p14:creationId xmlns:p14="http://schemas.microsoft.com/office/powerpoint/2010/main" val="247207333"/>
+        <p14:creationId xmlns:p14="http://schemas.microsoft.com/office/powerpoint/2010/main" val="1970238568"/>
       </p:ext>
     </p:extLst>
   </p:cSld>
@@ -16218,7 +16270,7 @@
 
 <file path=ppt/slideLayouts/slideLayout16.xml><?xml version="1.0" encoding="utf-8"?>
 <p:sldLayout xmlns:a="http://schemas.openxmlformats.org/drawingml/2006/main" xmlns:r="http://schemas.openxmlformats.org/officeDocument/2006/relationships" xmlns:p="http://schemas.openxmlformats.org/presentationml/2006/main" preserve="1" userDrawn="1">
-  <p:cSld name="Docs">
+  <p:cSld name="Concept">
     <p:spTree>
       <p:nvGrpSpPr>
         <p:cNvPr id="1" name=""/>
@@ -16235,14 +16287,14 @@
       </p:grpSpPr>
       <p:sp>
         <p:nvSpPr>
-          <p:cNvPr id="7" name="TextBox 6"/>
+          <p:cNvPr id="5" name="TextBox 4"/>
           <p:cNvSpPr txBox="1"/>
           <p:nvPr/>
         </p:nvSpPr>
         <p:spPr bwMode="white">
           <a:xfrm>
-            <a:off x="136960" y="160072"/>
-            <a:ext cx="13917707" cy="2378219"/>
+            <a:off x="136961" y="144390"/>
+            <a:ext cx="11554287" cy="2378219"/>
           </a:xfrm>
           <a:prstGeom prst="rect">
             <a:avLst/>
@@ -16267,7 +16319,7 @@
               <a:defRPr/>
             </a:pPr>
             <a:r>
-              <a:rPr lang="en-US" sz="16933" dirty="0" smtClean="0">
+              <a:rPr lang="en-US" sz="16933" dirty="0">
                 <a:ln w="18415" cmpd="sng">
                   <a:solidFill>
                     <a:srgbClr val="FFFFFF"/>
@@ -16284,31 +16336,14 @@
                 <a:ea typeface="+mn-ea"/>
                 <a:cs typeface="+mn-cs"/>
               </a:rPr>
-              <a:t>REFERENCE</a:t>
+              <a:t>CONCEPT</a:t>
             </a:r>
-            <a:endParaRPr lang="en-US" sz="16933" dirty="0">
-              <a:ln w="18415" cmpd="sng">
-                <a:solidFill>
-                  <a:srgbClr val="FFFFFF"/>
-                </a:solidFill>
-                <a:prstDash val="solid"/>
-              </a:ln>
-              <a:solidFill>
-                <a:schemeClr val="bg2">
-                  <a:lumMod val="95000"/>
-                  <a:alpha val="50000"/>
-                </a:schemeClr>
-              </a:solidFill>
-              <a:latin typeface="+mn-lt"/>
-              <a:ea typeface="+mn-ea"/>
-              <a:cs typeface="+mn-cs"/>
-            </a:endParaRPr>
           </a:p>
         </p:txBody>
       </p:sp>
       <p:pic>
         <p:nvPicPr>
-          <p:cNvPr id="2" name="Picture 1" descr="reference.gif"/>
+          <p:cNvPr id="2" name="Picture 1" descr="concept.gif"/>
           <p:cNvPicPr>
             <a:picLocks noChangeAspect="1"/>
           </p:cNvPicPr>
@@ -16328,8 +16363,8 @@
         </p:blipFill>
         <p:spPr>
           <a:xfrm>
-            <a:off x="13383499" y="324724"/>
-            <a:ext cx="2189001" cy="2189001"/>
+            <a:off x="13119426" y="324724"/>
+            <a:ext cx="2717146" cy="2189001"/>
           </a:xfrm>
           <a:prstGeom prst="rect">
             <a:avLst/>
@@ -16369,7 +16404,7 @@
           <a:p>
             <a:r>
               <a:rPr lang="en-US" dirty="0" smtClean="0"/>
-              <a:t>Documentation</a:t>
+              <a:t>Concept</a:t>
             </a:r>
             <a:endParaRPr lang="en-US" dirty="0"/>
           </a:p>
@@ -16377,7 +16412,7 @@
       </p:sp>
       <p:sp>
         <p:nvSpPr>
-          <p:cNvPr id="12" name="Subtitle 2"/>
+          <p:cNvPr id="10" name="Subtitle 2"/>
           <p:cNvSpPr>
             <a:spLocks noGrp="1"/>
           </p:cNvSpPr>
@@ -16504,338 +16539,6 @@
           </a:p>
         </p:txBody>
       </p:sp>
-      <p:sp>
-        <p:nvSpPr>
-          <p:cNvPr id="10" name="Content Placeholder 3"/>
-          <p:cNvSpPr>
-            <a:spLocks noGrp="1"/>
-          </p:cNvSpPr>
-          <p:nvPr>
-            <p:ph sz="quarter" idx="13" hasCustomPrompt="1"/>
-          </p:nvPr>
-        </p:nvSpPr>
-        <p:spPr>
-          <a:xfrm>
-            <a:off x="3921498" y="7164200"/>
-            <a:ext cx="8917577" cy="524133"/>
-          </a:xfrm>
-          <a:prstGeom prst="rect">
-            <a:avLst/>
-          </a:prstGeom>
-        </p:spPr>
-        <p:txBody>
-          <a:bodyPr anchor="ctr"/>
-          <a:lstStyle>
-            <a:lvl1pPr marL="0" indent="0" algn="ctr">
-              <a:buNone/>
-              <a:defRPr sz="2400">
-                <a:solidFill>
-                  <a:schemeClr val="tx1"/>
-                </a:solidFill>
-              </a:defRPr>
-            </a:lvl1pPr>
-          </a:lstStyle>
-          <a:p>
-            <a:pPr lvl="0"/>
-            <a:r>
-              <a:rPr lang="en-US" dirty="0" smtClean="0"/>
-              <a:t>http://</a:t>
-            </a:r>
-            <a:r>
-              <a:rPr lang="en-US" dirty="0" err="1" smtClean="0"/>
-              <a:t>docs.chef.io</a:t>
-            </a:r>
-            <a:endParaRPr lang="en-US" dirty="0" smtClean="0"/>
-          </a:p>
-        </p:txBody>
-      </p:sp>
-    </p:spTree>
-    <p:extLst>
-      <p:ext uri="{BB962C8B-B14F-4D97-AF65-F5344CB8AC3E}">
-        <p14:creationId xmlns:p14="http://schemas.microsoft.com/office/powerpoint/2010/main" val="1970238568"/>
-      </p:ext>
-    </p:extLst>
-  </p:cSld>
-  <p:clrMapOvr>
-    <a:masterClrMapping/>
-  </p:clrMapOvr>
-  <p:transition spd="med">
-    <p:fade/>
-  </p:transition>
-</p:sldLayout>
-</file>
-
-<file path=ppt/slideLayouts/slideLayout17.xml><?xml version="1.0" encoding="utf-8"?>
-<p:sldLayout xmlns:a="http://schemas.openxmlformats.org/drawingml/2006/main" xmlns:r="http://schemas.openxmlformats.org/officeDocument/2006/relationships" xmlns:p="http://schemas.openxmlformats.org/presentationml/2006/main" preserve="1" userDrawn="1">
-  <p:cSld name="Concept">
-    <p:spTree>
-      <p:nvGrpSpPr>
-        <p:cNvPr id="1" name=""/>
-        <p:cNvGrpSpPr/>
-        <p:nvPr/>
-      </p:nvGrpSpPr>
-      <p:grpSpPr>
-        <a:xfrm>
-          <a:off x="0" y="0"/>
-          <a:ext cx="0" cy="0"/>
-          <a:chOff x="0" y="0"/>
-          <a:chExt cx="0" cy="0"/>
-        </a:xfrm>
-      </p:grpSpPr>
-      <p:sp>
-        <p:nvSpPr>
-          <p:cNvPr id="5" name="TextBox 4"/>
-          <p:cNvSpPr txBox="1"/>
-          <p:nvPr/>
-        </p:nvSpPr>
-        <p:spPr bwMode="white">
-          <a:xfrm>
-            <a:off x="136961" y="144390"/>
-            <a:ext cx="11554287" cy="2378219"/>
-          </a:xfrm>
-          <a:prstGeom prst="rect">
-            <a:avLst/>
-          </a:prstGeom>
-          <a:noFill/>
-          <a:ln>
-            <a:noFill/>
-          </a:ln>
-          <a:effectLst/>
-        </p:spPr>
-        <p:txBody>
-          <a:bodyPr lIns="121920" tIns="121920" rIns="121920" bIns="121920" anchor="ctr"/>
-          <a:lstStyle/>
-          <a:p>
-            <a:pPr defTabSz="1219120" fontAlgn="auto">
-              <a:spcBef>
-                <a:spcPts val="0"/>
-              </a:spcBef>
-              <a:spcAft>
-                <a:spcPts val="0"/>
-              </a:spcAft>
-              <a:defRPr/>
-            </a:pPr>
-            <a:r>
-              <a:rPr lang="en-US" sz="16933" dirty="0">
-                <a:ln w="18415" cmpd="sng">
-                  <a:solidFill>
-                    <a:srgbClr val="FFFFFF"/>
-                  </a:solidFill>
-                  <a:prstDash val="solid"/>
-                </a:ln>
-                <a:solidFill>
-                  <a:schemeClr val="bg2">
-                    <a:lumMod val="95000"/>
-                    <a:alpha val="50000"/>
-                  </a:schemeClr>
-                </a:solidFill>
-                <a:latin typeface="+mn-lt"/>
-                <a:ea typeface="+mn-ea"/>
-                <a:cs typeface="+mn-cs"/>
-              </a:rPr>
-              <a:t>CONCEPT</a:t>
-            </a:r>
-          </a:p>
-        </p:txBody>
-      </p:sp>
-      <p:pic>
-        <p:nvPicPr>
-          <p:cNvPr id="2" name="Picture 1" descr="concept.gif"/>
-          <p:cNvPicPr>
-            <a:picLocks noChangeAspect="1"/>
-          </p:cNvPicPr>
-          <p:nvPr userDrawn="1"/>
-        </p:nvPicPr>
-        <p:blipFill>
-          <a:blip r:embed="rId2">
-            <a:extLst>
-              <a:ext uri="{28A0092B-C50C-407E-A947-70E740481C1C}">
-                <a14:useLocalDpi xmlns:a14="http://schemas.microsoft.com/office/drawing/2010/main" val="0"/>
-              </a:ext>
-            </a:extLst>
-          </a:blip>
-          <a:stretch>
-            <a:fillRect/>
-          </a:stretch>
-        </p:blipFill>
-        <p:spPr>
-          <a:xfrm>
-            <a:off x="13119426" y="324724"/>
-            <a:ext cx="2717146" cy="2189001"/>
-          </a:xfrm>
-          <a:prstGeom prst="rect">
-            <a:avLst/>
-          </a:prstGeom>
-        </p:spPr>
-      </p:pic>
-      <p:sp>
-        <p:nvSpPr>
-          <p:cNvPr id="6" name="Title 1"/>
-          <p:cNvSpPr>
-            <a:spLocks noGrp="1"/>
-          </p:cNvSpPr>
-          <p:nvPr>
-            <p:ph type="ctrTitle" hasCustomPrompt="1"/>
-          </p:nvPr>
-        </p:nvSpPr>
-        <p:spPr bwMode="white">
-          <a:xfrm>
-            <a:off x="1671638" y="2294619"/>
-            <a:ext cx="12319000" cy="852712"/>
-          </a:xfrm>
-        </p:spPr>
-        <p:txBody>
-          <a:bodyPr lIns="91440" tIns="91440" rIns="91440" bIns="91440" anchor="ctr"/>
-          <a:lstStyle>
-            <a:lvl1pPr>
-              <a:lnSpc>
-                <a:spcPct val="90000"/>
-              </a:lnSpc>
-              <a:defRPr sz="6400" b="1" spc="0" baseline="0">
-                <a:solidFill>
-                  <a:schemeClr val="accent1"/>
-                </a:solidFill>
-              </a:defRPr>
-            </a:lvl1pPr>
-          </a:lstStyle>
-          <a:p>
-            <a:r>
-              <a:rPr lang="en-US" dirty="0" smtClean="0"/>
-              <a:t>Concept</a:t>
-            </a:r>
-            <a:endParaRPr lang="en-US" dirty="0"/>
-          </a:p>
-        </p:txBody>
-      </p:sp>
-      <p:sp>
-        <p:nvSpPr>
-          <p:cNvPr id="10" name="Subtitle 2"/>
-          <p:cNvSpPr>
-            <a:spLocks noGrp="1"/>
-          </p:cNvSpPr>
-          <p:nvPr>
-            <p:ph type="subTitle" idx="1"/>
-          </p:nvPr>
-        </p:nvSpPr>
-        <p:spPr bwMode="white">
-          <a:xfrm>
-            <a:off x="1671638" y="3271838"/>
-            <a:ext cx="12319000" cy="3346421"/>
-          </a:xfrm>
-          <a:prstGeom prst="rect">
-            <a:avLst/>
-          </a:prstGeom>
-        </p:spPr>
-        <p:txBody>
-          <a:bodyPr lIns="91440" tIns="91440" rIns="91440" bIns="91440">
-            <a:noAutofit/>
-          </a:bodyPr>
-          <a:lstStyle>
-            <a:lvl1pPr marL="0" indent="0" algn="l">
-              <a:lnSpc>
-                <a:spcPct val="100000"/>
-              </a:lnSpc>
-              <a:spcBef>
-                <a:spcPts val="0"/>
-              </a:spcBef>
-              <a:buNone/>
-              <a:defRPr sz="2800" baseline="0">
-                <a:solidFill>
-                  <a:schemeClr val="accent3">
-                    <a:lumMod val="50000"/>
-                  </a:schemeClr>
-                </a:solidFill>
-              </a:defRPr>
-            </a:lvl1pPr>
-            <a:lvl2pPr marL="609561" indent="0" algn="ctr">
-              <a:buNone/>
-              <a:defRPr>
-                <a:solidFill>
-                  <a:schemeClr val="tx1">
-                    <a:tint val="75000"/>
-                  </a:schemeClr>
-                </a:solidFill>
-              </a:defRPr>
-            </a:lvl2pPr>
-            <a:lvl3pPr marL="1219120" indent="0" algn="ctr">
-              <a:buNone/>
-              <a:defRPr>
-                <a:solidFill>
-                  <a:schemeClr val="tx1">
-                    <a:tint val="75000"/>
-                  </a:schemeClr>
-                </a:solidFill>
-              </a:defRPr>
-            </a:lvl3pPr>
-            <a:lvl4pPr marL="1828681" indent="0" algn="ctr">
-              <a:buNone/>
-              <a:defRPr>
-                <a:solidFill>
-                  <a:schemeClr val="tx1">
-                    <a:tint val="75000"/>
-                  </a:schemeClr>
-                </a:solidFill>
-              </a:defRPr>
-            </a:lvl4pPr>
-            <a:lvl5pPr marL="2438242" indent="0" algn="ctr">
-              <a:buNone/>
-              <a:defRPr>
-                <a:solidFill>
-                  <a:schemeClr val="tx1">
-                    <a:tint val="75000"/>
-                  </a:schemeClr>
-                </a:solidFill>
-              </a:defRPr>
-            </a:lvl5pPr>
-            <a:lvl6pPr marL="3047802" indent="0" algn="ctr">
-              <a:buNone/>
-              <a:defRPr>
-                <a:solidFill>
-                  <a:schemeClr val="tx1">
-                    <a:tint val="75000"/>
-                  </a:schemeClr>
-                </a:solidFill>
-              </a:defRPr>
-            </a:lvl6pPr>
-            <a:lvl7pPr marL="3657362" indent="0" algn="ctr">
-              <a:buNone/>
-              <a:defRPr>
-                <a:solidFill>
-                  <a:schemeClr val="tx1">
-                    <a:tint val="75000"/>
-                  </a:schemeClr>
-                </a:solidFill>
-              </a:defRPr>
-            </a:lvl7pPr>
-            <a:lvl8pPr marL="4266923" indent="0" algn="ctr">
-              <a:buNone/>
-              <a:defRPr>
-                <a:solidFill>
-                  <a:schemeClr val="tx1">
-                    <a:tint val="75000"/>
-                  </a:schemeClr>
-                </a:solidFill>
-              </a:defRPr>
-            </a:lvl8pPr>
-            <a:lvl9pPr marL="4876483" indent="0" algn="ctr">
-              <a:buNone/>
-              <a:defRPr>
-                <a:solidFill>
-                  <a:schemeClr val="tx1">
-                    <a:tint val="75000"/>
-                  </a:schemeClr>
-                </a:solidFill>
-              </a:defRPr>
-            </a:lvl9pPr>
-          </a:lstStyle>
-          <a:p>
-            <a:r>
-              <a:rPr lang="en-US" dirty="0" smtClean="0"/>
-              <a:t>Click to edit Master subtitle style</a:t>
-            </a:r>
-          </a:p>
-        </p:txBody>
-      </p:sp>
     </p:spTree>
     <p:extLst>
       <p:ext uri="{BB962C8B-B14F-4D97-AF65-F5344CB8AC3E}">
@@ -16852,7 +16555,7 @@
 </p:sldLayout>
 </file>
 
-<file path=ppt/slideLayouts/slideLayout18.xml><?xml version="1.0" encoding="utf-8"?>
+<file path=ppt/slideLayouts/slideLayout17.xml><?xml version="1.0" encoding="utf-8"?>
 <p:sldLayout xmlns:a="http://schemas.openxmlformats.org/drawingml/2006/main" xmlns:r="http://schemas.openxmlformats.org/officeDocument/2006/relationships" xmlns:p="http://schemas.openxmlformats.org/presentationml/2006/main" preserve="1" userDrawn="1">
   <p:cSld name="Group Exercise">
     <p:spTree>
@@ -17063,14 +16766,14 @@
           </a:ln>
           <a:extLst>
             <a:ext uri="{909E8E84-426E-40dd-AFC4-6F175D3DCCD1}">
-              <a14:hiddenFill xmlns="" xmlns:a14="http://schemas.microsoft.com/office/drawing/2010/main">
+              <a14:hiddenFill xmlns:a14="http://schemas.microsoft.com/office/drawing/2010/main" xmlns="">
                 <a:solidFill>
                   <a:srgbClr val="FFFFFF"/>
                 </a:solidFill>
               </a14:hiddenFill>
             </a:ext>
             <a:ext uri="{91240B29-F687-4f45-9708-019B960494DF}">
-              <a14:hiddenLine xmlns="" xmlns:a14="http://schemas.microsoft.com/office/drawing/2010/main" w="9525">
+              <a14:hiddenLine xmlns:a14="http://schemas.microsoft.com/office/drawing/2010/main" xmlns="" w="9525">
                 <a:solidFill>
                   <a:srgbClr val="000000"/>
                 </a:solidFill>
@@ -17273,7 +16976,7 @@
 </p:sldLayout>
 </file>
 
-<file path=ppt/slideLayouts/slideLayout19.xml><?xml version="1.0" encoding="utf-8"?>
+<file path=ppt/slideLayouts/slideLayout18.xml><?xml version="1.0" encoding="utf-8"?>
 <p:sldLayout xmlns:a="http://schemas.openxmlformats.org/drawingml/2006/main" xmlns:r="http://schemas.openxmlformats.org/officeDocument/2006/relationships" xmlns:p="http://schemas.openxmlformats.org/presentationml/2006/main" preserve="1" userDrawn="1">
   <p:cSld name="Lab">
     <p:spTree>
@@ -17561,184 +17264,7 @@
 </p:sldLayout>
 </file>
 
-<file path=ppt/slideLayouts/slideLayout2.xml><?xml version="1.0" encoding="utf-8"?>
-<p:sldLayout xmlns:a="http://schemas.openxmlformats.org/drawingml/2006/main" xmlns:r="http://schemas.openxmlformats.org/officeDocument/2006/relationships" xmlns:p="http://schemas.openxmlformats.org/presentationml/2006/main" preserve="1" userDrawn="1">
-  <p:cSld name="Standard">
-    <p:bg>
-      <p:bgPr>
-        <a:gradFill rotWithShape="0">
-          <a:gsLst>
-            <a:gs pos="0">
-              <a:schemeClr val="bg1"/>
-            </a:gs>
-            <a:gs pos="100000">
-              <a:schemeClr val="bg2"/>
-            </a:gs>
-          </a:gsLst>
-          <a:lin ang="5400000" scaled="1"/>
-        </a:gradFill>
-        <a:effectLst/>
-      </p:bgPr>
-    </p:bg>
-    <p:spTree>
-      <p:nvGrpSpPr>
-        <p:cNvPr id="1" name=""/>
-        <p:cNvGrpSpPr/>
-        <p:nvPr/>
-      </p:nvGrpSpPr>
-      <p:grpSpPr>
-        <a:xfrm>
-          <a:off x="0" y="0"/>
-          <a:ext cx="0" cy="0"/>
-          <a:chOff x="0" y="0"/>
-          <a:chExt cx="0" cy="0"/>
-        </a:xfrm>
-      </p:grpSpPr>
-      <p:sp>
-        <p:nvSpPr>
-          <p:cNvPr id="13" name="Title 12"/>
-          <p:cNvSpPr>
-            <a:spLocks noGrp="1"/>
-          </p:cNvSpPr>
-          <p:nvPr>
-            <p:ph type="title"/>
-          </p:nvPr>
-        </p:nvSpPr>
-        <p:spPr/>
-        <p:txBody>
-          <a:bodyPr/>
-          <a:lstStyle/>
-          <a:p>
-            <a:r>
-              <a:rPr lang="en-US" smtClean="0"/>
-              <a:t>Click to edit Master title style</a:t>
-            </a:r>
-            <a:endParaRPr lang="en-US" dirty="0"/>
-          </a:p>
-        </p:txBody>
-      </p:sp>
-      <p:sp>
-        <p:nvSpPr>
-          <p:cNvPr id="17" name="Text Placeholder 4"/>
-          <p:cNvSpPr>
-            <a:spLocks noGrp="1"/>
-          </p:cNvSpPr>
-          <p:nvPr>
-            <p:ph type="body" sz="quarter" idx="12"/>
-          </p:nvPr>
-        </p:nvSpPr>
-        <p:spPr>
-          <a:xfrm>
-            <a:off x="650040" y="1856198"/>
-            <a:ext cx="14898624" cy="5345953"/>
-          </a:xfrm>
-        </p:spPr>
-        <p:txBody>
-          <a:bodyPr>
-            <a:noAutofit/>
-          </a:bodyPr>
-          <a:lstStyle>
-            <a:lvl1pPr>
-              <a:spcAft>
-                <a:spcPts val="800"/>
-              </a:spcAft>
-              <a:defRPr baseline="0">
-                <a:solidFill>
-                  <a:schemeClr val="accent3">
-                    <a:lumMod val="50000"/>
-                  </a:schemeClr>
-                </a:solidFill>
-              </a:defRPr>
-            </a:lvl1pPr>
-            <a:lvl2pPr>
-              <a:spcAft>
-                <a:spcPts val="800"/>
-              </a:spcAft>
-              <a:defRPr baseline="0">
-                <a:solidFill>
-                  <a:schemeClr val="accent3">
-                    <a:lumMod val="50000"/>
-                  </a:schemeClr>
-                </a:solidFill>
-              </a:defRPr>
-            </a:lvl2pPr>
-            <a:lvl3pPr>
-              <a:spcAft>
-                <a:spcPts val="800"/>
-              </a:spcAft>
-              <a:defRPr baseline="0">
-                <a:solidFill>
-                  <a:schemeClr val="accent3">
-                    <a:lumMod val="50000"/>
-                  </a:schemeClr>
-                </a:solidFill>
-              </a:defRPr>
-            </a:lvl3pPr>
-            <a:lvl4pPr>
-              <a:spcAft>
-                <a:spcPts val="800"/>
-              </a:spcAft>
-              <a:defRPr baseline="0">
-                <a:solidFill>
-                  <a:schemeClr val="accent3">
-                    <a:lumMod val="50000"/>
-                  </a:schemeClr>
-                </a:solidFill>
-              </a:defRPr>
-            </a:lvl4pPr>
-            <a:lvl5pPr>
-              <a:spcAft>
-                <a:spcPts val="800"/>
-              </a:spcAft>
-              <a:defRPr baseline="0">
-                <a:solidFill>
-                  <a:schemeClr val="accent3">
-                    <a:lumMod val="50000"/>
-                  </a:schemeClr>
-                </a:solidFill>
-              </a:defRPr>
-            </a:lvl5pPr>
-          </a:lstStyle>
-          <a:p>
-            <a:pPr lvl="0"/>
-            <a:r>
-              <a:rPr lang="en-US" smtClean="0"/>
-              <a:t>Click to edit Master text styles</a:t>
-            </a:r>
-          </a:p>
-          <a:p>
-            <a:pPr lvl="1"/>
-            <a:r>
-              <a:rPr lang="en-US" smtClean="0"/>
-              <a:t>Second level</a:t>
-            </a:r>
-          </a:p>
-          <a:p>
-            <a:pPr lvl="2"/>
-            <a:r>
-              <a:rPr lang="en-US" smtClean="0"/>
-              <a:t>Third level</a:t>
-            </a:r>
-          </a:p>
-        </p:txBody>
-      </p:sp>
-    </p:spTree>
-    <p:extLst>
-      <p:ext uri="{BB962C8B-B14F-4D97-AF65-F5344CB8AC3E}">
-        <p14:creationId xmlns:p14="http://schemas.microsoft.com/office/powerpoint/2010/main" val="2747942789"/>
-      </p:ext>
-    </p:extLst>
-  </p:cSld>
-  <p:clrMapOvr>
-    <a:masterClrMapping/>
-  </p:clrMapOvr>
-  <p:transition spd="med">
-    <p:fade/>
-  </p:transition>
-</p:sldLayout>
-</file>
-
-<file path=ppt/slideLayouts/slideLayout20.xml><?xml version="1.0" encoding="utf-8"?>
+<file path=ppt/slideLayouts/slideLayout19.xml><?xml version="1.0" encoding="utf-8"?>
 <p:sldLayout xmlns:a="http://schemas.openxmlformats.org/drawingml/2006/main" xmlns:r="http://schemas.openxmlformats.org/officeDocument/2006/relationships" xmlns:p="http://schemas.openxmlformats.org/presentationml/2006/main" preserve="1" userDrawn="1">
   <p:cSld name="Version Control">
     <p:spTree>
@@ -18050,7 +17576,184 @@
 </p:sldLayout>
 </file>
 
-<file path=ppt/slideLayouts/slideLayout21.xml><?xml version="1.0" encoding="utf-8"?>
+<file path=ppt/slideLayouts/slideLayout2.xml><?xml version="1.0" encoding="utf-8"?>
+<p:sldLayout xmlns:a="http://schemas.openxmlformats.org/drawingml/2006/main" xmlns:r="http://schemas.openxmlformats.org/officeDocument/2006/relationships" xmlns:p="http://schemas.openxmlformats.org/presentationml/2006/main" preserve="1" userDrawn="1">
+  <p:cSld name="Standard">
+    <p:bg>
+      <p:bgPr>
+        <a:gradFill rotWithShape="0">
+          <a:gsLst>
+            <a:gs pos="0">
+              <a:schemeClr val="bg1"/>
+            </a:gs>
+            <a:gs pos="100000">
+              <a:schemeClr val="bg2"/>
+            </a:gs>
+          </a:gsLst>
+          <a:lin ang="5400000" scaled="1"/>
+        </a:gradFill>
+        <a:effectLst/>
+      </p:bgPr>
+    </p:bg>
+    <p:spTree>
+      <p:nvGrpSpPr>
+        <p:cNvPr id="1" name=""/>
+        <p:cNvGrpSpPr/>
+        <p:nvPr/>
+      </p:nvGrpSpPr>
+      <p:grpSpPr>
+        <a:xfrm>
+          <a:off x="0" y="0"/>
+          <a:ext cx="0" cy="0"/>
+          <a:chOff x="0" y="0"/>
+          <a:chExt cx="0" cy="0"/>
+        </a:xfrm>
+      </p:grpSpPr>
+      <p:sp>
+        <p:nvSpPr>
+          <p:cNvPr id="13" name="Title 12"/>
+          <p:cNvSpPr>
+            <a:spLocks noGrp="1"/>
+          </p:cNvSpPr>
+          <p:nvPr>
+            <p:ph type="title"/>
+          </p:nvPr>
+        </p:nvSpPr>
+        <p:spPr/>
+        <p:txBody>
+          <a:bodyPr/>
+          <a:lstStyle/>
+          <a:p>
+            <a:r>
+              <a:rPr lang="en-US" smtClean="0"/>
+              <a:t>Click to edit Master title style</a:t>
+            </a:r>
+            <a:endParaRPr lang="en-US" dirty="0"/>
+          </a:p>
+        </p:txBody>
+      </p:sp>
+      <p:sp>
+        <p:nvSpPr>
+          <p:cNvPr id="17" name="Text Placeholder 4"/>
+          <p:cNvSpPr>
+            <a:spLocks noGrp="1"/>
+          </p:cNvSpPr>
+          <p:nvPr>
+            <p:ph type="body" sz="quarter" idx="12"/>
+          </p:nvPr>
+        </p:nvSpPr>
+        <p:spPr>
+          <a:xfrm>
+            <a:off x="650040" y="1856198"/>
+            <a:ext cx="14898624" cy="5345953"/>
+          </a:xfrm>
+        </p:spPr>
+        <p:txBody>
+          <a:bodyPr>
+            <a:noAutofit/>
+          </a:bodyPr>
+          <a:lstStyle>
+            <a:lvl1pPr>
+              <a:spcAft>
+                <a:spcPts val="800"/>
+              </a:spcAft>
+              <a:defRPr baseline="0">
+                <a:solidFill>
+                  <a:schemeClr val="accent3">
+                    <a:lumMod val="50000"/>
+                  </a:schemeClr>
+                </a:solidFill>
+              </a:defRPr>
+            </a:lvl1pPr>
+            <a:lvl2pPr>
+              <a:spcAft>
+                <a:spcPts val="800"/>
+              </a:spcAft>
+              <a:defRPr baseline="0">
+                <a:solidFill>
+                  <a:schemeClr val="accent3">
+                    <a:lumMod val="50000"/>
+                  </a:schemeClr>
+                </a:solidFill>
+              </a:defRPr>
+            </a:lvl2pPr>
+            <a:lvl3pPr>
+              <a:spcAft>
+                <a:spcPts val="800"/>
+              </a:spcAft>
+              <a:defRPr baseline="0">
+                <a:solidFill>
+                  <a:schemeClr val="accent3">
+                    <a:lumMod val="50000"/>
+                  </a:schemeClr>
+                </a:solidFill>
+              </a:defRPr>
+            </a:lvl3pPr>
+            <a:lvl4pPr>
+              <a:spcAft>
+                <a:spcPts val="800"/>
+              </a:spcAft>
+              <a:defRPr baseline="0">
+                <a:solidFill>
+                  <a:schemeClr val="accent3">
+                    <a:lumMod val="50000"/>
+                  </a:schemeClr>
+                </a:solidFill>
+              </a:defRPr>
+            </a:lvl4pPr>
+            <a:lvl5pPr>
+              <a:spcAft>
+                <a:spcPts val="800"/>
+              </a:spcAft>
+              <a:defRPr baseline="0">
+                <a:solidFill>
+                  <a:schemeClr val="accent3">
+                    <a:lumMod val="50000"/>
+                  </a:schemeClr>
+                </a:solidFill>
+              </a:defRPr>
+            </a:lvl5pPr>
+          </a:lstStyle>
+          <a:p>
+            <a:pPr lvl="0"/>
+            <a:r>
+              <a:rPr lang="en-US" smtClean="0"/>
+              <a:t>Click to edit Master text styles</a:t>
+            </a:r>
+          </a:p>
+          <a:p>
+            <a:pPr lvl="1"/>
+            <a:r>
+              <a:rPr lang="en-US" smtClean="0"/>
+              <a:t>Second level</a:t>
+            </a:r>
+          </a:p>
+          <a:p>
+            <a:pPr lvl="2"/>
+            <a:r>
+              <a:rPr lang="en-US" smtClean="0"/>
+              <a:t>Third level</a:t>
+            </a:r>
+          </a:p>
+        </p:txBody>
+      </p:sp>
+    </p:spTree>
+    <p:extLst>
+      <p:ext uri="{BB962C8B-B14F-4D97-AF65-F5344CB8AC3E}">
+        <p14:creationId xmlns:p14="http://schemas.microsoft.com/office/powerpoint/2010/main" val="2747942789"/>
+      </p:ext>
+    </p:extLst>
+  </p:cSld>
+  <p:clrMapOvr>
+    <a:masterClrMapping/>
+  </p:clrMapOvr>
+  <p:transition spd="med">
+    <p:fade/>
+  </p:transition>
+</p:sldLayout>
+</file>
+
+<file path=ppt/slideLayouts/slideLayout20.xml><?xml version="1.0" encoding="utf-8"?>
 <p:sldLayout xmlns:a="http://schemas.openxmlformats.org/drawingml/2006/main" xmlns:r="http://schemas.openxmlformats.org/officeDocument/2006/relationships" xmlns:p="http://schemas.openxmlformats.org/presentationml/2006/main" preserve="1" userDrawn="1">
   <p:cSld name="Discussion">
     <p:spTree>
@@ -18424,14 +18127,14 @@
           </a:ln>
           <a:extLst>
             <a:ext uri="{909E8E84-426E-40dd-AFC4-6F175D3DCCD1}">
-              <a14:hiddenFill xmlns="" xmlns:a14="http://schemas.microsoft.com/office/drawing/2010/main">
+              <a14:hiddenFill xmlns:a14="http://schemas.microsoft.com/office/drawing/2010/main" xmlns="">
                 <a:solidFill>
                   <a:srgbClr val="FFFFFF"/>
                 </a:solidFill>
               </a14:hiddenFill>
             </a:ext>
             <a:ext uri="{91240B29-F687-4f45-9708-019B960494DF}">
-              <a14:hiddenLine xmlns="" xmlns:a14="http://schemas.microsoft.com/office/drawing/2010/main" w="9525">
+              <a14:hiddenLine xmlns:a14="http://schemas.microsoft.com/office/drawing/2010/main" xmlns="" w="9525">
                 <a:solidFill>
                   <a:srgbClr val="000000"/>
                 </a:solidFill>
@@ -18989,14 +18692,14 @@
           </a:ln>
           <a:extLst>
             <a:ext uri="{909E8E84-426E-40dd-AFC4-6F175D3DCCD1}">
-              <a14:hiddenFill xmlns="" xmlns:a14="http://schemas.microsoft.com/office/drawing/2010/main">
+              <a14:hiddenFill xmlns:a14="http://schemas.microsoft.com/office/drawing/2010/main" xmlns="">
                 <a:solidFill>
                   <a:srgbClr val="FFFFFF"/>
                 </a:solidFill>
               </a14:hiddenFill>
             </a:ext>
             <a:ext uri="{91240B29-F687-4f45-9708-019B960494DF}">
-              <a14:hiddenLine xmlns="" xmlns:a14="http://schemas.microsoft.com/office/drawing/2010/main" w="9525">
+              <a14:hiddenLine xmlns:a14="http://schemas.microsoft.com/office/drawing/2010/main" xmlns="" w="9525">
                 <a:solidFill>
                   <a:srgbClr val="000000"/>
                 </a:solidFill>
@@ -19563,14 +19266,14 @@
           </a:ln>
           <a:extLst>
             <a:ext uri="{909E8E84-426E-40dd-AFC4-6F175D3DCCD1}">
-              <a14:hiddenFill xmlns="" xmlns:a14="http://schemas.microsoft.com/office/drawing/2010/main">
+              <a14:hiddenFill xmlns:a14="http://schemas.microsoft.com/office/drawing/2010/main" xmlns="">
                 <a:solidFill>
                   <a:srgbClr val="FFFFFF"/>
                 </a:solidFill>
               </a14:hiddenFill>
             </a:ext>
             <a:ext uri="{91240B29-F687-4f45-9708-019B960494DF}">
-              <a14:hiddenLine xmlns="" xmlns:a14="http://schemas.microsoft.com/office/drawing/2010/main" w="9525">
+              <a14:hiddenLine xmlns:a14="http://schemas.microsoft.com/office/drawing/2010/main" xmlns="" w="9525">
                 <a:solidFill>
                   <a:srgbClr val="000000"/>
                 </a:solidFill>
@@ -20484,7 +20187,7 @@
           <p:nvPr/>
         </p:nvPicPr>
         <p:blipFill>
-          <a:blip r:embed="rId15">
+          <a:blip r:embed="rId14">
             <a:extLst>
               <a:ext uri="{28A0092B-C50C-407E-A947-70E740481C1C}">
                 <a14:useLocalDpi xmlns:a14="http://schemas.microsoft.com/office/drawing/2010/main" val="0"/>
@@ -20510,14 +20213,14 @@
           </a:ln>
           <a:extLst>
             <a:ext uri="{909E8E84-426E-40dd-AFC4-6F175D3DCCD1}">
-              <a14:hiddenFill xmlns="" xmlns:a14="http://schemas.microsoft.com/office/drawing/2010/main">
+              <a14:hiddenFill xmlns:a14="http://schemas.microsoft.com/office/drawing/2010/main" xmlns="">
                 <a:solidFill>
                   <a:srgbClr val="FFFFFF"/>
                 </a:solidFill>
               </a14:hiddenFill>
             </a:ext>
             <a:ext uri="{91240B29-F687-4f45-9708-019B960494DF}">
-              <a14:hiddenLine xmlns="" xmlns:a14="http://schemas.microsoft.com/office/drawing/2010/main" w="9525">
+              <a14:hiddenLine xmlns:a14="http://schemas.microsoft.com/office/drawing/2010/main" xmlns="" w="9525">
                 <a:solidFill>
                   <a:srgbClr val="000000"/>
                 </a:solidFill>
@@ -20733,7 +20436,6 @@
     <p:sldLayoutId id="2147483840" r:id="rId10"/>
     <p:sldLayoutId id="2147483841" r:id="rId11"/>
     <p:sldLayoutId id="2147483843" r:id="rId12"/>
-    <p:sldLayoutId id="2147483867" r:id="rId13"/>
   </p:sldLayoutIdLst>
   <p:transition spd="med">
     <p:fade/>
@@ -21269,14 +20971,14 @@
           </a:ln>
           <a:extLst>
             <a:ext uri="{909E8E84-426E-40dd-AFC4-6F175D3DCCD1}">
-              <a14:hiddenFill xmlns="" xmlns:a14="http://schemas.microsoft.com/office/drawing/2010/main">
+              <a14:hiddenFill xmlns:a14="http://schemas.microsoft.com/office/drawing/2010/main" xmlns="">
                 <a:solidFill>
                   <a:srgbClr val="FFFFFF"/>
                 </a:solidFill>
               </a14:hiddenFill>
             </a:ext>
             <a:ext uri="{91240B29-F687-4f45-9708-019B960494DF}">
-              <a14:hiddenLine xmlns="" xmlns:a14="http://schemas.microsoft.com/office/drawing/2010/main" w="9525">
+              <a14:hiddenLine xmlns:a14="http://schemas.microsoft.com/office/drawing/2010/main" xmlns="" w="9525">
                 <a:solidFill>
                   <a:srgbClr val="000000"/>
                 </a:solidFill>
@@ -25876,19 +25578,7 @@
             </a:r>
             <a:r>
               <a:rPr lang="en-US" smtClean="0"/>
-              <a:t>version </a:t>
-            </a:r>
-            <a:r>
-              <a:rPr lang="en-US" smtClean="0"/>
-              <a:t>prior to </a:t>
-            </a:r>
-            <a:r>
-              <a:rPr lang="en-US" smtClean="0"/>
-              <a:t>12.5.X</a:t>
-            </a:r>
-            <a:r>
-              <a:rPr lang="en-US" smtClean="0"/>
-              <a:t>, </a:t>
+              <a:t>version prior to 12.5.X, </a:t>
             </a:r>
             <a:r>
               <a:rPr lang="en-US" dirty="0" smtClean="0"/>
@@ -25896,11 +25586,7 @@
             </a:r>
             <a:r>
               <a:rPr lang="en-US" smtClean="0"/>
-              <a:t>approach </a:t>
-            </a:r>
-            <a:r>
-              <a:rPr lang="en-US" smtClean="0"/>
-              <a:t>would would you choose?</a:t>
+              <a:t>approach would would you choose?</a:t>
             </a:r>
             <a:endParaRPr lang="en-US" dirty="0"/>
           </a:p>
@@ -27572,23 +27258,7 @@
                   <a:lin ang="5400000" scaled="0"/>
                 </a:gradFill>
               </a:rPr>
-              <a:t>IMPLEMENTATION </a:t>
-            </a:r>
-            <a:r>
-              <a:rPr lang="en-US" b="1" dirty="0" smtClean="0">
-                <a:gradFill>
-                  <a:gsLst>
-                    <a:gs pos="0">
-                      <a:srgbClr val="FFFFFF"/>
-                    </a:gs>
-                    <a:gs pos="100000">
-                      <a:srgbClr val="FFFFFF"/>
-                    </a:gs>
-                  </a:gsLst>
-                  <a:lin ang="5400000" scaled="0"/>
-                </a:gradFill>
-              </a:rPr>
-              <a:t>LANGUAGE - RESOURCE</a:t>
+              <a:t>IMPLEMENTATION LANGUAGE - RESOURCE</a:t>
             </a:r>
             <a:endParaRPr lang="en-US" sz="2400" b="1" dirty="0" smtClean="0">
               <a:gradFill>
@@ -27847,23 +27517,7 @@
                   <a:lin ang="5400000" scaled="0"/>
                 </a:gradFill>
               </a:rPr>
-              <a:t>IMPLEMENTATION </a:t>
-            </a:r>
-            <a:r>
-              <a:rPr lang="en-US" b="1" dirty="0" smtClean="0">
-                <a:gradFill>
-                  <a:gsLst>
-                    <a:gs pos="0">
-                      <a:srgbClr val="FFFFFF"/>
-                    </a:gs>
-                    <a:gs pos="100000">
-                      <a:srgbClr val="FFFFFF"/>
-                    </a:gs>
-                  </a:gsLst>
-                  <a:lin ang="5400000" scaled="0"/>
-                </a:gradFill>
-              </a:rPr>
-              <a:t>LANGUAGE - PROVIDER</a:t>
+              <a:t>IMPLEMENTATION LANGUAGE - PROVIDER</a:t>
             </a:r>
             <a:endParaRPr lang="en-US" sz="2400" b="1" dirty="0" smtClean="0">
               <a:gradFill>
@@ -29494,27 +29148,6 @@
 </file>
 
 <file path=customXml/item1.xml><?xml version="1.0" encoding="utf-8"?>
-<?mso-contentType ?>
-<FormTemplates xmlns="http://schemas.microsoft.com/sharepoint/v3/contenttype/forms">
-  <Display>DocumentLibraryForm</Display>
-  <Edit>DocumentLibraryForm</Edit>
-  <New>DocumentLibraryForm</New>
-</FormTemplates>
-</file>
-
-<file path=customXml/item2.xml><?xml version="1.0" encoding="utf-8"?>
-<p:properties xmlns:p="http://schemas.microsoft.com/office/2006/metadata/properties" xmlns:xsi="http://www.w3.org/2001/XMLSchema-instance" xmlns:pc="http://schemas.microsoft.com/office/infopath/2007/PartnerControls">
-  <documentManagement>
-    <_dlc_DocId xmlns="7bb5d761-a2ea-4873-95f7-7a6658fb3ef0">M4CWTKMW727E-592-73</_dlc_DocId>
-    <_dlc_DocIdUrl xmlns="7bb5d761-a2ea-4873-95f7-7a6658fb3ef0">
-      <Url>https://kms.vci.local/marketing/team/_layouts/DocIdRedir.aspx?ID=M4CWTKMW727E-592-73</Url>
-      <Description>M4CWTKMW727E-592-73</Description>
-    </_dlc_DocIdUrl>
-  </documentManagement>
-</p:properties>
-</file>
-
-<file path=customXml/item3.xml><?xml version="1.0" encoding="utf-8"?>
 <ct:contentTypeSchema xmlns:ct="http://schemas.microsoft.com/office/2006/metadata/contentType" xmlns:ma="http://schemas.microsoft.com/office/2006/metadata/properties/metaAttributes" ct:_="" ma:_="" ma:contentTypeName="Document" ma:contentTypeID="0x0101000812F700BE7F874999720E88173FE491" ma:contentTypeVersion="0" ma:contentTypeDescription="Create a new document." ma:contentTypeScope="" ma:versionID="3f79f408e2ca720b7aba6e0e32464d0c">
   <xsd:schema xmlns:xsd="http://www.w3.org/2001/XMLSchema" xmlns:xs="http://www.w3.org/2001/XMLSchema" xmlns:p="http://schemas.microsoft.com/office/2006/metadata/properties" xmlns:ns2="7bb5d761-a2ea-4873-95f7-7a6658fb3ef0" targetNamespace="http://schemas.microsoft.com/office/2006/metadata/properties" ma:root="true" ma:fieldsID="1e062cd38ba31e406bfc4340fbc7f87a" ns2:_="">
     <xsd:import namespace="7bb5d761-a2ea-4873-95f7-7a6658fb3ef0"/>
@@ -29659,7 +29292,7 @@
 </ct:contentTypeSchema>
 </file>
 
-<file path=customXml/item4.xml><?xml version="1.0" encoding="utf-8"?>
+<file path=customXml/item2.xml><?xml version="1.0" encoding="utf-8"?>
 <?mso-contentType ?>
 <spe:Receivers xmlns:spe="http://schemas.microsoft.com/sharepoint/events">
   <Receiver>
@@ -29705,31 +29338,28 @@
 </spe:Receivers>
 </file>
 
-<file path=customXml/itemProps1.xml><?xml version="1.0" encoding="utf-8"?>
-<ds:datastoreItem xmlns:ds="http://schemas.openxmlformats.org/officeDocument/2006/customXml" ds:itemID="{5CDEB364-43EC-4510-9881-539C2A3FCE9E}">
-  <ds:schemaRefs>
-    <ds:schemaRef ds:uri="http://schemas.microsoft.com/sharepoint/v3/contenttype/forms"/>
-  </ds:schemaRefs>
-</ds:datastoreItem>
+<file path=customXml/item3.xml><?xml version="1.0" encoding="utf-8"?>
+<?mso-contentType ?>
+<FormTemplates xmlns="http://schemas.microsoft.com/sharepoint/v3/contenttype/forms">
+  <Display>DocumentLibraryForm</Display>
+  <Edit>DocumentLibraryForm</Edit>
+  <New>DocumentLibraryForm</New>
+</FormTemplates>
 </file>
 
-<file path=customXml/itemProps2.xml><?xml version="1.0" encoding="utf-8"?>
-<ds:datastoreItem xmlns:ds="http://schemas.openxmlformats.org/officeDocument/2006/customXml" ds:itemID="{6921749B-AEB7-461B-845F-603CABD25259}">
-  <ds:schemaRefs>
-    <ds:schemaRef ds:uri="7bb5d761-a2ea-4873-95f7-7a6658fb3ef0"/>
-    <ds:schemaRef ds:uri="http://purl.org/dc/terms/"/>
-    <ds:schemaRef ds:uri="http://schemas.openxmlformats.org/package/2006/metadata/core-properties"/>
-    <ds:schemaRef ds:uri="http://purl.org/dc/dcmitype/"/>
-    <ds:schemaRef ds:uri="http://schemas.microsoft.com/office/2006/documentManagement/types"/>
-    <ds:schemaRef ds:uri="http://purl.org/dc/elements/1.1/"/>
-    <ds:schemaRef ds:uri="http://schemas.microsoft.com/office/2006/metadata/properties"/>
-    <ds:schemaRef ds:uri="http://schemas.microsoft.com/office/infopath/2007/PartnerControls"/>
-    <ds:schemaRef ds:uri="http://www.w3.org/XML/1998/namespace"/>
-  </ds:schemaRefs>
-</ds:datastoreItem>
+<file path=customXml/item4.xml><?xml version="1.0" encoding="utf-8"?>
+<p:properties xmlns:p="http://schemas.microsoft.com/office/2006/metadata/properties" xmlns:xsi="http://www.w3.org/2001/XMLSchema-instance" xmlns:pc="http://schemas.microsoft.com/office/infopath/2007/PartnerControls">
+  <documentManagement>
+    <_dlc_DocId xmlns="7bb5d761-a2ea-4873-95f7-7a6658fb3ef0">M4CWTKMW727E-592-73</_dlc_DocId>
+    <_dlc_DocIdUrl xmlns="7bb5d761-a2ea-4873-95f7-7a6658fb3ef0">
+      <Url>https://kms.vci.local/marketing/team/_layouts/DocIdRedir.aspx?ID=M4CWTKMW727E-592-73</Url>
+      <Description>M4CWTKMW727E-592-73</Description>
+    </_dlc_DocIdUrl>
+  </documentManagement>
+</p:properties>
 </file>
 
-<file path=customXml/itemProps3.xml><?xml version="1.0" encoding="utf-8"?>
+<file path=customXml/itemProps1.xml><?xml version="1.0" encoding="utf-8"?>
 <ds:datastoreItem xmlns:ds="http://schemas.openxmlformats.org/officeDocument/2006/customXml" ds:itemID="{164479E5-0B02-49AC-B79E-EC1D6164DDD3}">
   <ds:schemaRefs>
     <ds:schemaRef ds:uri="http://schemas.microsoft.com/office/2006/metadata/contentType"/>
@@ -29747,10 +29377,34 @@
 </ds:datastoreItem>
 </file>
 
-<file path=customXml/itemProps4.xml><?xml version="1.0" encoding="utf-8"?>
+<file path=customXml/itemProps2.xml><?xml version="1.0" encoding="utf-8"?>
 <ds:datastoreItem xmlns:ds="http://schemas.openxmlformats.org/officeDocument/2006/customXml" ds:itemID="{B13EBC30-FE27-4C6A-B723-23FC2188F7DC}">
   <ds:schemaRefs>
     <ds:schemaRef ds:uri="http://schemas.microsoft.com/sharepoint/events"/>
   </ds:schemaRefs>
 </ds:datastoreItem>
+</file>
+
+<file path=customXml/itemProps3.xml><?xml version="1.0" encoding="utf-8"?>
+<ds:datastoreItem xmlns:ds="http://schemas.openxmlformats.org/officeDocument/2006/customXml" ds:itemID="{5CDEB364-43EC-4510-9881-539C2A3FCE9E}">
+  <ds:schemaRefs>
+    <ds:schemaRef ds:uri="http://schemas.microsoft.com/sharepoint/v3/contenttype/forms"/>
+  </ds:schemaRefs>
+</ds:datastoreItem>
+</file>
+
+<file path=customXml/itemProps4.xml><?xml version="1.0" encoding="utf-8"?>
+<ds:datastoreItem xmlns:ds="http://schemas.openxmlformats.org/officeDocument/2006/customXml" ds:itemID="{6921749B-AEB7-461B-845F-603CABD25259}">
+  <ds:schemaRefs>
+    <ds:schemaRef ds:uri="7bb5d761-a2ea-4873-95f7-7a6658fb3ef0"/>
+    <ds:schemaRef ds:uri="http://purl.org/dc/terms/"/>
+    <ds:schemaRef ds:uri="http://schemas.openxmlformats.org/package/2006/metadata/core-properties"/>
+    <ds:schemaRef ds:uri="http://purl.org/dc/dcmitype/"/>
+    <ds:schemaRef ds:uri="http://schemas.microsoft.com/office/2006/documentManagement/types"/>
+    <ds:schemaRef ds:uri="http://purl.org/dc/elements/1.1/"/>
+    <ds:schemaRef ds:uri="http://schemas.microsoft.com/office/2006/metadata/properties"/>
+    <ds:schemaRef ds:uri="http://schemas.microsoft.com/office/infopath/2007/PartnerControls"/>
+    <ds:schemaRef ds:uri="http://www.w3.org/XML/1998/namespace"/>
+  </ds:schemaRefs>
+</ds:datastoreItem>
 </file>
</xml_diff>

<commit_message>
Updates module 02 to include usage
I thought it would be useful to talk about the usage along with
the implementation.
</commit_message>
<xml_diff>
--- a/02-approaches_to_extending_resources.pptx
+++ b/02-approaches_to_extending_resources.pptx
@@ -6,10 +6,10 @@
     <p:sldMasterId id="2147483847" r:id="rId6"/>
   </p:sldMasterIdLst>
   <p:notesMasterIdLst>
-    <p:notesMasterId r:id="rId33"/>
+    <p:notesMasterId r:id="rId36"/>
   </p:notesMasterIdLst>
   <p:handoutMasterIdLst>
-    <p:handoutMasterId r:id="rId34"/>
+    <p:handoutMasterId r:id="rId37"/>
   </p:handoutMasterIdLst>
   <p:sldIdLst>
     <p:sldId id="256" r:id="rId7"/>
@@ -20,24 +20,27 @@
     <p:sldId id="270" r:id="rId12"/>
     <p:sldId id="271" r:id="rId13"/>
     <p:sldId id="288" r:id="rId14"/>
-    <p:sldId id="272" r:id="rId15"/>
-    <p:sldId id="273" r:id="rId16"/>
-    <p:sldId id="274" r:id="rId17"/>
-    <p:sldId id="275" r:id="rId18"/>
-    <p:sldId id="276" r:id="rId19"/>
-    <p:sldId id="277" r:id="rId20"/>
-    <p:sldId id="278" r:id="rId21"/>
-    <p:sldId id="279" r:id="rId22"/>
-    <p:sldId id="289" r:id="rId23"/>
-    <p:sldId id="280" r:id="rId24"/>
-    <p:sldId id="281" r:id="rId25"/>
-    <p:sldId id="282" r:id="rId26"/>
-    <p:sldId id="283" r:id="rId27"/>
-    <p:sldId id="284" r:id="rId28"/>
-    <p:sldId id="286" r:id="rId29"/>
-    <p:sldId id="287" r:id="rId30"/>
-    <p:sldId id="266" r:id="rId31"/>
-    <p:sldId id="265" r:id="rId32"/>
+    <p:sldId id="291" r:id="rId15"/>
+    <p:sldId id="272" r:id="rId16"/>
+    <p:sldId id="273" r:id="rId17"/>
+    <p:sldId id="274" r:id="rId18"/>
+    <p:sldId id="275" r:id="rId19"/>
+    <p:sldId id="276" r:id="rId20"/>
+    <p:sldId id="277" r:id="rId21"/>
+    <p:sldId id="278" r:id="rId22"/>
+    <p:sldId id="279" r:id="rId23"/>
+    <p:sldId id="289" r:id="rId24"/>
+    <p:sldId id="290" r:id="rId25"/>
+    <p:sldId id="280" r:id="rId26"/>
+    <p:sldId id="281" r:id="rId27"/>
+    <p:sldId id="282" r:id="rId28"/>
+    <p:sldId id="283" r:id="rId29"/>
+    <p:sldId id="292" r:id="rId30"/>
+    <p:sldId id="284" r:id="rId31"/>
+    <p:sldId id="286" r:id="rId32"/>
+    <p:sldId id="287" r:id="rId33"/>
+    <p:sldId id="266" r:id="rId34"/>
+    <p:sldId id="265" r:id="rId35"/>
   </p:sldIdLst>
   <p:sldSz cx="16256000" cy="9144000"/>
   <p:notesSz cx="6858000" cy="9144000"/>
@@ -168,7 +171,7 @@
   </p:defaultTextStyle>
   <p:extLst>
     <p:ext uri="{EFAFB233-063F-42B5-8137-9DF3F51BA10A}">
-      <p15:sldGuideLst xmlns:p15="http://schemas.microsoft.com/office/powerpoint/2012/main">
+      <p15:sldGuideLst xmlns:p15="http://schemas.microsoft.com/office/powerpoint/2012/main" xmlns="">
         <p15:guide id="1" orient="horz" pos="3048" userDrawn="1">
           <p15:clr>
             <a:srgbClr val="A4A3A4"/>
@@ -182,7 +185,7 @@
       </p15:sldGuideLst>
     </p:ext>
     <p:ext uri="{2D200454-40CA-4A62-9FC3-DE9A4176ACB9}">
-      <p15:notesGuideLst xmlns:p15="http://schemas.microsoft.com/office/powerpoint/2012/main"/>
+      <p15:notesGuideLst xmlns:p15="http://schemas.microsoft.com/office/powerpoint/2012/main" xmlns=""/>
     </p:ext>
   </p:extLst>
 </p:presentation>
@@ -4546,12 +4549,12 @@
         </a:fontRef>
       </dsp:style>
       <dsp:txBody>
-        <a:bodyPr spcFirstLastPara="0" vert="horz" wrap="square" lIns="213360" tIns="213360" rIns="213360" bIns="1762871" numCol="1" spcCol="1270" anchor="t" anchorCtr="0">
+        <a:bodyPr spcFirstLastPara="0" vert="horz" wrap="square" lIns="201930" tIns="201930" rIns="201930" bIns="1762871" numCol="1" spcCol="1270" anchor="t" anchorCtr="0">
           <a:noAutofit/>
         </a:bodyPr>
         <a:lstStyle/>
         <a:p>
-          <a:pPr lvl="0" algn="l" defTabSz="2489200">
+          <a:pPr lvl="0" algn="l" defTabSz="2355850">
             <a:lnSpc>
               <a:spcPct val="90000"/>
             </a:lnSpc>
@@ -4563,14 +4566,14 @@
             </a:spcAft>
           </a:pPr>
           <a:r>
-            <a:rPr lang="en-US" sz="5600" b="1" kern="1200" dirty="0" err="1" smtClean="0">
+            <a:rPr lang="en-US" sz="5300" b="1" kern="1200" dirty="0" err="1" smtClean="0">
               <a:latin typeface="Courier New" charset="0"/>
               <a:ea typeface="Courier New" charset="0"/>
               <a:cs typeface="Courier New" charset="0"/>
             </a:rPr>
             <a:t>my_cookbook</a:t>
           </a:r>
-          <a:endParaRPr lang="en-US" sz="5600" b="1" kern="1200" dirty="0">
+          <a:endParaRPr lang="en-US" sz="5300" b="1" kern="1200" dirty="0">
             <a:latin typeface="Courier New" charset="0"/>
             <a:ea typeface="Courier New" charset="0"/>
             <a:cs typeface="Courier New" charset="0"/>
@@ -4638,12 +4641,12 @@
         <a:fontRef idx="minor"/>
       </dsp:style>
       <dsp:txBody>
-        <a:bodyPr spcFirstLastPara="0" vert="horz" wrap="square" lIns="95250" tIns="95250" rIns="95250" bIns="95250" numCol="1" spcCol="1270" anchor="t" anchorCtr="0">
+        <a:bodyPr spcFirstLastPara="0" vert="horz" wrap="square" lIns="87630" tIns="87630" rIns="87630" bIns="87630" numCol="1" spcCol="1270" anchor="t" anchorCtr="0">
           <a:noAutofit/>
         </a:bodyPr>
         <a:lstStyle/>
         <a:p>
-          <a:pPr lvl="0" algn="l" defTabSz="1111250">
+          <a:pPr lvl="0" algn="l" defTabSz="1022350">
             <a:lnSpc>
               <a:spcPct val="90000"/>
             </a:lnSpc>
@@ -4655,21 +4658,21 @@
             </a:spcAft>
           </a:pPr>
           <a:r>
-            <a:rPr lang="en-US" sz="2500" b="1" kern="1200" dirty="0" smtClean="0">
+            <a:rPr lang="en-US" sz="2300" b="1" kern="1200" dirty="0" smtClean="0">
               <a:latin typeface="Courier New" charset="0"/>
               <a:ea typeface="Courier New" charset="0"/>
               <a:cs typeface="Courier New" charset="0"/>
             </a:rPr>
             <a:t>libraries/</a:t>
           </a:r>
-          <a:endParaRPr lang="en-US" sz="2500" b="1" kern="1200" dirty="0">
+          <a:endParaRPr lang="en-US" sz="2300" b="1" kern="1200" dirty="0">
             <a:latin typeface="Courier New" charset="0"/>
             <a:ea typeface="Courier New" charset="0"/>
             <a:cs typeface="Courier New" charset="0"/>
           </a:endParaRPr>
         </a:p>
         <a:p>
-          <a:pPr marL="228600" lvl="1" indent="-228600" algn="l" defTabSz="889000">
+          <a:pPr marL="171450" lvl="1" indent="-171450" algn="l" defTabSz="800100">
             <a:lnSpc>
               <a:spcPct val="90000"/>
             </a:lnSpc>
@@ -4682,7 +4685,7 @@
             <a:buChar char="••"/>
           </a:pPr>
           <a:r>
-            <a:rPr lang="en-US" sz="2000" b="1" kern="1200" dirty="0" smtClean="0">
+            <a:rPr lang="en-US" sz="1800" b="1" kern="1200" dirty="0" smtClean="0">
               <a:latin typeface="Courier New" charset="0"/>
               <a:ea typeface="Courier New" charset="0"/>
               <a:cs typeface="Courier New" charset="0"/>
@@ -4690,7 +4693,7 @@
             <a:t>[</a:t>
           </a:r>
           <a:r>
-            <a:rPr lang="en-US" sz="2000" b="1" kern="1200" dirty="0" err="1" smtClean="0">
+            <a:rPr lang="en-US" sz="1800" b="1" kern="1200" dirty="0" err="1" smtClean="0">
               <a:latin typeface="Courier New" charset="0"/>
               <a:ea typeface="Courier New" charset="0"/>
               <a:cs typeface="Courier New" charset="0"/>
@@ -4698,7 +4701,7 @@
             <a:t>my_custom_resource</a:t>
           </a:r>
           <a:r>
-            <a:rPr lang="en-US" sz="2000" b="1" kern="1200" dirty="0" smtClean="0">
+            <a:rPr lang="en-US" sz="1800" b="1" kern="1200" dirty="0" smtClean="0">
               <a:latin typeface="Courier New" charset="0"/>
               <a:ea typeface="Courier New" charset="0"/>
               <a:cs typeface="Courier New" charset="0"/>
@@ -4706,21 +4709,21 @@
             <a:t>]_</a:t>
           </a:r>
           <a:r>
-            <a:rPr lang="en-US" sz="2000" b="1" kern="1200" dirty="0" err="1" smtClean="0">
+            <a:rPr lang="en-US" sz="1800" b="1" kern="1200" dirty="0" err="1" smtClean="0">
               <a:latin typeface="Courier New" charset="0"/>
               <a:ea typeface="Courier New" charset="0"/>
               <a:cs typeface="Courier New" charset="0"/>
             </a:rPr>
             <a:t>resource.rb</a:t>
           </a:r>
-          <a:endParaRPr lang="en-US" sz="2000" b="1" kern="1200" dirty="0">
+          <a:endParaRPr lang="en-US" sz="1800" b="1" kern="1200" dirty="0">
             <a:latin typeface="Courier New" charset="0"/>
             <a:ea typeface="Courier New" charset="0"/>
             <a:cs typeface="Courier New" charset="0"/>
           </a:endParaRPr>
         </a:p>
         <a:p>
-          <a:pPr marL="228600" lvl="1" indent="-228600" algn="l" defTabSz="889000">
+          <a:pPr marL="171450" lvl="1" indent="-171450" algn="l" defTabSz="800100">
             <a:lnSpc>
               <a:spcPct val="90000"/>
             </a:lnSpc>
@@ -4733,7 +4736,7 @@
             <a:buChar char="••"/>
           </a:pPr>
           <a:r>
-            <a:rPr lang="en-US" sz="2000" b="1" kern="1200" dirty="0" smtClean="0">
+            <a:rPr lang="en-US" sz="1800" b="1" kern="1200" dirty="0" smtClean="0">
               <a:latin typeface="Courier New" charset="0"/>
               <a:ea typeface="Courier New" charset="0"/>
               <a:cs typeface="Courier New" charset="0"/>
@@ -4741,7 +4744,7 @@
             <a:t>[</a:t>
           </a:r>
           <a:r>
-            <a:rPr lang="en-US" sz="2000" b="1" kern="1200" dirty="0" err="1" smtClean="0">
+            <a:rPr lang="en-US" sz="1800" b="1" kern="1200" dirty="0" err="1" smtClean="0">
               <a:latin typeface="Courier New" charset="0"/>
               <a:ea typeface="Courier New" charset="0"/>
               <a:cs typeface="Courier New" charset="0"/>
@@ -4749,7 +4752,7 @@
             <a:t>my_custom_resource</a:t>
           </a:r>
           <a:r>
-            <a:rPr lang="en-US" sz="2000" b="1" kern="1200" dirty="0" smtClean="0">
+            <a:rPr lang="en-US" sz="1800" b="1" kern="1200" dirty="0" smtClean="0">
               <a:latin typeface="Courier New" charset="0"/>
               <a:ea typeface="Courier New" charset="0"/>
               <a:cs typeface="Courier New" charset="0"/>
@@ -4757,14 +4760,14 @@
             <a:t>]_</a:t>
           </a:r>
           <a:r>
-            <a:rPr lang="en-US" sz="2000" b="1" kern="1200" dirty="0" err="1" smtClean="0">
+            <a:rPr lang="en-US" sz="1800" b="1" kern="1200" dirty="0" err="1" smtClean="0">
               <a:latin typeface="Courier New" charset="0"/>
               <a:ea typeface="Courier New" charset="0"/>
               <a:cs typeface="Courier New" charset="0"/>
             </a:rPr>
             <a:t>provider.rb</a:t>
           </a:r>
-          <a:endParaRPr lang="en-US" sz="2000" b="1" kern="1200" dirty="0">
+          <a:endParaRPr lang="en-US" sz="1800" b="1" kern="1200" dirty="0">
             <a:latin typeface="Courier New" charset="0"/>
             <a:ea typeface="Courier New" charset="0"/>
             <a:cs typeface="Courier New" charset="0"/>
@@ -9797,7 +9800,7 @@
               <a:pPr>
                 <a:defRPr/>
               </a:pPr>
-              <a:t>2016-10-10</a:t>
+              <a:t>10/11/16</a:t>
             </a:fld>
             <a:endParaRPr lang="en-US" dirty="0"/>
           </a:p>
@@ -9980,7 +9983,7 @@
               <a:pPr>
                 <a:defRPr/>
               </a:pPr>
-              <a:t>2016-10-10</a:t>
+              <a:t>10/11/16</a:t>
             </a:fld>
             <a:endParaRPr lang="en-US" dirty="0"/>
           </a:p>
@@ -10600,7 +10603,7 @@
             </a:pPr>
             <a:r>
               <a:rPr lang="en-US" baseline="0" dirty="0" smtClean="0"/>
-              <a:t>Definitions behaves like a compile time macro that is reusable across recipes. Macros all you to write a small amount of code that expands out into the contents of the definition wherever it is found within the recipes. With a definition you give it a name, provide parameters, and specify a block of code.</a:t>
+              <a:t>HWRP are incredibly useful when you need the full power of Ruby to implement your own resource. However, they come at the cost of understanding a number of Object-Oriented Programming techniques and the Ruby language. When exploring community cookbooks you may find examples of these resources in use.</a:t>
             </a:r>
           </a:p>
         </p:txBody>
@@ -10681,7 +10684,7 @@
     </p:spTree>
     <p:extLst>
       <p:ext uri="{BB962C8B-B14F-4D97-AF65-F5344CB8AC3E}">
-        <p14:creationId xmlns:p14="http://schemas.microsoft.com/office/powerpoint/2010/main" val="331095006"/>
+        <p14:creationId xmlns:p14="http://schemas.microsoft.com/office/powerpoint/2010/main" val="168007384"/>
       </p:ext>
     </p:extLst>
   </p:cSld>
@@ -10754,7 +10757,7 @@
             </a:pPr>
             <a:r>
               <a:rPr lang="en-US" baseline="0" dirty="0" smtClean="0"/>
-              <a:t>The code that defines the definition is stored within a definitions directory in a Ruby file that is processed with the definition Domain Specific Language.</a:t>
+              <a:t>Definitions behaves like a compile time macro that is reusable across recipes. Macros all you to write a small amount of code that expands out into the contents of the definition wherever it is found within the recipes. With a definition you give it a name, provide parameters, and specify a block of code.</a:t>
             </a:r>
           </a:p>
         </p:txBody>
@@ -10835,7 +10838,7 @@
     </p:spTree>
     <p:extLst>
       <p:ext uri="{BB962C8B-B14F-4D97-AF65-F5344CB8AC3E}">
-        <p14:creationId xmlns:p14="http://schemas.microsoft.com/office/powerpoint/2010/main" val="1601707274"/>
+        <p14:creationId xmlns:p14="http://schemas.microsoft.com/office/powerpoint/2010/main" val="331095006"/>
       </p:ext>
     </p:extLst>
   </p:cSld>
@@ -10908,31 +10911,7 @@
             </a:pPr>
             <a:r>
               <a:rPr lang="en-US" baseline="0" dirty="0" smtClean="0"/>
-              <a:t>When creating a definition you specify a name and a hash of any parameters you wish to provide. Within the definition the parameters are retrievable from a hash named </a:t>
-            </a:r>
-            <a:r>
-              <a:rPr lang="en-US" baseline="0" dirty="0" err="1" smtClean="0"/>
-              <a:t>params</a:t>
-            </a:r>
-            <a:r>
-              <a:rPr lang="en-US" baseline="0" dirty="0" smtClean="0"/>
-              <a:t>. The use of the definition within a recipe looks similar to a resource but that is not the case. Definitions cannot notify other resources, subscribe to notifications from other resources, (i.e. `notifies` and `subscribes`) and cannot employ guards (i.e. `</a:t>
-            </a:r>
-            <a:r>
-              <a:rPr lang="en-US" baseline="0" dirty="0" err="1" smtClean="0"/>
-              <a:t>only_if</a:t>
-            </a:r>
-            <a:r>
-              <a:rPr lang="en-US" baseline="0" dirty="0" smtClean="0"/>
-              <a:t>` and `</a:t>
-            </a:r>
-            <a:r>
-              <a:rPr lang="en-US" baseline="0" dirty="0" err="1" smtClean="0"/>
-              <a:t>not_if</a:t>
-            </a:r>
-            <a:r>
-              <a:rPr lang="en-US" baseline="0" dirty="0" smtClean="0"/>
-              <a:t>`).</a:t>
+              <a:t>The code that defines the definition is stored within a definitions directory in a Ruby file that is processed with the definition Domain Specific Language.</a:t>
             </a:r>
           </a:p>
         </p:txBody>
@@ -11013,7 +10992,7 @@
     </p:spTree>
     <p:extLst>
       <p:ext uri="{BB962C8B-B14F-4D97-AF65-F5344CB8AC3E}">
-        <p14:creationId xmlns:p14="http://schemas.microsoft.com/office/powerpoint/2010/main" val="807310503"/>
+        <p14:creationId xmlns:p14="http://schemas.microsoft.com/office/powerpoint/2010/main" val="1601707274"/>
       </p:ext>
     </p:extLst>
   </p:cSld>
@@ -11086,15 +11065,31 @@
             </a:pPr>
             <a:r>
               <a:rPr lang="en-US" baseline="0" dirty="0" smtClean="0"/>
-              <a:t>Definitions shipped </a:t>
+              <a:t>When creating a definition you specify a name and a hash of any parameters you wish to provide. Within the definition the parameters are retrievable from a hash named </a:t>
+            </a:r>
+            <a:r>
+              <a:rPr lang="en-US" baseline="0" dirty="0" err="1" smtClean="0"/>
+              <a:t>params</a:t>
             </a:r>
             <a:r>
               <a:rPr lang="en-US" baseline="0" dirty="0" smtClean="0"/>
-              <a:t>in some of the earliest versions of </a:t>
+              <a:t>. The use of the definition within a recipe looks similar to a resource but that is not the case. Definitions cannot notify other resources, subscribe to notifications from other resources, (i.e. `notifies` and `subscribes`) and cannot employ guards (i.e. `</a:t>
+            </a:r>
+            <a:r>
+              <a:rPr lang="en-US" baseline="0" dirty="0" err="1" smtClean="0"/>
+              <a:t>only_if</a:t>
             </a:r>
             <a:r>
               <a:rPr lang="en-US" baseline="0" dirty="0" smtClean="0"/>
-              <a:t>Chef and are still supported today. However, as of Chef 12.5 it is strongly recommended that you choose a solution built with custom resources.</a:t>
+              <a:t>` and `</a:t>
+            </a:r>
+            <a:r>
+              <a:rPr lang="en-US" baseline="0" dirty="0" err="1" smtClean="0"/>
+              <a:t>not_if</a:t>
+            </a:r>
+            <a:r>
+              <a:rPr lang="en-US" baseline="0" dirty="0" smtClean="0"/>
+              <a:t>`).</a:t>
             </a:r>
           </a:p>
         </p:txBody>
@@ -11175,7 +11170,7 @@
     </p:spTree>
     <p:extLst>
       <p:ext uri="{BB962C8B-B14F-4D97-AF65-F5344CB8AC3E}">
-        <p14:creationId xmlns:p14="http://schemas.microsoft.com/office/powerpoint/2010/main" val="1027068307"/>
+        <p14:creationId xmlns:p14="http://schemas.microsoft.com/office/powerpoint/2010/main" val="807310503"/>
       </p:ext>
     </p:extLst>
   </p:cSld>
@@ -11248,72 +11243,8 @@
             </a:pPr>
             <a:r>
               <a:rPr lang="en-US" baseline="0" dirty="0" smtClean="0"/>
-              <a:t>Light-Weight Resource-Provider, or LWRP, are Chef resources defined in </a:t>
-            </a:r>
-            <a:r>
-              <a:rPr lang="en-US" baseline="0" dirty="0" smtClean="0"/>
-              <a:t>two Domain </a:t>
-            </a:r>
-            <a:r>
-              <a:rPr lang="en-US" baseline="0" dirty="0" smtClean="0"/>
-              <a:t>Specific </a:t>
-            </a:r>
-            <a:r>
-              <a:rPr lang="en-US" baseline="0" dirty="0" smtClean="0"/>
-              <a:t>Languages </a:t>
-            </a:r>
-            <a:r>
-              <a:rPr lang="en-US" baseline="0" dirty="0" smtClean="0"/>
-              <a:t>(DSL) that allow you to create resources without having to understand the complexity presented by HWRP.</a:t>
-            </a:r>
-          </a:p>
-          <a:p>
-            <a:pPr marL="0" marR="0" indent="0" algn="l" defTabSz="1217613" rtl="0" eaLnBrk="1" fontAlgn="base" latinLnBrk="0" hangingPunct="1">
-              <a:lnSpc>
-                <a:spcPct val="90000"/>
-              </a:lnSpc>
-              <a:spcBef>
-                <a:spcPct val="30000"/>
-              </a:spcBef>
-              <a:spcAft>
-                <a:spcPts val="450"/>
-              </a:spcAft>
-              <a:buClrTx/>
-              <a:buSzTx/>
-              <a:buFontTx/>
-              <a:buNone/>
-              <a:tabLst/>
-              <a:defRPr/>
-            </a:pPr>
-            <a:endParaRPr lang="en-US" baseline="0" dirty="0" smtClean="0"/>
-          </a:p>
-          <a:p>
-            <a:pPr marL="0" marR="0" indent="0" algn="l" defTabSz="1217613" rtl="0" eaLnBrk="1" fontAlgn="base" latinLnBrk="0" hangingPunct="1">
-              <a:lnSpc>
-                <a:spcPct val="90000"/>
-              </a:lnSpc>
-              <a:spcBef>
-                <a:spcPct val="30000"/>
-              </a:spcBef>
-              <a:spcAft>
-                <a:spcPts val="450"/>
-              </a:spcAft>
-              <a:buClrTx/>
-              <a:buSzTx/>
-              <a:buFontTx/>
-              <a:buNone/>
-              <a:tabLst/>
-              <a:defRPr/>
-            </a:pPr>
-            <a:r>
-              <a:rPr lang="en-US" baseline="0" dirty="0" smtClean="0"/>
-              <a:t>An LWRP is as much a resource as the core resources defined in </a:t>
-            </a:r>
-            <a:r>
-              <a:rPr lang="en-US" baseline="0" dirty="0" smtClean="0"/>
-              <a:t>Chef. The resource and the provider is parsed and converted into Ruby objects.</a:t>
-            </a:r>
-            <a:endParaRPr lang="en-US" baseline="0" dirty="0" smtClean="0"/>
+              <a:t>Definitions shipped in some of the earliest versions of Chef and are still supported today. However, as of Chef 12.5 it is strongly recommended that you choose a solution built with custom resources.</a:t>
+            </a:r>
           </a:p>
         </p:txBody>
       </p:sp>
@@ -11393,7 +11324,7 @@
     </p:spTree>
     <p:extLst>
       <p:ext uri="{BB962C8B-B14F-4D97-AF65-F5344CB8AC3E}">
-        <p14:creationId xmlns:p14="http://schemas.microsoft.com/office/powerpoint/2010/main" val="948129442"/>
+        <p14:creationId xmlns:p14="http://schemas.microsoft.com/office/powerpoint/2010/main" val="1027068307"/>
       </p:ext>
     </p:extLst>
   </p:cSld>
@@ -11466,7 +11397,7 @@
             </a:pPr>
             <a:r>
               <a:rPr lang="en-US" baseline="0" dirty="0" smtClean="0"/>
-              <a:t> A single LWRP definition is defined in two separate files. The file is named exactly the same but one file resides in the 'resources' directory; the other in the 'providers' directory. Both of these files are parsed after the cookbook is synchronized and loaded. Each file's DSL is then converted into Ruby class at runtime.</a:t>
+              <a:t>Light-Weight Resource-Provider, or LWRP, are Chef resources defined in two Domain Specific Languages (DSL) that allow you to create resources without having to understand the complexity presented by HWRP.</a:t>
             </a:r>
           </a:p>
           <a:p>
@@ -11509,23 +11440,7 @@
             </a:pPr>
             <a:r>
               <a:rPr lang="en-US" baseline="0" dirty="0" smtClean="0"/>
-              <a:t>Within </a:t>
-            </a:r>
-            <a:r>
-              <a:rPr lang="en-US" baseline="0" dirty="0" smtClean="0"/>
-              <a:t>the file in the 'resources' directory you define the interface for the custom resource. There, within a resource DSL, you can specify a name of the resource, the list of available actions, the default action, and the properties that may be set for the </a:t>
-            </a:r>
-            <a:r>
-              <a:rPr lang="en-US" baseline="0" dirty="0" smtClean="0"/>
-              <a:t>resource. Within </a:t>
-            </a:r>
-            <a:r>
-              <a:rPr lang="en-US" baseline="0" dirty="0" smtClean="0"/>
-              <a:t>the file in the 'providers' directory you define the implementation for the custom resource. There, within a provider DSL, you specify what happens when an action is chosen</a:t>
-            </a:r>
-            <a:r>
-              <a:rPr lang="en-US" baseline="0" dirty="0" smtClean="0"/>
-              <a:t>.</a:t>
+              <a:t>An LWRP is as much a resource as the core resources defined in Chef. The resource and the provider is parsed and converted into Ruby objects.</a:t>
             </a:r>
           </a:p>
         </p:txBody>
@@ -11606,7 +11521,7 @@
     </p:spTree>
     <p:extLst>
       <p:ext uri="{BB962C8B-B14F-4D97-AF65-F5344CB8AC3E}">
-        <p14:creationId xmlns:p14="http://schemas.microsoft.com/office/powerpoint/2010/main" val="1447606755"/>
+        <p14:creationId xmlns:p14="http://schemas.microsoft.com/office/powerpoint/2010/main" val="948129442"/>
       </p:ext>
     </p:extLst>
   </p:cSld>
@@ -11679,9 +11594,51 @@
             </a:pPr>
             <a:r>
               <a:rPr lang="en-US" baseline="0" dirty="0" smtClean="0"/>
-              <a:t>Within the resources file you specify the available actions, the default action, and the supported attributes that can be used when specifying the resource.</a:t>
-            </a:r>
+              <a:t> A single LWRP definition is defined in two separate files. The file is named exactly the same but one file resides in the 'resources' directory; the other in the 'providers' directory. Both of these files are parsed after the cookbook is synchronized and loaded. Each file's DSL is then converted into Ruby class at runtime.</a:t>
+            </a:r>
+          </a:p>
+          <a:p>
+            <a:pPr marL="0" marR="0" indent="0" algn="l" defTabSz="1217613" rtl="0" eaLnBrk="1" fontAlgn="base" latinLnBrk="0" hangingPunct="1">
+              <a:lnSpc>
+                <a:spcPct val="90000"/>
+              </a:lnSpc>
+              <a:spcBef>
+                <a:spcPct val="30000"/>
+              </a:spcBef>
+              <a:spcAft>
+                <a:spcPts val="450"/>
+              </a:spcAft>
+              <a:buClrTx/>
+              <a:buSzTx/>
+              <a:buFontTx/>
+              <a:buNone/>
+              <a:tabLst/>
+              <a:defRPr/>
+            </a:pPr>
             <a:endParaRPr lang="en-US" baseline="0" dirty="0" smtClean="0"/>
+          </a:p>
+          <a:p>
+            <a:pPr marL="0" marR="0" indent="0" algn="l" defTabSz="1217613" rtl="0" eaLnBrk="1" fontAlgn="base" latinLnBrk="0" hangingPunct="1">
+              <a:lnSpc>
+                <a:spcPct val="90000"/>
+              </a:lnSpc>
+              <a:spcBef>
+                <a:spcPct val="30000"/>
+              </a:spcBef>
+              <a:spcAft>
+                <a:spcPts val="450"/>
+              </a:spcAft>
+              <a:buClrTx/>
+              <a:buSzTx/>
+              <a:buFontTx/>
+              <a:buNone/>
+              <a:tabLst/>
+              <a:defRPr/>
+            </a:pPr>
+            <a:r>
+              <a:rPr lang="en-US" baseline="0" dirty="0" smtClean="0"/>
+              <a:t>Within the file in the 'resources' directory you define the interface for the custom resource. There, within a resource DSL, you can specify a name of the resource, the list of available actions, the default action, and the properties that may be set for the resource. Within the file in the 'providers' directory you define the implementation for the custom resource. There, within a provider DSL, you specify what happens when an action is chosen.</a:t>
+            </a:r>
           </a:p>
         </p:txBody>
       </p:sp>
@@ -11761,7 +11718,7 @@
     </p:spTree>
     <p:extLst>
       <p:ext uri="{BB962C8B-B14F-4D97-AF65-F5344CB8AC3E}">
-        <p14:creationId xmlns:p14="http://schemas.microsoft.com/office/powerpoint/2010/main" val="1404038465"/>
+        <p14:creationId xmlns:p14="http://schemas.microsoft.com/office/powerpoint/2010/main" val="1447606755"/>
       </p:ext>
     </p:extLst>
   </p:cSld>
@@ -11834,15 +11791,7 @@
             </a:pPr>
             <a:r>
               <a:rPr lang="en-US" baseline="0" dirty="0" smtClean="0"/>
-              <a:t>Within the provider definition you specify action blocks for each of the actions defined in the resource file. Within the action you specify resources as if you are defining a small recipe. The attributes defined for the resource are available within the action through a local variable or method named '</a:t>
-            </a:r>
-            <a:r>
-              <a:rPr lang="en-US" baseline="0" dirty="0" err="1" smtClean="0"/>
-              <a:t>new_resource</a:t>
-            </a:r>
-            <a:r>
-              <a:rPr lang="en-US" baseline="0" dirty="0" smtClean="0"/>
-              <a:t>'.</a:t>
+              <a:t>Within the resources file you specify the available actions, the default action, and the supported attributes that can be used when specifying the resource.</a:t>
             </a:r>
           </a:p>
         </p:txBody>
@@ -11923,7 +11872,7 @@
     </p:spTree>
     <p:extLst>
       <p:ext uri="{BB962C8B-B14F-4D97-AF65-F5344CB8AC3E}">
-        <p14:creationId xmlns:p14="http://schemas.microsoft.com/office/powerpoint/2010/main" val="416487289"/>
+        <p14:creationId xmlns:p14="http://schemas.microsoft.com/office/powerpoint/2010/main" val="1404038465"/>
       </p:ext>
     </p:extLst>
   </p:cSld>
@@ -11996,7 +11945,15 @@
             </a:pPr>
             <a:r>
               <a:rPr lang="en-US" baseline="0" dirty="0" smtClean="0"/>
-              <a:t>Implementing resources with LWRP is not the favored way to develop a resource in later versions of Chef (Chef 12.5). However, they are still in wide use within older cookbooks like those found within the Chef Supermarket.</a:t>
+              <a:t>Within the provider definition you specify action blocks for each of the actions defined in the resource file. Within the action you specify resources as if you are defining a small recipe. The attributes defined for the resource are available within the action through a local variable or method named '</a:t>
+            </a:r>
+            <a:r>
+              <a:rPr lang="en-US" baseline="0" dirty="0" err="1" smtClean="0"/>
+              <a:t>new_resource</a:t>
+            </a:r>
+            <a:r>
+              <a:rPr lang="en-US" baseline="0" dirty="0" smtClean="0"/>
+              <a:t>'.</a:t>
             </a:r>
           </a:p>
         </p:txBody>
@@ -12077,7 +12034,7 @@
     </p:spTree>
     <p:extLst>
       <p:ext uri="{BB962C8B-B14F-4D97-AF65-F5344CB8AC3E}">
-        <p14:creationId xmlns:p14="http://schemas.microsoft.com/office/powerpoint/2010/main" val="330769027"/>
+        <p14:creationId xmlns:p14="http://schemas.microsoft.com/office/powerpoint/2010/main" val="416487289"/>
       </p:ext>
     </p:extLst>
   </p:cSld>
@@ -12150,7 +12107,7 @@
             </a:pPr>
             <a:r>
               <a:rPr lang="en-US" baseline="0" dirty="0" smtClean="0"/>
-              <a:t>Custom Resources are Chef resources defined in a Domain Specific Language (DSL) that allow you to create resources without having to understand the complexity presented by HWRP. At its core it is a simplification of the work done with LWRP.</a:t>
+              <a:t>The name of the cookbook is combined with the name of the resource/provider file name with an underscore to create the user defined resource. This was explicitly defined in the HWRP but is automatically generated.</a:t>
             </a:r>
           </a:p>
           <a:p>
@@ -12193,8 +12150,9 @@
             </a:pPr>
             <a:r>
               <a:rPr lang="en-US" baseline="0" dirty="0" smtClean="0"/>
-              <a:t>An custom resource is as much a resource as the core resources defined in Chef. A custom resource definition is defined in a single file that resides in the 'resources' directory. This file is parsed after the cookbook is synchronized and loaded. The custom resource DSL is then converted into Ruby class at runtime.</a:t>
-            </a:r>
+              <a:t>Otherwise this is the same results as the one defined by the HWRP.</a:t>
+            </a:r>
+            <a:endParaRPr lang="en-US" baseline="0" dirty="0" smtClean="0"/>
           </a:p>
         </p:txBody>
       </p:sp>
@@ -12274,7 +12232,7 @@
     </p:spTree>
     <p:extLst>
       <p:ext uri="{BB962C8B-B14F-4D97-AF65-F5344CB8AC3E}">
-        <p14:creationId xmlns:p14="http://schemas.microsoft.com/office/powerpoint/2010/main" val="2075313391"/>
+        <p14:creationId xmlns:p14="http://schemas.microsoft.com/office/powerpoint/2010/main" val="416487289"/>
       </p:ext>
     </p:extLst>
   </p:cSld>
@@ -12505,7 +12463,7 @@
             </a:pPr>
             <a:r>
               <a:rPr lang="en-US" baseline="0" dirty="0" smtClean="0"/>
-              <a:t>Within the file in the 'resources' directory you define the interface and the implementation for the custom resource. This is written in a custom resource DSL where you can specify the name of the resource, the default action, the properties that may be set, and all the actions that the resource supports.</a:t>
+              <a:t>Implementing resources with LWRP is not the favored way to develop a resource in later versions of Chef (Chef 12.5). However, they are still in wide use within older cookbooks like those found within the Chef Supermarket.</a:t>
             </a:r>
           </a:p>
         </p:txBody>
@@ -12586,7 +12544,7 @@
     </p:spTree>
     <p:extLst>
       <p:ext uri="{BB962C8B-B14F-4D97-AF65-F5344CB8AC3E}">
-        <p14:creationId xmlns:p14="http://schemas.microsoft.com/office/powerpoint/2010/main" val="335080308"/>
+        <p14:creationId xmlns:p14="http://schemas.microsoft.com/office/powerpoint/2010/main" val="330769027"/>
       </p:ext>
     </p:extLst>
   </p:cSld>
@@ -12659,17 +12617,51 @@
             </a:pPr>
             <a:r>
               <a:rPr lang="en-US" baseline="0" dirty="0" smtClean="0"/>
-              <a:t>The custom resource implementation is similar to the LWRP except all of the details that describe the resource are combined into a single file. The custom resource DSL is similar to one defined for the LWRP resource and LWRP provider DSL. It is an evolution of the LWRP implementation with some minor changes. The attributes are instead called properties and when used within the action implementations they no longer require the '</a:t>
-            </a:r>
-            <a:r>
-              <a:rPr lang="en-US" baseline="0" dirty="0" err="1" smtClean="0"/>
-              <a:t>new_resource</a:t>
-            </a:r>
+              <a:t>Custom Resources are Chef resources defined in a Domain Specific Language (DSL) that allow you to create resources without having to understand the complexity presented by HWRP. At its core it is a simplification of the work done with LWRP.</a:t>
+            </a:r>
+          </a:p>
+          <a:p>
+            <a:pPr marL="0" marR="0" indent="0" algn="l" defTabSz="1217613" rtl="0" eaLnBrk="1" fontAlgn="base" latinLnBrk="0" hangingPunct="1">
+              <a:lnSpc>
+                <a:spcPct val="90000"/>
+              </a:lnSpc>
+              <a:spcBef>
+                <a:spcPct val="30000"/>
+              </a:spcBef>
+              <a:spcAft>
+                <a:spcPts val="450"/>
+              </a:spcAft>
+              <a:buClrTx/>
+              <a:buSzTx/>
+              <a:buFontTx/>
+              <a:buNone/>
+              <a:tabLst/>
+              <a:defRPr/>
+            </a:pPr>
+            <a:endParaRPr lang="en-US" baseline="0" dirty="0" smtClean="0"/>
+          </a:p>
+          <a:p>
+            <a:pPr marL="0" marR="0" indent="0" algn="l" defTabSz="1217613" rtl="0" eaLnBrk="1" fontAlgn="base" latinLnBrk="0" hangingPunct="1">
+              <a:lnSpc>
+                <a:spcPct val="90000"/>
+              </a:lnSpc>
+              <a:spcBef>
+                <a:spcPct val="30000"/>
+              </a:spcBef>
+              <a:spcAft>
+                <a:spcPts val="450"/>
+              </a:spcAft>
+              <a:buClrTx/>
+              <a:buSzTx/>
+              <a:buFontTx/>
+              <a:buNone/>
+              <a:tabLst/>
+              <a:defRPr/>
+            </a:pPr>
             <a:r>
               <a:rPr lang="en-US" baseline="0" dirty="0" smtClean="0"/>
-              <a:t>' local variable or method.</a:t>
-            </a:r>
-            <a:endParaRPr lang="en-US" baseline="0" dirty="0" smtClean="0"/>
+              <a:t>An custom resource is as much a resource as the core resources defined in Chef. A custom resource definition is defined in a single file that resides in the 'resources' directory. This file is parsed after the cookbook is synchronized and loaded. The custom resource DSL is then converted into Ruby class at runtime.</a:t>
+            </a:r>
           </a:p>
         </p:txBody>
       </p:sp>
@@ -12749,7 +12741,7 @@
     </p:spTree>
     <p:extLst>
       <p:ext uri="{BB962C8B-B14F-4D97-AF65-F5344CB8AC3E}">
-        <p14:creationId xmlns:p14="http://schemas.microsoft.com/office/powerpoint/2010/main" val="1212578558"/>
+        <p14:creationId xmlns:p14="http://schemas.microsoft.com/office/powerpoint/2010/main" val="2075313391"/>
       </p:ext>
     </p:extLst>
   </p:cSld>
@@ -12822,21 +12814,8 @@
             </a:pPr>
             <a:r>
               <a:rPr lang="en-US" baseline="0" dirty="0" smtClean="0"/>
-              <a:t>Implementing resources with a custom resource is the current favored way to develop a resource for versions of Chef </a:t>
-            </a:r>
-            <a:r>
-              <a:rPr lang="en-US" baseline="0" dirty="0" smtClean="0"/>
-              <a:t>12.5.X </a:t>
-            </a:r>
-            <a:r>
-              <a:rPr lang="en-US" baseline="0" dirty="0" smtClean="0"/>
-              <a:t>or greater</a:t>
-            </a:r>
-            <a:r>
-              <a:rPr lang="en-US" baseline="0" dirty="0" smtClean="0"/>
-              <a:t>. They are easier to implement than a pure Ruby implementation and are defined in a single file compared to the LWRP implementation.</a:t>
-            </a:r>
-            <a:endParaRPr lang="en-US" baseline="0" dirty="0" smtClean="0"/>
+              <a:t>Within the file in the 'resources' directory you define the interface and the implementation for the custom resource. This is written in a custom resource DSL where you can specify the name of the resource, the default action, the properties that may be set, and all the actions that the resource supports.</a:t>
+            </a:r>
           </a:p>
         </p:txBody>
       </p:sp>
@@ -12916,7 +12895,7 @@
     </p:spTree>
     <p:extLst>
       <p:ext uri="{BB962C8B-B14F-4D97-AF65-F5344CB8AC3E}">
-        <p14:creationId xmlns:p14="http://schemas.microsoft.com/office/powerpoint/2010/main" val="1007491995"/>
+        <p14:creationId xmlns:p14="http://schemas.microsoft.com/office/powerpoint/2010/main" val="335080308"/>
       </p:ext>
     </p:extLst>
   </p:cSld>
@@ -12970,11 +12949,39 @@
           <a:bodyPr/>
           <a:lstStyle/>
           <a:p>
-            <a:r>
-              <a:rPr lang="en-US" dirty="0" smtClean="0"/>
-              <a:t>As you can see there are more than a few ways to extend Chef and create a resource or resource-like implementation within your recipes.</a:t>
-            </a:r>
-            <a:endParaRPr lang="en-US" dirty="0"/>
+            <a:pPr marL="0" marR="0" indent="0" algn="l" defTabSz="1217613" rtl="0" eaLnBrk="1" fontAlgn="base" latinLnBrk="0" hangingPunct="1">
+              <a:lnSpc>
+                <a:spcPct val="90000"/>
+              </a:lnSpc>
+              <a:spcBef>
+                <a:spcPct val="30000"/>
+              </a:spcBef>
+              <a:spcAft>
+                <a:spcPts val="450"/>
+              </a:spcAft>
+              <a:buClrTx/>
+              <a:buSzTx/>
+              <a:buFontTx/>
+              <a:buNone/>
+              <a:tabLst/>
+              <a:defRPr/>
+            </a:pPr>
+            <a:r>
+              <a:rPr lang="en-US" baseline="0" dirty="0" smtClean="0"/>
+              <a:t>The custom resource implementation is similar to the LWRP except all of the details that describe the resource are combined into a single file. The custom resource DSL is similar to one defined for the LWRP resource and LWRP provider DSL. It is an evolution of the LWRP implementation with some minor changes. The attributes are instead called properties and when used within the action implementations they no longer require the '</a:t>
+            </a:r>
+            <a:r>
+              <a:rPr lang="en-US" baseline="0" dirty="0" err="1" smtClean="0"/>
+              <a:t>new_resource</a:t>
+            </a:r>
+            <a:r>
+              <a:rPr lang="en-US" baseline="0" dirty="0" smtClean="0"/>
+              <a:t>' local variable or method</a:t>
+            </a:r>
+            <a:r>
+              <a:rPr lang="en-US" baseline="0" dirty="0" smtClean="0"/>
+              <a:t>. The default action is assumed to be the first action defined in this file: create.</a:t>
+            </a:r>
           </a:p>
         </p:txBody>
       </p:sp>
@@ -13054,7 +13061,7 @@
     </p:spTree>
     <p:extLst>
       <p:ext uri="{BB962C8B-B14F-4D97-AF65-F5344CB8AC3E}">
-        <p14:creationId xmlns:p14="http://schemas.microsoft.com/office/powerpoint/2010/main" val="707292226"/>
+        <p14:creationId xmlns:p14="http://schemas.microsoft.com/office/powerpoint/2010/main" val="1212578558"/>
       </p:ext>
     </p:extLst>
   </p:cSld>
@@ -13108,23 +13115,70 @@
           <a:bodyPr/>
           <a:lstStyle/>
           <a:p>
+            <a:pPr marL="0" marR="0" indent="0" algn="l" defTabSz="1217613" rtl="0" eaLnBrk="1" fontAlgn="base" latinLnBrk="0" hangingPunct="1">
+              <a:lnSpc>
+                <a:spcPct val="90000"/>
+              </a:lnSpc>
+              <a:spcBef>
+                <a:spcPct val="30000"/>
+              </a:spcBef>
+              <a:spcAft>
+                <a:spcPts val="450"/>
+              </a:spcAft>
+              <a:buClrTx/>
+              <a:buSzTx/>
+              <a:buFontTx/>
+              <a:buNone/>
+              <a:tabLst/>
+              <a:defRPr/>
+            </a:pPr>
             <a:r>
               <a:rPr lang="en-US" baseline="0" dirty="0" smtClean="0"/>
-              <a:t>As a group, let's answer these questions.</a:t>
-            </a:r>
-          </a:p>
-          <a:p>
+              <a:t>The result is the same here as the HWRP and LWRP. </a:t>
+            </a:r>
+          </a:p>
+          <a:p>
+            <a:pPr marL="0" marR="0" indent="0" algn="l" defTabSz="1217613" rtl="0" eaLnBrk="1" fontAlgn="base" latinLnBrk="0" hangingPunct="1">
+              <a:lnSpc>
+                <a:spcPct val="90000"/>
+              </a:lnSpc>
+              <a:spcBef>
+                <a:spcPct val="30000"/>
+              </a:spcBef>
+              <a:spcAft>
+                <a:spcPts val="450"/>
+              </a:spcAft>
+              <a:buClrTx/>
+              <a:buSzTx/>
+              <a:buFontTx/>
+              <a:buNone/>
+              <a:tabLst/>
+              <a:defRPr/>
+            </a:pPr>
             <a:endParaRPr lang="en-US" baseline="0" dirty="0" smtClean="0"/>
           </a:p>
           <a:p>
+            <a:pPr marL="0" marR="0" indent="0" algn="l" defTabSz="1217613" rtl="0" eaLnBrk="1" fontAlgn="base" latinLnBrk="0" hangingPunct="1">
+              <a:lnSpc>
+                <a:spcPct val="90000"/>
+              </a:lnSpc>
+              <a:spcBef>
+                <a:spcPct val="30000"/>
+              </a:spcBef>
+              <a:spcAft>
+                <a:spcPts val="450"/>
+              </a:spcAft>
+              <a:buClrTx/>
+              <a:buSzTx/>
+              <a:buFontTx/>
+              <a:buNone/>
+              <a:tabLst/>
+              <a:defRPr/>
+            </a:pPr>
             <a:r>
               <a:rPr lang="en-US" baseline="0" dirty="0" smtClean="0"/>
-              <a:t>Instructor Note: With large groups I often find it better to have individuals turn to the individuals around them, form groups of whatever size they feel comfortable, and have them take turns asking and answering the questions. When all the groups are done I then open the discussion up to the entire group allowing each group or individuals to share their answers.</a:t>
-            </a:r>
-            <a:endParaRPr lang="en-US" dirty="0" smtClean="0"/>
-          </a:p>
-          <a:p>
-            <a:endParaRPr lang="en-US" dirty="0"/>
+              <a:t>The default action is determined by the first action listed in the custom resource definition.</a:t>
+            </a:r>
           </a:p>
         </p:txBody>
       </p:sp>
@@ -13204,7 +13258,591 @@
     </p:spTree>
     <p:extLst>
       <p:ext uri="{BB962C8B-B14F-4D97-AF65-F5344CB8AC3E}">
+        <p14:creationId xmlns:p14="http://schemas.microsoft.com/office/powerpoint/2010/main" val="1212578558"/>
+      </p:ext>
+    </p:extLst>
+  </p:cSld>
+  <p:clrMapOvr>
+    <a:masterClrMapping/>
+  </p:clrMapOvr>
+</p:notes>
+</file>
+
+<file path=ppt/notesSlides/notesSlide25.xml><?xml version="1.0" encoding="utf-8"?>
+<p:notes xmlns:a="http://schemas.openxmlformats.org/drawingml/2006/main" xmlns:r="http://schemas.openxmlformats.org/officeDocument/2006/relationships" xmlns:p="http://schemas.openxmlformats.org/presentationml/2006/main">
+  <p:cSld>
+    <p:spTree>
+      <p:nvGrpSpPr>
+        <p:cNvPr id="1" name=""/>
+        <p:cNvGrpSpPr/>
+        <p:nvPr/>
+      </p:nvGrpSpPr>
+      <p:grpSpPr>
+        <a:xfrm>
+          <a:off x="0" y="0"/>
+          <a:ext cx="0" cy="0"/>
+          <a:chOff x="0" y="0"/>
+          <a:chExt cx="0" cy="0"/>
+        </a:xfrm>
+      </p:grpSpPr>
+      <p:sp>
+        <p:nvSpPr>
+          <p:cNvPr id="2" name="Slide Image Placeholder 1"/>
+          <p:cNvSpPr>
+            <a:spLocks noGrp="1" noRot="1" noChangeAspect="1"/>
+          </p:cNvSpPr>
+          <p:nvPr>
+            <p:ph type="sldImg"/>
+          </p:nvPr>
+        </p:nvSpPr>
+        <p:spPr/>
+      </p:sp>
+      <p:sp>
+        <p:nvSpPr>
+          <p:cNvPr id="3" name="Notes Placeholder 2"/>
+          <p:cNvSpPr>
+            <a:spLocks noGrp="1"/>
+          </p:cNvSpPr>
+          <p:nvPr>
+            <p:ph type="body" idx="1"/>
+          </p:nvPr>
+        </p:nvSpPr>
+        <p:spPr/>
+        <p:txBody>
+          <a:bodyPr/>
+          <a:lstStyle/>
+          <a:p>
+            <a:pPr marL="0" marR="0" indent="0" algn="l" defTabSz="1217613" rtl="0" eaLnBrk="1" fontAlgn="base" latinLnBrk="0" hangingPunct="1">
+              <a:lnSpc>
+                <a:spcPct val="90000"/>
+              </a:lnSpc>
+              <a:spcBef>
+                <a:spcPct val="30000"/>
+              </a:spcBef>
+              <a:spcAft>
+                <a:spcPts val="450"/>
+              </a:spcAft>
+              <a:buClrTx/>
+              <a:buSzTx/>
+              <a:buFontTx/>
+              <a:buNone/>
+              <a:tabLst/>
+              <a:defRPr/>
+            </a:pPr>
+            <a:r>
+              <a:rPr lang="en-US" baseline="0" dirty="0" smtClean="0"/>
+              <a:t>Implementing resources with a custom resource is the current favored way to develop a resource for versions of Chef 12.5.X or greater. They are easier to implement than a pure Ruby implementation and are defined in a single file compared to the LWRP implementation.</a:t>
+            </a:r>
+          </a:p>
+        </p:txBody>
+      </p:sp>
+      <p:sp>
+        <p:nvSpPr>
+          <p:cNvPr id="4" name="Slide Number Placeholder 3"/>
+          <p:cNvSpPr>
+            <a:spLocks noGrp="1"/>
+          </p:cNvSpPr>
+          <p:nvPr>
+            <p:ph type="sldNum" sz="quarter" idx="10"/>
+          </p:nvPr>
+        </p:nvSpPr>
+        <p:spPr/>
+        <p:txBody>
+          <a:bodyPr/>
+          <a:lstStyle/>
+          <a:p>
+            <a:pPr>
+              <a:defRPr/>
+            </a:pPr>
+            <a:fld id="{DC3734AA-3150-D947-AC52-2F5DF48BFCD5}" type="slidenum">
+              <a:rPr lang="en-US" smtClean="0"/>
+              <a:pPr>
+                <a:defRPr/>
+              </a:pPr>
+              <a:t>25</a:t>
+            </a:fld>
+            <a:endParaRPr lang="en-US" dirty="0"/>
+          </a:p>
+        </p:txBody>
+      </p:sp>
+      <p:sp>
+        <p:nvSpPr>
+          <p:cNvPr id="5" name="Header Placeholder 4"/>
+          <p:cNvSpPr>
+            <a:spLocks noGrp="1"/>
+          </p:cNvSpPr>
+          <p:nvPr>
+            <p:ph type="hdr" sz="quarter" idx="11"/>
+          </p:nvPr>
+        </p:nvSpPr>
+        <p:spPr/>
+        <p:txBody>
+          <a:bodyPr/>
+          <a:lstStyle/>
+          <a:p>
+            <a:pPr>
+              <a:defRPr/>
+            </a:pPr>
+            <a:endParaRPr lang="en-US"/>
+          </a:p>
+        </p:txBody>
+      </p:sp>
+      <p:sp>
+        <p:nvSpPr>
+          <p:cNvPr id="6" name="Footer Placeholder 5"/>
+          <p:cNvSpPr>
+            <a:spLocks noGrp="1"/>
+          </p:cNvSpPr>
+          <p:nvPr>
+            <p:ph type="ftr" sz="quarter" idx="12"/>
+          </p:nvPr>
+        </p:nvSpPr>
+        <p:spPr/>
+        <p:txBody>
+          <a:bodyPr/>
+          <a:lstStyle/>
+          <a:p>
+            <a:pPr>
+              <a:defRPr/>
+            </a:pPr>
+            <a:endParaRPr lang="en-US"/>
+          </a:p>
+        </p:txBody>
+      </p:sp>
+    </p:spTree>
+    <p:extLst>
+      <p:ext uri="{BB962C8B-B14F-4D97-AF65-F5344CB8AC3E}">
+        <p14:creationId xmlns:p14="http://schemas.microsoft.com/office/powerpoint/2010/main" val="1007491995"/>
+      </p:ext>
+    </p:extLst>
+  </p:cSld>
+  <p:clrMapOvr>
+    <a:masterClrMapping/>
+  </p:clrMapOvr>
+</p:notes>
+</file>
+
+<file path=ppt/notesSlides/notesSlide26.xml><?xml version="1.0" encoding="utf-8"?>
+<p:notes xmlns:a="http://schemas.openxmlformats.org/drawingml/2006/main" xmlns:r="http://schemas.openxmlformats.org/officeDocument/2006/relationships" xmlns:p="http://schemas.openxmlformats.org/presentationml/2006/main">
+  <p:cSld>
+    <p:spTree>
+      <p:nvGrpSpPr>
+        <p:cNvPr id="1" name=""/>
+        <p:cNvGrpSpPr/>
+        <p:nvPr/>
+      </p:nvGrpSpPr>
+      <p:grpSpPr>
+        <a:xfrm>
+          <a:off x="0" y="0"/>
+          <a:ext cx="0" cy="0"/>
+          <a:chOff x="0" y="0"/>
+          <a:chExt cx="0" cy="0"/>
+        </a:xfrm>
+      </p:grpSpPr>
+      <p:sp>
+        <p:nvSpPr>
+          <p:cNvPr id="2" name="Slide Image Placeholder 1"/>
+          <p:cNvSpPr>
+            <a:spLocks noGrp="1" noRot="1" noChangeAspect="1"/>
+          </p:cNvSpPr>
+          <p:nvPr>
+            <p:ph type="sldImg"/>
+          </p:nvPr>
+        </p:nvSpPr>
+        <p:spPr/>
+      </p:sp>
+      <p:sp>
+        <p:nvSpPr>
+          <p:cNvPr id="3" name="Notes Placeholder 2"/>
+          <p:cNvSpPr>
+            <a:spLocks noGrp="1"/>
+          </p:cNvSpPr>
+          <p:nvPr>
+            <p:ph type="body" idx="1"/>
+          </p:nvPr>
+        </p:nvSpPr>
+        <p:spPr/>
+        <p:txBody>
+          <a:bodyPr/>
+          <a:lstStyle/>
+          <a:p>
+            <a:r>
+              <a:rPr lang="en-US" dirty="0" smtClean="0"/>
+              <a:t>As you can see there are more than a few ways to extend Chef and create a resource or resource-like implementation within your recipes.</a:t>
+            </a:r>
+            <a:endParaRPr lang="en-US" dirty="0"/>
+          </a:p>
+        </p:txBody>
+      </p:sp>
+      <p:sp>
+        <p:nvSpPr>
+          <p:cNvPr id="4" name="Slide Number Placeholder 3"/>
+          <p:cNvSpPr>
+            <a:spLocks noGrp="1"/>
+          </p:cNvSpPr>
+          <p:nvPr>
+            <p:ph type="sldNum" sz="quarter" idx="10"/>
+          </p:nvPr>
+        </p:nvSpPr>
+        <p:spPr/>
+        <p:txBody>
+          <a:bodyPr/>
+          <a:lstStyle/>
+          <a:p>
+            <a:pPr>
+              <a:defRPr/>
+            </a:pPr>
+            <a:fld id="{DC3734AA-3150-D947-AC52-2F5DF48BFCD5}" type="slidenum">
+              <a:rPr lang="en-US" smtClean="0"/>
+              <a:pPr>
+                <a:defRPr/>
+              </a:pPr>
+              <a:t>26</a:t>
+            </a:fld>
+            <a:endParaRPr lang="en-US" dirty="0"/>
+          </a:p>
+        </p:txBody>
+      </p:sp>
+      <p:sp>
+        <p:nvSpPr>
+          <p:cNvPr id="5" name="Header Placeholder 4"/>
+          <p:cNvSpPr>
+            <a:spLocks noGrp="1"/>
+          </p:cNvSpPr>
+          <p:nvPr>
+            <p:ph type="hdr" sz="quarter" idx="11"/>
+          </p:nvPr>
+        </p:nvSpPr>
+        <p:spPr/>
+        <p:txBody>
+          <a:bodyPr/>
+          <a:lstStyle/>
+          <a:p>
+            <a:pPr>
+              <a:defRPr/>
+            </a:pPr>
+            <a:endParaRPr lang="en-US"/>
+          </a:p>
+        </p:txBody>
+      </p:sp>
+      <p:sp>
+        <p:nvSpPr>
+          <p:cNvPr id="6" name="Footer Placeholder 5"/>
+          <p:cNvSpPr>
+            <a:spLocks noGrp="1"/>
+          </p:cNvSpPr>
+          <p:nvPr>
+            <p:ph type="ftr" sz="quarter" idx="12"/>
+          </p:nvPr>
+        </p:nvSpPr>
+        <p:spPr/>
+        <p:txBody>
+          <a:bodyPr/>
+          <a:lstStyle/>
+          <a:p>
+            <a:pPr>
+              <a:defRPr/>
+            </a:pPr>
+            <a:endParaRPr lang="en-US"/>
+          </a:p>
+        </p:txBody>
+      </p:sp>
+    </p:spTree>
+    <p:extLst>
+      <p:ext uri="{BB962C8B-B14F-4D97-AF65-F5344CB8AC3E}">
+        <p14:creationId xmlns:p14="http://schemas.microsoft.com/office/powerpoint/2010/main" val="707292226"/>
+      </p:ext>
+    </p:extLst>
+  </p:cSld>
+  <p:clrMapOvr>
+    <a:masterClrMapping/>
+  </p:clrMapOvr>
+</p:notes>
+</file>
+
+<file path=ppt/notesSlides/notesSlide27.xml><?xml version="1.0" encoding="utf-8"?>
+<p:notes xmlns:a="http://schemas.openxmlformats.org/drawingml/2006/main" xmlns:r="http://schemas.openxmlformats.org/officeDocument/2006/relationships" xmlns:p="http://schemas.openxmlformats.org/presentationml/2006/main">
+  <p:cSld>
+    <p:spTree>
+      <p:nvGrpSpPr>
+        <p:cNvPr id="1" name=""/>
+        <p:cNvGrpSpPr/>
+        <p:nvPr/>
+      </p:nvGrpSpPr>
+      <p:grpSpPr>
+        <a:xfrm>
+          <a:off x="0" y="0"/>
+          <a:ext cx="0" cy="0"/>
+          <a:chOff x="0" y="0"/>
+          <a:chExt cx="0" cy="0"/>
+        </a:xfrm>
+      </p:grpSpPr>
+      <p:sp>
+        <p:nvSpPr>
+          <p:cNvPr id="2" name="Slide Image Placeholder 1"/>
+          <p:cNvSpPr>
+            <a:spLocks noGrp="1" noRot="1" noChangeAspect="1"/>
+          </p:cNvSpPr>
+          <p:nvPr>
+            <p:ph type="sldImg"/>
+          </p:nvPr>
+        </p:nvSpPr>
+        <p:spPr/>
+      </p:sp>
+      <p:sp>
+        <p:nvSpPr>
+          <p:cNvPr id="3" name="Notes Placeholder 2"/>
+          <p:cNvSpPr>
+            <a:spLocks noGrp="1"/>
+          </p:cNvSpPr>
+          <p:nvPr>
+            <p:ph type="body" idx="1"/>
+          </p:nvPr>
+        </p:nvSpPr>
+        <p:spPr/>
+        <p:txBody>
+          <a:bodyPr/>
+          <a:lstStyle/>
+          <a:p>
+            <a:r>
+              <a:rPr lang="en-US" baseline="0" dirty="0" smtClean="0"/>
+              <a:t>As a group, let's answer these questions.</a:t>
+            </a:r>
+          </a:p>
+          <a:p>
+            <a:endParaRPr lang="en-US" baseline="0" dirty="0" smtClean="0"/>
+          </a:p>
+          <a:p>
+            <a:r>
+              <a:rPr lang="en-US" baseline="0" dirty="0" smtClean="0"/>
+              <a:t>Instructor Note: With large groups I often find it better to have individuals turn to the individuals around them, form groups of whatever size they feel comfortable, and have them take turns asking and answering the questions. When all the groups are done I then open the discussion up to the entire group allowing each group or individuals to share their answers.</a:t>
+            </a:r>
+            <a:endParaRPr lang="en-US" dirty="0" smtClean="0"/>
+          </a:p>
+          <a:p>
+            <a:endParaRPr lang="en-US" dirty="0"/>
+          </a:p>
+        </p:txBody>
+      </p:sp>
+      <p:sp>
+        <p:nvSpPr>
+          <p:cNvPr id="4" name="Slide Number Placeholder 3"/>
+          <p:cNvSpPr>
+            <a:spLocks noGrp="1"/>
+          </p:cNvSpPr>
+          <p:nvPr>
+            <p:ph type="sldNum" sz="quarter" idx="10"/>
+          </p:nvPr>
+        </p:nvSpPr>
+        <p:spPr/>
+        <p:txBody>
+          <a:bodyPr/>
+          <a:lstStyle/>
+          <a:p>
+            <a:pPr>
+              <a:defRPr/>
+            </a:pPr>
+            <a:fld id="{DC3734AA-3150-D947-AC52-2F5DF48BFCD5}" type="slidenum">
+              <a:rPr lang="en-US" smtClean="0"/>
+              <a:pPr>
+                <a:defRPr/>
+              </a:pPr>
+              <a:t>27</a:t>
+            </a:fld>
+            <a:endParaRPr lang="en-US" dirty="0"/>
+          </a:p>
+        </p:txBody>
+      </p:sp>
+      <p:sp>
+        <p:nvSpPr>
+          <p:cNvPr id="5" name="Header Placeholder 4"/>
+          <p:cNvSpPr>
+            <a:spLocks noGrp="1"/>
+          </p:cNvSpPr>
+          <p:nvPr>
+            <p:ph type="hdr" sz="quarter" idx="11"/>
+          </p:nvPr>
+        </p:nvSpPr>
+        <p:spPr/>
+        <p:txBody>
+          <a:bodyPr/>
+          <a:lstStyle/>
+          <a:p>
+            <a:pPr>
+              <a:defRPr/>
+            </a:pPr>
+            <a:endParaRPr lang="en-US"/>
+          </a:p>
+        </p:txBody>
+      </p:sp>
+      <p:sp>
+        <p:nvSpPr>
+          <p:cNvPr id="6" name="Footer Placeholder 5"/>
+          <p:cNvSpPr>
+            <a:spLocks noGrp="1"/>
+          </p:cNvSpPr>
+          <p:nvPr>
+            <p:ph type="ftr" sz="quarter" idx="12"/>
+          </p:nvPr>
+        </p:nvSpPr>
+        <p:spPr/>
+        <p:txBody>
+          <a:bodyPr/>
+          <a:lstStyle/>
+          <a:p>
+            <a:pPr>
+              <a:defRPr/>
+            </a:pPr>
+            <a:endParaRPr lang="en-US"/>
+          </a:p>
+        </p:txBody>
+      </p:sp>
+    </p:spTree>
+    <p:extLst>
+      <p:ext uri="{BB962C8B-B14F-4D97-AF65-F5344CB8AC3E}">
         <p14:creationId xmlns:p14="http://schemas.microsoft.com/office/powerpoint/2010/main" val="833749913"/>
+      </p:ext>
+    </p:extLst>
+  </p:cSld>
+  <p:clrMapOvr>
+    <a:masterClrMapping/>
+  </p:clrMapOvr>
+</p:notes>
+</file>
+
+<file path=ppt/notesSlides/notesSlide28.xml><?xml version="1.0" encoding="utf-8"?>
+<p:notes xmlns:a="http://schemas.openxmlformats.org/drawingml/2006/main" xmlns:r="http://schemas.openxmlformats.org/officeDocument/2006/relationships" xmlns:p="http://schemas.openxmlformats.org/presentationml/2006/main">
+  <p:cSld>
+    <p:spTree>
+      <p:nvGrpSpPr>
+        <p:cNvPr id="1" name=""/>
+        <p:cNvGrpSpPr/>
+        <p:nvPr/>
+      </p:nvGrpSpPr>
+      <p:grpSpPr>
+        <a:xfrm>
+          <a:off x="0" y="0"/>
+          <a:ext cx="0" cy="0"/>
+          <a:chOff x="0" y="0"/>
+          <a:chExt cx="0" cy="0"/>
+        </a:xfrm>
+      </p:grpSpPr>
+      <p:sp>
+        <p:nvSpPr>
+          <p:cNvPr id="2" name="Slide Image Placeholder 1"/>
+          <p:cNvSpPr>
+            <a:spLocks noGrp="1" noRot="1" noChangeAspect="1"/>
+          </p:cNvSpPr>
+          <p:nvPr>
+            <p:ph type="sldImg"/>
+          </p:nvPr>
+        </p:nvSpPr>
+        <p:spPr/>
+      </p:sp>
+      <p:sp>
+        <p:nvSpPr>
+          <p:cNvPr id="3" name="Notes Placeholder 2"/>
+          <p:cNvSpPr>
+            <a:spLocks noGrp="1"/>
+          </p:cNvSpPr>
+          <p:nvPr>
+            <p:ph type="body" idx="1"/>
+          </p:nvPr>
+        </p:nvSpPr>
+        <p:spPr/>
+        <p:txBody>
+          <a:bodyPr/>
+          <a:lstStyle/>
+          <a:p>
+            <a:r>
+              <a:rPr lang="en-US" dirty="0" smtClean="0"/>
+              <a:t>What</a:t>
+            </a:r>
+            <a:r>
+              <a:rPr lang="en-US" baseline="0" dirty="0" smtClean="0"/>
+              <a:t> questions can we answer for you?</a:t>
+            </a:r>
+            <a:endParaRPr lang="en-US" dirty="0"/>
+          </a:p>
+        </p:txBody>
+      </p:sp>
+      <p:sp>
+        <p:nvSpPr>
+          <p:cNvPr id="4" name="Slide Number Placeholder 3"/>
+          <p:cNvSpPr>
+            <a:spLocks noGrp="1"/>
+          </p:cNvSpPr>
+          <p:nvPr>
+            <p:ph type="sldNum" sz="quarter" idx="10"/>
+          </p:nvPr>
+        </p:nvSpPr>
+        <p:spPr/>
+        <p:txBody>
+          <a:bodyPr/>
+          <a:lstStyle/>
+          <a:p>
+            <a:pPr>
+              <a:defRPr/>
+            </a:pPr>
+            <a:fld id="{DC3734AA-3150-D947-AC52-2F5DF48BFCD5}" type="slidenum">
+              <a:rPr lang="en-US" smtClean="0"/>
+              <a:pPr>
+                <a:defRPr/>
+              </a:pPr>
+              <a:t>28</a:t>
+            </a:fld>
+            <a:endParaRPr lang="en-US" dirty="0"/>
+          </a:p>
+        </p:txBody>
+      </p:sp>
+      <p:sp>
+        <p:nvSpPr>
+          <p:cNvPr id="5" name="Header Placeholder 4"/>
+          <p:cNvSpPr>
+            <a:spLocks noGrp="1"/>
+          </p:cNvSpPr>
+          <p:nvPr>
+            <p:ph type="hdr" sz="quarter" idx="11"/>
+          </p:nvPr>
+        </p:nvSpPr>
+        <p:spPr/>
+        <p:txBody>
+          <a:bodyPr/>
+          <a:lstStyle/>
+          <a:p>
+            <a:pPr>
+              <a:defRPr/>
+            </a:pPr>
+            <a:endParaRPr lang="en-US"/>
+          </a:p>
+        </p:txBody>
+      </p:sp>
+      <p:sp>
+        <p:nvSpPr>
+          <p:cNvPr id="6" name="Footer Placeholder 5"/>
+          <p:cNvSpPr>
+            <a:spLocks noGrp="1"/>
+          </p:cNvSpPr>
+          <p:nvPr>
+            <p:ph type="ftr" sz="quarter" idx="12"/>
+          </p:nvPr>
+        </p:nvSpPr>
+        <p:spPr/>
+        <p:txBody>
+          <a:bodyPr/>
+          <a:lstStyle/>
+          <a:p>
+            <a:pPr>
+              <a:defRPr/>
+            </a:pPr>
+            <a:endParaRPr lang="en-US"/>
+          </a:p>
+        </p:txBody>
+      </p:sp>
+    </p:spTree>
+    <p:extLst>
+      <p:ext uri="{BB962C8B-B14F-4D97-AF65-F5344CB8AC3E}">
+        <p14:creationId xmlns:p14="http://schemas.microsoft.com/office/powerpoint/2010/main" val="2578097851"/>
       </p:ext>
     </p:extLst>
   </p:cSld>
@@ -14350,8 +14988,9 @@
             </a:pPr>
             <a:r>
               <a:rPr lang="en-US" baseline="0" dirty="0" smtClean="0"/>
-              <a:t>HWRP are incredibly useful when you need the full power of Ruby to implement your own resource. However, they come at the cost of understanding a number of Object-Oriented Programming techniques and the Ruby language. When exploring community cookbooks you may find examples of these resources in use.</a:t>
-            </a:r>
+              <a:t>The resource would now be available within any recipe defined in this cookbook or any cookbook that adds this cookbook as a dependency. Here in this example recipe the resources delete and creates apache sites. All three of the resources rely on the site name attribute being tied to the name provided to the resource. The first deletes the welcome site. The next two both rely on the default action of create. The second resource assumes the default site port value.</a:t>
+            </a:r>
+            <a:endParaRPr lang="en-US" baseline="0" dirty="0" smtClean="0"/>
           </a:p>
         </p:txBody>
       </p:sp>
@@ -14431,7 +15070,7 @@
     </p:spTree>
     <p:extLst>
       <p:ext uri="{BB962C8B-B14F-4D97-AF65-F5344CB8AC3E}">
-        <p14:creationId xmlns:p14="http://schemas.microsoft.com/office/powerpoint/2010/main" val="168007384"/>
+        <p14:creationId xmlns:p14="http://schemas.microsoft.com/office/powerpoint/2010/main" val="1903860341"/>
       </p:ext>
     </p:extLst>
   </p:cSld>
@@ -14578,7 +15217,7 @@
   <p:clrMapOvr>
     <a:masterClrMapping/>
   </p:clrMapOvr>
-  <p:transition spd="med">
+  <p:transition xmlns:p14="http://schemas.microsoft.com/office/powerpoint/2010/main" spd="med">
     <p:fade/>
   </p:transition>
 </p:sldLayout>
@@ -14873,7 +15512,7 @@
   <p:clrMapOvr>
     <a:overrideClrMapping bg1="lt1" tx1="dk1" bg2="lt2" tx2="dk2" accent1="accent1" accent2="accent2" accent3="accent3" accent4="accent4" accent5="accent5" accent6="accent6" hlink="hlink" folHlink="folHlink"/>
   </p:clrMapOvr>
-  <p:transition spd="med">
+  <p:transition xmlns:p14="http://schemas.microsoft.com/office/powerpoint/2010/main" spd="med">
     <p:fade/>
   </p:transition>
 </p:sldLayout>
@@ -15006,14 +15645,14 @@
           </a:ln>
           <a:extLst>
             <a:ext uri="{909E8E84-426E-40dd-AFC4-6F175D3DCCD1}">
-              <a14:hiddenFill xmlns:a14="http://schemas.microsoft.com/office/drawing/2010/main" xmlns="">
+              <a14:hiddenFill xmlns:a14="http://schemas.microsoft.com/office/drawing/2010/main">
                 <a:solidFill>
                   <a:srgbClr val="FFFFFF"/>
                 </a:solidFill>
               </a14:hiddenFill>
             </a:ext>
             <a:ext uri="{91240B29-F687-4f45-9708-019B960494DF}">
-              <a14:hiddenLine xmlns:a14="http://schemas.microsoft.com/office/drawing/2010/main" xmlns="" w="9525">
+              <a14:hiddenLine xmlns:a14="http://schemas.microsoft.com/office/drawing/2010/main" w="9525">
                 <a:solidFill>
                   <a:srgbClr val="000000"/>
                 </a:solidFill>
@@ -15161,14 +15800,14 @@
           </a:ln>
           <a:extLst>
             <a:ext uri="{909E8E84-426E-40dd-AFC4-6F175D3DCCD1}">
-              <a14:hiddenFill xmlns:a14="http://schemas.microsoft.com/office/drawing/2010/main" xmlns="">
+              <a14:hiddenFill xmlns:a14="http://schemas.microsoft.com/office/drawing/2010/main">
                 <a:solidFill>
                   <a:srgbClr val="FFFFFF"/>
                 </a:solidFill>
               </a14:hiddenFill>
             </a:ext>
             <a:ext uri="{91240B29-F687-4f45-9708-019B960494DF}">
-              <a14:hiddenLine xmlns:a14="http://schemas.microsoft.com/office/drawing/2010/main" xmlns="" w="9525">
+              <a14:hiddenLine xmlns:a14="http://schemas.microsoft.com/office/drawing/2010/main" w="9525">
                 <a:solidFill>
                   <a:srgbClr val="000000"/>
                 </a:solidFill>
@@ -15566,7 +16205,7 @@
   <p:clrMapOvr>
     <a:overrideClrMapping bg1="lt1" tx1="dk1" bg2="lt2" tx2="dk2" accent1="accent1" accent2="accent2" accent3="accent3" accent4="accent4" accent5="accent5" accent6="accent6" hlink="hlink" folHlink="folHlink"/>
   </p:clrMapOvr>
-  <p:transition spd="med">
+  <p:transition xmlns:p14="http://schemas.microsoft.com/office/powerpoint/2010/main" spd="med">
     <p:fade/>
   </p:transition>
 </p:sldLayout>
@@ -15659,14 +16298,14 @@
           </a:ln>
           <a:extLst>
             <a:ext uri="{909E8E84-426E-40dd-AFC4-6F175D3DCCD1}">
-              <a14:hiddenFill xmlns:a14="http://schemas.microsoft.com/office/drawing/2010/main" xmlns="">
+              <a14:hiddenFill xmlns:a14="http://schemas.microsoft.com/office/drawing/2010/main">
                 <a:solidFill>
                   <a:srgbClr val="FFFFFF"/>
                 </a:solidFill>
               </a14:hiddenFill>
             </a:ext>
             <a:ext uri="{91240B29-F687-4f45-9708-019B960494DF}">
-              <a14:hiddenLine xmlns:a14="http://schemas.microsoft.com/office/drawing/2010/main" xmlns="" w="9525">
+              <a14:hiddenLine xmlns:a14="http://schemas.microsoft.com/office/drawing/2010/main" w="9525">
                 <a:solidFill>
                   <a:srgbClr val="000000"/>
                 </a:solidFill>
@@ -15688,7 +16327,7 @@
   <p:clrMapOvr>
     <a:masterClrMapping/>
   </p:clrMapOvr>
-  <p:transition spd="med">
+  <p:transition xmlns:p14="http://schemas.microsoft.com/office/powerpoint/2010/main" spd="med">
     <p:fade/>
   </p:transition>
 </p:sldLayout>
@@ -15975,7 +16614,7 @@
   <p:clrMapOvr>
     <a:masterClrMapping/>
   </p:clrMapOvr>
-  <p:transition spd="med">
+  <p:transition xmlns:p14="http://schemas.microsoft.com/office/powerpoint/2010/main" spd="med">
     <p:fade/>
   </p:transition>
 </p:sldLayout>
@@ -16262,7 +16901,7 @@
   <p:clrMapOvr>
     <a:masterClrMapping/>
   </p:clrMapOvr>
-  <p:transition spd="med">
+  <p:transition xmlns:p14="http://schemas.microsoft.com/office/powerpoint/2010/main" spd="med">
     <p:fade/>
   </p:transition>
 </p:sldLayout>
@@ -16611,7 +17250,7 @@
   <p:clrMapOvr>
     <a:masterClrMapping/>
   </p:clrMapOvr>
-  <p:transition spd="med">
+  <p:transition xmlns:p14="http://schemas.microsoft.com/office/powerpoint/2010/main" spd="med">
     <p:fade/>
   </p:transition>
 </p:sldLayout>
@@ -16898,7 +17537,7 @@
   <p:clrMapOvr>
     <a:masterClrMapping/>
   </p:clrMapOvr>
-  <p:transition spd="med">
+  <p:transition xmlns:p14="http://schemas.microsoft.com/office/powerpoint/2010/main" spd="med">
     <p:fade/>
   </p:transition>
 </p:sldLayout>
@@ -17115,14 +17754,14 @@
           </a:ln>
           <a:extLst>
             <a:ext uri="{909E8E84-426E-40dd-AFC4-6F175D3DCCD1}">
-              <a14:hiddenFill xmlns:a14="http://schemas.microsoft.com/office/drawing/2010/main" xmlns="">
+              <a14:hiddenFill xmlns:a14="http://schemas.microsoft.com/office/drawing/2010/main">
                 <a:solidFill>
                   <a:srgbClr val="FFFFFF"/>
                 </a:solidFill>
               </a14:hiddenFill>
             </a:ext>
             <a:ext uri="{91240B29-F687-4f45-9708-019B960494DF}">
-              <a14:hiddenLine xmlns:a14="http://schemas.microsoft.com/office/drawing/2010/main" xmlns="" w="9525">
+              <a14:hiddenLine xmlns:a14="http://schemas.microsoft.com/office/drawing/2010/main" w="9525">
                 <a:solidFill>
                   <a:srgbClr val="000000"/>
                 </a:solidFill>
@@ -17319,7 +17958,7 @@
   <p:clrMapOvr>
     <a:masterClrMapping/>
   </p:clrMapOvr>
-  <p:transition spd="med">
+  <p:transition xmlns:p14="http://schemas.microsoft.com/office/powerpoint/2010/main" spd="med">
     <p:fade/>
   </p:transition>
 </p:sldLayout>
@@ -17607,7 +18246,7 @@
   <p:clrMapOvr>
     <a:masterClrMapping/>
   </p:clrMapOvr>
-  <p:transition spd="med">
+  <p:transition xmlns:p14="http://schemas.microsoft.com/office/powerpoint/2010/main" spd="med">
     <p:fade/>
   </p:transition>
 </p:sldLayout>
@@ -17919,7 +18558,7 @@
   <p:clrMapOvr>
     <a:masterClrMapping/>
   </p:clrMapOvr>
-  <p:transition spd="med">
+  <p:transition xmlns:p14="http://schemas.microsoft.com/office/powerpoint/2010/main" spd="med">
     <p:fade/>
   </p:transition>
 </p:sldLayout>
@@ -18096,7 +18735,7 @@
   <p:clrMapOvr>
     <a:masterClrMapping/>
   </p:clrMapOvr>
-  <p:transition spd="med">
+  <p:transition xmlns:p14="http://schemas.microsoft.com/office/powerpoint/2010/main" spd="med">
     <p:fade/>
   </p:transition>
 </p:sldLayout>
@@ -18400,7 +19039,7 @@
   <p:clrMapOvr>
     <a:masterClrMapping/>
   </p:clrMapOvr>
-  <p:transition spd="med">
+  <p:transition xmlns:p14="http://schemas.microsoft.com/office/powerpoint/2010/main" spd="med">
     <p:fade/>
   </p:transition>
 </p:sldLayout>
@@ -18476,14 +19115,14 @@
           </a:ln>
           <a:extLst>
             <a:ext uri="{909E8E84-426E-40dd-AFC4-6F175D3DCCD1}">
-              <a14:hiddenFill xmlns:a14="http://schemas.microsoft.com/office/drawing/2010/main" xmlns="">
+              <a14:hiddenFill xmlns:a14="http://schemas.microsoft.com/office/drawing/2010/main">
                 <a:solidFill>
                   <a:srgbClr val="FFFFFF"/>
                 </a:solidFill>
               </a14:hiddenFill>
             </a:ext>
             <a:ext uri="{91240B29-F687-4f45-9708-019B960494DF}">
-              <a14:hiddenLine xmlns:a14="http://schemas.microsoft.com/office/drawing/2010/main" xmlns="" w="9525">
+              <a14:hiddenLine xmlns:a14="http://schemas.microsoft.com/office/drawing/2010/main" w="9525">
                 <a:solidFill>
                   <a:srgbClr val="000000"/>
                 </a:solidFill>
@@ -18759,7 +19398,7 @@
   <p:clrMapOvr>
     <a:overrideClrMapping bg1="lt1" tx1="dk1" bg2="lt2" tx2="dk2" accent1="accent1" accent2="accent2" accent3="accent3" accent4="accent4" accent5="accent5" accent6="accent6" hlink="hlink" folHlink="folHlink"/>
   </p:clrMapOvr>
-  <p:transition spd="med">
+  <p:transition xmlns:p14="http://schemas.microsoft.com/office/powerpoint/2010/main" spd="med">
     <p:fade/>
   </p:transition>
 </p:sldLayout>
@@ -18965,7 +19604,7 @@
   <p:clrMapOvr>
     <a:overrideClrMapping bg1="lt1" tx1="dk1" bg2="lt2" tx2="dk2" accent1="accent1" accent2="accent2" accent3="accent3" accent4="accent4" accent5="accent5" accent6="accent6" hlink="hlink" folHlink="folHlink"/>
   </p:clrMapOvr>
-  <p:transition spd="med">
+  <p:transition xmlns:p14="http://schemas.microsoft.com/office/powerpoint/2010/main" spd="med">
     <p:fade/>
   </p:transition>
 </p:sldLayout>
@@ -19041,14 +19680,14 @@
           </a:ln>
           <a:extLst>
             <a:ext uri="{909E8E84-426E-40dd-AFC4-6F175D3DCCD1}">
-              <a14:hiddenFill xmlns:a14="http://schemas.microsoft.com/office/drawing/2010/main" xmlns="">
+              <a14:hiddenFill xmlns:a14="http://schemas.microsoft.com/office/drawing/2010/main">
                 <a:solidFill>
                   <a:srgbClr val="FFFFFF"/>
                 </a:solidFill>
               </a14:hiddenFill>
             </a:ext>
             <a:ext uri="{91240B29-F687-4f45-9708-019B960494DF}">
-              <a14:hiddenLine xmlns:a14="http://schemas.microsoft.com/office/drawing/2010/main" xmlns="" w="9525">
+              <a14:hiddenLine xmlns:a14="http://schemas.microsoft.com/office/drawing/2010/main" w="9525">
                 <a:solidFill>
                   <a:srgbClr val="000000"/>
                 </a:solidFill>
@@ -19331,7 +19970,7 @@
   <p:clrMapOvr>
     <a:overrideClrMapping bg1="lt1" tx1="dk1" bg2="lt2" tx2="dk2" accent1="accent1" accent2="accent2" accent3="accent3" accent4="accent4" accent5="accent5" accent6="accent6" hlink="hlink" folHlink="folHlink"/>
   </p:clrMapOvr>
-  <p:transition spd="med">
+  <p:transition xmlns:p14="http://schemas.microsoft.com/office/powerpoint/2010/main" spd="med">
     <p:fade/>
   </p:transition>
 </p:sldLayout>
@@ -19539,7 +20178,7 @@
   <p:clrMapOvr>
     <a:overrideClrMapping bg1="lt1" tx1="dk1" bg2="lt2" tx2="dk2" accent1="accent1" accent2="accent2" accent3="accent3" accent4="accent4" accent5="accent5" accent6="accent6" hlink="hlink" folHlink="folHlink"/>
   </p:clrMapOvr>
-  <p:transition spd="med">
+  <p:transition xmlns:p14="http://schemas.microsoft.com/office/powerpoint/2010/main" spd="med">
     <p:fade/>
   </p:transition>
 </p:sldLayout>
@@ -19615,14 +20254,14 @@
           </a:ln>
           <a:extLst>
             <a:ext uri="{909E8E84-426E-40dd-AFC4-6F175D3DCCD1}">
-              <a14:hiddenFill xmlns:a14="http://schemas.microsoft.com/office/drawing/2010/main" xmlns="">
+              <a14:hiddenFill xmlns:a14="http://schemas.microsoft.com/office/drawing/2010/main">
                 <a:solidFill>
                   <a:srgbClr val="FFFFFF"/>
                 </a:solidFill>
               </a14:hiddenFill>
             </a:ext>
             <a:ext uri="{91240B29-F687-4f45-9708-019B960494DF}">
-              <a14:hiddenLine xmlns:a14="http://schemas.microsoft.com/office/drawing/2010/main" xmlns="" w="9525">
+              <a14:hiddenLine xmlns:a14="http://schemas.microsoft.com/office/drawing/2010/main" w="9525">
                 <a:solidFill>
                   <a:srgbClr val="000000"/>
                 </a:solidFill>
@@ -19890,7 +20529,7 @@
   <p:clrMapOvr>
     <a:overrideClrMapping bg1="lt1" tx1="dk1" bg2="lt2" tx2="dk2" accent1="accent1" accent2="accent2" accent3="accent3" accent4="accent4" accent5="accent5" accent6="accent6" hlink="hlink" folHlink="folHlink"/>
   </p:clrMapOvr>
-  <p:transition spd="med">
+  <p:transition xmlns:p14="http://schemas.microsoft.com/office/powerpoint/2010/main" spd="med">
     <p:fade/>
   </p:transition>
 </p:sldLayout>
@@ -20118,7 +20757,7 @@
   <p:clrMapOvr>
     <a:overrideClrMapping bg1="lt1" tx1="dk1" bg2="lt2" tx2="dk2" accent1="accent1" accent2="accent2" accent3="accent3" accent4="accent4" accent5="accent5" accent6="accent6" hlink="hlink" folHlink="folHlink"/>
   </p:clrMapOvr>
-  <p:transition spd="med">
+  <p:transition xmlns:p14="http://schemas.microsoft.com/office/powerpoint/2010/main" spd="med">
     <p:fade/>
   </p:transition>
 </p:sldLayout>
@@ -20406,7 +21045,7 @@
   <p:clrMapOvr>
     <a:overrideClrMapping bg1="lt1" tx1="dk1" bg2="lt2" tx2="dk2" accent1="accent1" accent2="accent2" accent3="accent3" accent4="accent4" accent5="accent5" accent6="accent6" hlink="hlink" folHlink="folHlink"/>
   </p:clrMapOvr>
-  <p:transition spd="med">
+  <p:transition xmlns:p14="http://schemas.microsoft.com/office/powerpoint/2010/main" spd="med">
     <p:fade/>
   </p:transition>
 </p:sldLayout>
@@ -20562,14 +21201,14 @@
           </a:ln>
           <a:extLst>
             <a:ext uri="{909E8E84-426E-40dd-AFC4-6F175D3DCCD1}">
-              <a14:hiddenFill xmlns:a14="http://schemas.microsoft.com/office/drawing/2010/main" xmlns="">
+              <a14:hiddenFill xmlns:a14="http://schemas.microsoft.com/office/drawing/2010/main">
                 <a:solidFill>
                   <a:srgbClr val="FFFFFF"/>
                 </a:solidFill>
               </a14:hiddenFill>
             </a:ext>
             <a:ext uri="{91240B29-F687-4f45-9708-019B960494DF}">
-              <a14:hiddenLine xmlns:a14="http://schemas.microsoft.com/office/drawing/2010/main" xmlns="" w="9525">
+              <a14:hiddenLine xmlns:a14="http://schemas.microsoft.com/office/drawing/2010/main" w="9525">
                 <a:solidFill>
                   <a:srgbClr val="000000"/>
                 </a:solidFill>
@@ -20808,13 +21447,13 @@
     <p:sldLayoutId id="2147483841" r:id="rId11"/>
     <p:sldLayoutId id="2147483843" r:id="rId12"/>
   </p:sldLayoutIdLst>
-  <p:transition spd="med">
+  <p:transition xmlns:p14="http://schemas.microsoft.com/office/powerpoint/2010/main" spd="med">
     <p:fade/>
   </p:transition>
   <p:timing>
     <p:tnLst>
       <p:par>
-        <p:cTn id="1" dur="indefinite" restart="never" nodeType="tmRoot"/>
+        <p:cTn xmlns:p14="http://schemas.microsoft.com/office/powerpoint/2010/main" id="1" dur="indefinite" restart="never" nodeType="tmRoot"/>
       </p:par>
     </p:tnLst>
   </p:timing>
@@ -21342,14 +21981,14 @@
           </a:ln>
           <a:extLst>
             <a:ext uri="{909E8E84-426E-40dd-AFC4-6F175D3DCCD1}">
-              <a14:hiddenFill xmlns:a14="http://schemas.microsoft.com/office/drawing/2010/main" xmlns="">
+              <a14:hiddenFill xmlns:a14="http://schemas.microsoft.com/office/drawing/2010/main">
                 <a:solidFill>
                   <a:srgbClr val="FFFFFF"/>
                 </a:solidFill>
               </a14:hiddenFill>
             </a:ext>
             <a:ext uri="{91240B29-F687-4f45-9708-019B960494DF}">
-              <a14:hiddenLine xmlns:a14="http://schemas.microsoft.com/office/drawing/2010/main" xmlns="" w="9525">
+              <a14:hiddenLine xmlns:a14="http://schemas.microsoft.com/office/drawing/2010/main" w="9525">
                 <a:solidFill>
                   <a:srgbClr val="000000"/>
                 </a:solidFill>
@@ -21659,13 +22298,13 @@
     <p:sldLayoutId id="2147483856" r:id="rId7"/>
     <p:sldLayoutId id="2147483866" r:id="rId8"/>
   </p:sldLayoutIdLst>
-  <p:transition spd="med">
+  <p:transition xmlns:p14="http://schemas.microsoft.com/office/powerpoint/2010/main" spd="med">
     <p:fade/>
   </p:transition>
   <p:timing>
     <p:tnLst>
       <p:par>
-        <p:cTn id="1" dur="indefinite" restart="never" nodeType="tmRoot"/>
+        <p:cTn xmlns:p14="http://schemas.microsoft.com/office/powerpoint/2010/main" id="1" dur="indefinite" restart="never" nodeType="tmRoot"/>
       </p:par>
     </p:tnLst>
   </p:timing>
@@ -22159,13 +22798,13 @@
   <p:clrMapOvr>
     <a:masterClrMapping/>
   </p:clrMapOvr>
-  <p:transition spd="med">
+  <p:transition xmlns:p14="http://schemas.microsoft.com/office/powerpoint/2010/main" spd="med">
     <p:fade/>
   </p:transition>
   <p:timing>
     <p:tnLst>
       <p:par>
-        <p:cTn id="1" dur="indefinite" restart="never" nodeType="tmRoot"/>
+        <p:cTn xmlns:p14="http://schemas.microsoft.com/office/powerpoint/2010/main" id="1" dur="indefinite" restart="never" nodeType="tmRoot"/>
       </p:par>
     </p:tnLst>
   </p:timing>
@@ -22191,14 +22830,344 @@
       </p:grpSpPr>
       <p:sp>
         <p:nvSpPr>
+          <p:cNvPr id="10" name="Title 9"/>
+          <p:cNvSpPr>
+            <a:spLocks noGrp="1"/>
+          </p:cNvSpPr>
+          <p:nvPr>
+            <p:ph type="title"/>
+          </p:nvPr>
+        </p:nvSpPr>
+        <p:spPr/>
+        <p:txBody>
+          <a:bodyPr/>
+          <a:lstStyle/>
+          <a:p>
+            <a:r>
+              <a:rPr lang="en-US" smtClean="0"/>
+              <a:t> </a:t>
+            </a:r>
+            <a:endParaRPr lang="en-US" dirty="0"/>
+          </a:p>
+        </p:txBody>
+      </p:sp>
+      <p:sp>
+        <p:nvSpPr>
+          <p:cNvPr id="5" name="Text Placeholder 4"/>
+          <p:cNvSpPr>
+            <a:spLocks noGrp="1"/>
+          </p:cNvSpPr>
+          <p:nvPr>
+            <p:ph type="body" sz="quarter" idx="12"/>
+          </p:nvPr>
+        </p:nvSpPr>
+        <p:spPr>
+          <a:xfrm>
+            <a:off x="736600" y="2209800"/>
+            <a:ext cx="14812064" cy="4992351"/>
+          </a:xfrm>
+        </p:spPr>
+        <p:txBody>
+          <a:bodyPr/>
+          <a:lstStyle/>
+          <a:p>
+            <a:pPr marL="457200" indent="-457200">
+              <a:buFont typeface="Arial" charset="0"/>
+              <a:buChar char="•"/>
+            </a:pPr>
+            <a:r>
+              <a:rPr lang="en-US" dirty="0" smtClean="0"/>
+              <a:t>Available in some of the earliest versions of Chef</a:t>
+            </a:r>
+          </a:p>
+          <a:p>
+            <a:pPr marL="457200" indent="-457200">
+              <a:buFont typeface="Arial" charset="0"/>
+              <a:buChar char="•"/>
+            </a:pPr>
+            <a:r>
+              <a:rPr lang="en-US" dirty="0" smtClean="0"/>
+              <a:t>Allows for extremely flexible and powerful resource implementations</a:t>
+            </a:r>
+          </a:p>
+          <a:p>
+            <a:pPr marL="457200" indent="-457200">
+              <a:buFont typeface="Arial" charset="0"/>
+              <a:buChar char="•"/>
+            </a:pPr>
+            <a:r>
+              <a:rPr lang="en-US" dirty="0" smtClean="0"/>
+              <a:t>Requires knowledge of Ruby</a:t>
+            </a:r>
+          </a:p>
+          <a:p>
+            <a:pPr marL="457200" indent="-457200">
+              <a:buFont typeface="Arial" charset="0"/>
+              <a:buChar char="•"/>
+            </a:pPr>
+            <a:r>
+              <a:rPr lang="en-US" dirty="0" smtClean="0"/>
+              <a:t>Requires knowledge of Object-Oriented Programming techniques</a:t>
+            </a:r>
+          </a:p>
+          <a:p>
+            <a:pPr marL="457200" indent="-457200">
+              <a:buFont typeface="Arial" charset="0"/>
+              <a:buChar char="•"/>
+            </a:pPr>
+            <a:endParaRPr lang="en-US" dirty="0" smtClean="0"/>
+          </a:p>
+          <a:p>
+            <a:endParaRPr lang="en-US" dirty="0"/>
+          </a:p>
+        </p:txBody>
+      </p:sp>
+      <p:sp>
+        <p:nvSpPr>
+          <p:cNvPr id="7" name="TextBox 6"/>
+          <p:cNvSpPr txBox="1"/>
+          <p:nvPr/>
+        </p:nvSpPr>
+        <p:spPr bwMode="white">
+          <a:xfrm>
+            <a:off x="773280" y="263175"/>
+            <a:ext cx="14771520" cy="955963"/>
+          </a:xfrm>
+          <a:prstGeom prst="rect">
+            <a:avLst/>
+          </a:prstGeom>
+        </p:spPr>
+        <p:style>
+          <a:lnRef idx="2">
+            <a:schemeClr val="accent4">
+              <a:shade val="50000"/>
+            </a:schemeClr>
+          </a:lnRef>
+          <a:fillRef idx="1">
+            <a:schemeClr val="accent4"/>
+          </a:fillRef>
+          <a:effectRef idx="0">
+            <a:schemeClr val="accent4"/>
+          </a:effectRef>
+          <a:fontRef idx="minor">
+            <a:schemeClr val="lt1"/>
+          </a:fontRef>
+        </p:style>
+        <p:txBody>
+          <a:bodyPr vert="horz" wrap="square" lIns="731520" tIns="91440" rIns="91440" bIns="91440" rtlCol="0" anchor="ctr">
+            <a:normAutofit/>
+          </a:bodyPr>
+          <a:lstStyle/>
+          <a:p>
+            <a:r>
+              <a:rPr lang="en-US" sz="3600" dirty="0" smtClean="0"/>
+              <a:t>Pure Ruby (Heavy-Weight Resource-Providers)</a:t>
+            </a:r>
+          </a:p>
+        </p:txBody>
+      </p:sp>
+      <p:sp>
+        <p:nvSpPr>
+          <p:cNvPr id="8" name="Oval 7"/>
+          <p:cNvSpPr/>
+          <p:nvPr/>
+        </p:nvSpPr>
+        <p:spPr bwMode="auto">
+          <a:xfrm>
+            <a:off x="302407" y="263175"/>
+            <a:ext cx="941746" cy="941746"/>
+          </a:xfrm>
+          <a:prstGeom prst="ellipse">
+            <a:avLst/>
+          </a:prstGeom>
+          <a:ln>
+            <a:headEnd type="none" w="med" len="med"/>
+            <a:tailEnd type="none" w="med" len="med"/>
+          </a:ln>
+        </p:spPr>
+        <p:style>
+          <a:lnRef idx="2">
+            <a:schemeClr val="accent4">
+              <a:shade val="50000"/>
+            </a:schemeClr>
+          </a:lnRef>
+          <a:fillRef idx="1">
+            <a:schemeClr val="accent4"/>
+          </a:fillRef>
+          <a:effectRef idx="0">
+            <a:schemeClr val="accent4"/>
+          </a:effectRef>
+          <a:fontRef idx="minor">
+            <a:schemeClr val="lt1"/>
+          </a:fontRef>
+        </p:style>
+        <p:txBody>
+          <a:bodyPr vert="horz" wrap="square" lIns="91436" tIns="45718" rIns="91436" bIns="45718" numCol="1" rtlCol="0" anchor="ctr" anchorCtr="0" compatLnSpc="1">
+            <a:prstTxWarp prst="textNoShape">
+              <a:avLst/>
+            </a:prstTxWarp>
+          </a:bodyPr>
+          <a:lstStyle/>
+          <a:p>
+            <a:pPr algn="ctr" defTabSz="914099"/>
+            <a:r>
+              <a:rPr lang="en-US" sz="4000" b="1" dirty="0">
+                <a:gradFill>
+                  <a:gsLst>
+                    <a:gs pos="0">
+                      <a:srgbClr val="FFFFFF"/>
+                    </a:gs>
+                    <a:gs pos="100000">
+                      <a:srgbClr val="FFFFFF"/>
+                    </a:gs>
+                  </a:gsLst>
+                  <a:lin ang="5400000" scaled="0"/>
+                </a:gradFill>
+              </a:rPr>
+              <a:t>1</a:t>
+            </a:r>
+            <a:endParaRPr lang="en-US" sz="4000" b="1" dirty="0" smtClean="0">
+              <a:gradFill>
+                <a:gsLst>
+                  <a:gs pos="0">
+                    <a:srgbClr val="FFFFFF"/>
+                  </a:gs>
+                  <a:gs pos="100000">
+                    <a:srgbClr val="FFFFFF"/>
+                  </a:gs>
+                </a:gsLst>
+                <a:lin ang="5400000" scaled="0"/>
+              </a:gradFill>
+            </a:endParaRPr>
+          </a:p>
+        </p:txBody>
+      </p:sp>
+      <p:sp>
+        <p:nvSpPr>
+          <p:cNvPr id="9" name="Rectangle 8"/>
+          <p:cNvSpPr/>
+          <p:nvPr/>
+        </p:nvSpPr>
+        <p:spPr bwMode="auto">
+          <a:xfrm>
+            <a:off x="773280" y="1240394"/>
+            <a:ext cx="14771520" cy="530141"/>
+          </a:xfrm>
+          <a:prstGeom prst="rect">
+            <a:avLst/>
+          </a:prstGeom>
+          <a:ln>
+            <a:headEnd type="none" w="med" len="med"/>
+            <a:tailEnd type="none" w="med" len="med"/>
+          </a:ln>
+        </p:spPr>
+        <p:style>
+          <a:lnRef idx="2">
+            <a:schemeClr val="dk1">
+              <a:shade val="50000"/>
+            </a:schemeClr>
+          </a:lnRef>
+          <a:fillRef idx="1">
+            <a:schemeClr val="dk1"/>
+          </a:fillRef>
+          <a:effectRef idx="0">
+            <a:schemeClr val="dk1"/>
+          </a:effectRef>
+          <a:fontRef idx="minor">
+            <a:schemeClr val="lt1"/>
+          </a:fontRef>
+        </p:style>
+        <p:txBody>
+          <a:bodyPr vert="horz" wrap="square" lIns="91436" tIns="45718" rIns="91436" bIns="45718" numCol="1" rtlCol="0" anchor="ctr" anchorCtr="0" compatLnSpc="1">
+            <a:prstTxWarp prst="textNoShape">
+              <a:avLst/>
+            </a:prstTxWarp>
+          </a:bodyPr>
+          <a:lstStyle/>
+          <a:p>
+            <a:pPr algn="r" defTabSz="914099"/>
+            <a:r>
+              <a:rPr lang="en-US" b="1" dirty="0" smtClean="0">
+                <a:gradFill>
+                  <a:gsLst>
+                    <a:gs pos="0">
+                      <a:srgbClr val="FFFFFF"/>
+                    </a:gs>
+                    <a:gs pos="100000">
+                      <a:srgbClr val="FFFFFF"/>
+                    </a:gs>
+                  </a:gsLst>
+                  <a:lin ang="5400000" scaled="0"/>
+                </a:gradFill>
+              </a:rPr>
+              <a:t>BENEFITS &amp; DRAWBACKS</a:t>
+            </a:r>
+            <a:endParaRPr lang="en-US" sz="2400" b="1" dirty="0" smtClean="0">
+              <a:gradFill>
+                <a:gsLst>
+                  <a:gs pos="0">
+                    <a:srgbClr val="FFFFFF"/>
+                  </a:gs>
+                  <a:gs pos="100000">
+                    <a:srgbClr val="FFFFFF"/>
+                  </a:gs>
+                </a:gsLst>
+                <a:lin ang="5400000" scaled="0"/>
+              </a:gradFill>
+            </a:endParaRPr>
+          </a:p>
+        </p:txBody>
+      </p:sp>
+    </p:spTree>
+    <p:extLst>
+      <p:ext uri="{BB962C8B-B14F-4D97-AF65-F5344CB8AC3E}">
+        <p14:creationId xmlns:p14="http://schemas.microsoft.com/office/powerpoint/2010/main" val="363269115"/>
+      </p:ext>
+    </p:extLst>
+  </p:cSld>
+  <p:clrMapOvr>
+    <a:masterClrMapping/>
+  </p:clrMapOvr>
+  <p:transition xmlns:p14="http://schemas.microsoft.com/office/powerpoint/2010/main" spd="med">
+    <p:fade/>
+  </p:transition>
+  <p:timing>
+    <p:tnLst>
+      <p:par>
+        <p:cTn xmlns:p14="http://schemas.microsoft.com/office/powerpoint/2010/main" id="1" dur="indefinite" restart="never" nodeType="tmRoot"/>
+      </p:par>
+    </p:tnLst>
+  </p:timing>
+</p:sld>
+</file>
+
+<file path=ppt/slides/slide11.xml><?xml version="1.0" encoding="utf-8"?>
+<p:sld xmlns:a="http://schemas.openxmlformats.org/drawingml/2006/main" xmlns:r="http://schemas.openxmlformats.org/officeDocument/2006/relationships" xmlns:p="http://schemas.openxmlformats.org/presentationml/2006/main">
+  <p:cSld>
+    <p:spTree>
+      <p:nvGrpSpPr>
+        <p:cNvPr id="1" name=""/>
+        <p:cNvGrpSpPr/>
+        <p:nvPr/>
+      </p:nvGrpSpPr>
+      <p:grpSpPr>
+        <a:xfrm>
+          <a:off x="0" y="0"/>
+          <a:ext cx="0" cy="0"/>
+          <a:chOff x="0" y="0"/>
+          <a:chExt cx="0" cy="0"/>
+        </a:xfrm>
+      </p:grpSpPr>
+      <p:sp>
+        <p:nvSpPr>
           <p:cNvPr id="6" name="Left Brace 5"/>
           <p:cNvSpPr/>
           <p:nvPr/>
         </p:nvSpPr>
         <p:spPr>
           <a:xfrm>
-            <a:off x="7634705" y="3191934"/>
-            <a:ext cx="657727" cy="3702272"/>
+            <a:off x="7634705" y="3222624"/>
+            <a:ext cx="657727" cy="3671581"/>
           </a:xfrm>
           <a:prstGeom prst="leftBrace">
             <a:avLst>
@@ -23080,20 +24049,20 @@
   <p:clrMapOvr>
     <a:masterClrMapping/>
   </p:clrMapOvr>
-  <p:transition spd="med">
+  <p:transition xmlns:p14="http://schemas.microsoft.com/office/powerpoint/2010/main" spd="med">
     <p:fade/>
   </p:transition>
   <p:timing>
     <p:tnLst>
       <p:par>
-        <p:cTn id="1" dur="indefinite" restart="never" nodeType="tmRoot"/>
+        <p:cTn xmlns:p14="http://schemas.microsoft.com/office/powerpoint/2010/main" id="1" dur="indefinite" restart="never" nodeType="tmRoot"/>
       </p:par>
     </p:tnLst>
   </p:timing>
 </p:sld>
 </file>
 
-<file path=ppt/slides/slide11.xml><?xml version="1.0" encoding="utf-8"?>
+<file path=ppt/slides/slide12.xml><?xml version="1.0" encoding="utf-8"?>
 <p:sld xmlns:a="http://schemas.openxmlformats.org/drawingml/2006/main" xmlns:r="http://schemas.openxmlformats.org/officeDocument/2006/relationships" xmlns:p="http://schemas.openxmlformats.org/presentationml/2006/main">
   <p:cSld>
     <p:spTree>
@@ -23673,20 +24642,20 @@
   <p:clrMapOvr>
     <a:masterClrMapping/>
   </p:clrMapOvr>
-  <p:transition spd="med">
+  <p:transition xmlns:p14="http://schemas.microsoft.com/office/powerpoint/2010/main" spd="med">
     <p:fade/>
   </p:transition>
   <p:timing>
     <p:tnLst>
       <p:par>
-        <p:cTn id="1" dur="indefinite" restart="never" nodeType="tmRoot"/>
+        <p:cTn xmlns:p14="http://schemas.microsoft.com/office/powerpoint/2010/main" id="1" dur="indefinite" restart="never" nodeType="tmRoot"/>
       </p:par>
     </p:tnLst>
   </p:timing>
 </p:sld>
 </file>
 
-<file path=ppt/slides/slide12.xml><?xml version="1.0" encoding="utf-8"?>
+<file path=ppt/slides/slide13.xml><?xml version="1.0" encoding="utf-8"?>
 <p:sld xmlns:a="http://schemas.openxmlformats.org/drawingml/2006/main" xmlns:r="http://schemas.openxmlformats.org/officeDocument/2006/relationships" xmlns:p="http://schemas.openxmlformats.org/presentationml/2006/main">
   <p:cSld>
     <p:spTree>
@@ -24527,20 +25496,20 @@
   <p:clrMapOvr>
     <a:masterClrMapping/>
   </p:clrMapOvr>
-  <p:transition spd="med">
+  <p:transition xmlns:p14="http://schemas.microsoft.com/office/powerpoint/2010/main" spd="med">
     <p:fade/>
   </p:transition>
   <p:timing>
     <p:tnLst>
       <p:par>
-        <p:cTn id="1" dur="indefinite" restart="never" nodeType="tmRoot"/>
+        <p:cTn xmlns:p14="http://schemas.microsoft.com/office/powerpoint/2010/main" id="1" dur="indefinite" restart="never" nodeType="tmRoot"/>
       </p:par>
     </p:tnLst>
   </p:timing>
 </p:sld>
 </file>
 
-<file path=ppt/slides/slide13.xml><?xml version="1.0" encoding="utf-8"?>
+<file path=ppt/slides/slide14.xml><?xml version="1.0" encoding="utf-8"?>
 <p:sld xmlns:a="http://schemas.openxmlformats.org/drawingml/2006/main" xmlns:r="http://schemas.openxmlformats.org/officeDocument/2006/relationships" xmlns:p="http://schemas.openxmlformats.org/presentationml/2006/main">
   <p:cSld>
     <p:spTree>
@@ -24812,17 +25781,8 @@
             </a:pPr>
             <a:r>
               <a:rPr lang="en-US" dirty="0" smtClean="0"/>
-              <a:t>Allows </a:t>
-            </a:r>
-            <a:r>
-              <a:rPr lang="en-US" dirty="0" smtClean="0"/>
-              <a:t>for </a:t>
-            </a:r>
-            <a:r>
-              <a:rPr lang="en-US" dirty="0" smtClean="0"/>
-              <a:t>code re-use within recipes</a:t>
-            </a:r>
-            <a:endParaRPr lang="en-US" dirty="0" smtClean="0"/>
+              <a:t>Allows for code re-use within recipes</a:t>
+            </a:r>
           </a:p>
           <a:p>
             <a:pPr marL="457200" indent="-457200">
@@ -24867,7 +25827,6 @@
               <a:rPr lang="en-US" dirty="0" smtClean="0"/>
               <a:t>) </a:t>
             </a:r>
-            <a:endParaRPr lang="en-US" dirty="0" smtClean="0"/>
           </a:p>
           <a:p>
             <a:endParaRPr lang="en-US" dirty="0"/>
@@ -24884,20 +25843,20 @@
   <p:clrMapOvr>
     <a:masterClrMapping/>
   </p:clrMapOvr>
-  <p:transition spd="med">
+  <p:transition xmlns:p14="http://schemas.microsoft.com/office/powerpoint/2010/main" spd="med">
     <p:fade/>
   </p:transition>
   <p:timing>
     <p:tnLst>
       <p:par>
-        <p:cTn id="1" dur="indefinite" restart="never" nodeType="tmRoot"/>
+        <p:cTn xmlns:p14="http://schemas.microsoft.com/office/powerpoint/2010/main" id="1" dur="indefinite" restart="never" nodeType="tmRoot"/>
       </p:par>
     </p:tnLst>
   </p:timing>
 </p:sld>
 </file>
 
-<file path=ppt/slides/slide14.xml><?xml version="1.0" encoding="utf-8"?>
+<file path=ppt/slides/slide15.xml><?xml version="1.0" encoding="utf-8"?>
 <p:sld xmlns:a="http://schemas.openxmlformats.org/drawingml/2006/main" xmlns:r="http://schemas.openxmlformats.org/officeDocument/2006/relationships" xmlns:p="http://schemas.openxmlformats.org/presentationml/2006/main">
   <p:cSld>
     <p:spTree>
@@ -25466,11 +26425,6 @@
               </a:rPr>
               <a:t>User Defined Resource</a:t>
             </a:r>
-            <a:endParaRPr lang="en-US" sz="3200" dirty="0" smtClean="0">
-              <a:solidFill>
-                <a:schemeClr val="tx1"/>
-              </a:solidFill>
-            </a:endParaRPr>
           </a:p>
         </p:txBody>
       </p:sp>
@@ -25556,20 +26510,20 @@
   <p:clrMapOvr>
     <a:masterClrMapping/>
   </p:clrMapOvr>
-  <p:transition spd="med">
+  <p:transition xmlns:p14="http://schemas.microsoft.com/office/powerpoint/2010/main" spd="med">
     <p:fade/>
   </p:transition>
   <p:timing>
     <p:tnLst>
       <p:par>
-        <p:cTn id="1" dur="indefinite" restart="never" nodeType="tmRoot"/>
+        <p:cTn xmlns:p14="http://schemas.microsoft.com/office/powerpoint/2010/main" id="1" dur="indefinite" restart="never" nodeType="tmRoot"/>
       </p:par>
     </p:tnLst>
   </p:timing>
 </p:sld>
 </file>
 
-<file path=ppt/slides/slide15.xml><?xml version="1.0" encoding="utf-8"?>
+<file path=ppt/slides/slide16.xml><?xml version="1.0" encoding="utf-8"?>
 <p:sld xmlns:a="http://schemas.openxmlformats.org/drawingml/2006/main" xmlns:r="http://schemas.openxmlformats.org/officeDocument/2006/relationships" xmlns:p="http://schemas.openxmlformats.org/presentationml/2006/main">
   <p:cSld>
     <p:spTree>
@@ -26228,7 +27182,27 @@
             </a:r>
             <a:r>
               <a:rPr lang="en-US" dirty="0" smtClean="0"/>
-              <a:t>name is combined with the file name to create the name of the resource.</a:t>
+              <a:t>name is combined </a:t>
+            </a:r>
+            <a:r>
+              <a:rPr lang="en-US" dirty="0" smtClean="0"/>
+              <a:t>with </a:t>
+            </a:r>
+            <a:r>
+              <a:rPr lang="en-US" dirty="0" smtClean="0"/>
+              <a:t>the </a:t>
+            </a:r>
+            <a:r>
+              <a:rPr lang="en-US" dirty="0" smtClean="0"/>
+              <a:t>file </a:t>
+            </a:r>
+            <a:r>
+              <a:rPr lang="en-US" dirty="0" smtClean="0"/>
+              <a:t>name to create the name of the </a:t>
+            </a:r>
+            <a:r>
+              <a:rPr lang="en-US" dirty="0" smtClean="0"/>
+              <a:t>resource.</a:t>
             </a:r>
             <a:endParaRPr lang="en-US" dirty="0" smtClean="0"/>
           </a:p>
@@ -26244,20 +27218,20 @@
   <p:clrMapOvr>
     <a:masterClrMapping/>
   </p:clrMapOvr>
-  <p:transition spd="med">
+  <p:transition xmlns:p14="http://schemas.microsoft.com/office/powerpoint/2010/main" spd="med">
     <p:fade/>
   </p:transition>
   <p:timing>
     <p:tnLst>
       <p:par>
-        <p:cTn id="1" dur="indefinite" restart="never" nodeType="tmRoot"/>
+        <p:cTn xmlns:p14="http://schemas.microsoft.com/office/powerpoint/2010/main" id="1" dur="indefinite" restart="never" nodeType="tmRoot"/>
       </p:par>
     </p:tnLst>
   </p:timing>
 </p:sld>
 </file>
 
-<file path=ppt/slides/slide16.xml><?xml version="1.0" encoding="utf-8"?>
+<file path=ppt/slides/slide17.xml><?xml version="1.0" encoding="utf-8"?>
 <p:sld xmlns:a="http://schemas.openxmlformats.org/drawingml/2006/main" xmlns:r="http://schemas.openxmlformats.org/officeDocument/2006/relationships" xmlns:p="http://schemas.openxmlformats.org/presentationml/2006/main">
   <p:cSld>
     <p:spTree>
@@ -26475,23 +27449,7 @@
                   <a:lin ang="5400000" scaled="0"/>
                 </a:gradFill>
               </a:rPr>
-              <a:t>IMPLEMENTATION </a:t>
-            </a:r>
-            <a:r>
-              <a:rPr lang="en-US" b="1" dirty="0" smtClean="0">
-                <a:gradFill>
-                  <a:gsLst>
-                    <a:gs pos="0">
-                      <a:srgbClr val="FFFFFF"/>
-                    </a:gs>
-                    <a:gs pos="100000">
-                      <a:srgbClr val="FFFFFF"/>
-                    </a:gs>
-                  </a:gsLst>
-                  <a:lin ang="5400000" scaled="0"/>
-                </a:gradFill>
-              </a:rPr>
-              <a:t>LANGUAGE - RESOURCE</a:t>
+              <a:t>IMPLEMENTATION LANGUAGE - RESOURCE</a:t>
             </a:r>
             <a:endParaRPr lang="en-US" sz="2400" b="1" dirty="0" smtClean="0">
               <a:gradFill>
@@ -26644,11 +27602,6 @@
               </a:rPr>
               <a:t>, Integer, default: 80</a:t>
             </a:r>
-            <a:endParaRPr lang="en-US" sz="2000" b="1" dirty="0" smtClean="0">
-              <a:latin typeface="Courier New" charset="0"/>
-              <a:ea typeface="Courier New" charset="0"/>
-              <a:cs typeface="Courier New" charset="0"/>
-            </a:endParaRPr>
           </a:p>
         </p:txBody>
       </p:sp>
@@ -26713,20 +27666,20 @@
   <p:clrMapOvr>
     <a:masterClrMapping/>
   </p:clrMapOvr>
-  <p:transition spd="med">
+  <p:transition xmlns:p14="http://schemas.microsoft.com/office/powerpoint/2010/main" spd="med">
     <p:fade/>
   </p:transition>
   <p:timing>
     <p:tnLst>
       <p:par>
-        <p:cTn id="1" dur="indefinite" restart="never" nodeType="tmRoot"/>
+        <p:cTn xmlns:p14="http://schemas.microsoft.com/office/powerpoint/2010/main" id="1" dur="indefinite" restart="never" nodeType="tmRoot"/>
       </p:par>
     </p:tnLst>
   </p:timing>
 </p:sld>
 </file>
 
-<file path=ppt/slides/slide17.xml><?xml version="1.0" encoding="utf-8"?>
+<file path=ppt/slides/slide18.xml><?xml version="1.0" encoding="utf-8"?>
 <p:sld xmlns:a="http://schemas.openxmlformats.org/drawingml/2006/main" xmlns:r="http://schemas.openxmlformats.org/officeDocument/2006/relationships" xmlns:p="http://schemas.openxmlformats.org/presentationml/2006/main">
   <p:cSld>
     <p:spTree>
@@ -26944,23 +27897,7 @@
                   <a:lin ang="5400000" scaled="0"/>
                 </a:gradFill>
               </a:rPr>
-              <a:t>IMPLEMENTATION </a:t>
-            </a:r>
-            <a:r>
-              <a:rPr lang="en-US" b="1" dirty="0" smtClean="0">
-                <a:gradFill>
-                  <a:gsLst>
-                    <a:gs pos="0">
-                      <a:srgbClr val="FFFFFF"/>
-                    </a:gs>
-                    <a:gs pos="100000">
-                      <a:srgbClr val="FFFFFF"/>
-                    </a:gs>
-                  </a:gsLst>
-                  <a:lin ang="5400000" scaled="0"/>
-                </a:gradFill>
-              </a:rPr>
-              <a:t>LANGUAGE - PROVIDER</a:t>
+              <a:t>IMPLEMENTATION LANGUAGE - PROVIDER</a:t>
             </a:r>
             <a:endParaRPr lang="en-US" sz="2400" b="1" dirty="0" smtClean="0">
               <a:gradFill>
@@ -27463,20 +28400,20 @@
   <p:clrMapOvr>
     <a:masterClrMapping/>
   </p:clrMapOvr>
-  <p:transition spd="med">
+  <p:transition xmlns:p14="http://schemas.microsoft.com/office/powerpoint/2010/main" spd="med">
     <p:fade/>
   </p:transition>
   <p:timing>
     <p:tnLst>
       <p:par>
-        <p:cTn id="1" dur="indefinite" restart="never" nodeType="tmRoot"/>
+        <p:cTn xmlns:p14="http://schemas.microsoft.com/office/powerpoint/2010/main" id="1" dur="indefinite" restart="never" nodeType="tmRoot"/>
       </p:par>
     </p:tnLst>
   </p:timing>
 </p:sld>
 </file>
 
-<file path=ppt/slides/slide18.xml><?xml version="1.0" encoding="utf-8"?>
+<file path=ppt/slides/slide19.xml><?xml version="1.0" encoding="utf-8"?>
 <p:sld xmlns:a="http://schemas.openxmlformats.org/drawingml/2006/main" xmlns:r="http://schemas.openxmlformats.org/officeDocument/2006/relationships" xmlns:p="http://schemas.openxmlformats.org/presentationml/2006/main">
   <p:cSld>
     <p:spTree>
@@ -27694,6 +28631,620 @@
                   <a:lin ang="5400000" scaled="0"/>
                 </a:gradFill>
               </a:rPr>
+              <a:t>USAGE</a:t>
+            </a:r>
+            <a:endParaRPr lang="en-US" sz="2400" b="1" dirty="0" smtClean="0">
+              <a:gradFill>
+                <a:gsLst>
+                  <a:gs pos="0">
+                    <a:srgbClr val="FFFFFF"/>
+                  </a:gs>
+                  <a:gs pos="100000">
+                    <a:srgbClr val="FFFFFF"/>
+                  </a:gs>
+                </a:gsLst>
+                <a:lin ang="5400000" scaled="0"/>
+              </a:gradFill>
+            </a:endParaRPr>
+          </a:p>
+        </p:txBody>
+      </p:sp>
+      <p:sp>
+        <p:nvSpPr>
+          <p:cNvPr id="6" name="TextBox 5"/>
+          <p:cNvSpPr txBox="1"/>
+          <p:nvPr/>
+        </p:nvSpPr>
+        <p:spPr bwMode="white">
+          <a:xfrm>
+            <a:off x="736600" y="2652082"/>
+            <a:ext cx="14771520" cy="5417098"/>
+          </a:xfrm>
+          <a:prstGeom prst="rect">
+            <a:avLst/>
+          </a:prstGeom>
+          <a:ln w="12700">
+            <a:solidFill>
+              <a:schemeClr val="tx2"/>
+            </a:solidFill>
+            <a:prstDash val="dash"/>
+          </a:ln>
+        </p:spPr>
+        <p:txBody>
+          <a:bodyPr vert="horz" wrap="square" lIns="91440" tIns="91440" rIns="91440" bIns="91440" rtlCol="0">
+            <a:noAutofit/>
+          </a:bodyPr>
+          <a:lstStyle/>
+          <a:p>
+            <a:r>
+              <a:rPr lang="en-US" sz="2000" b="1" dirty="0" err="1">
+                <a:latin typeface="Courier New" charset="0"/>
+                <a:ea typeface="Courier New" charset="0"/>
+                <a:cs typeface="Courier New" charset="0"/>
+              </a:rPr>
+              <a:t>apache_vhost</a:t>
+            </a:r>
+            <a:r>
+              <a:rPr lang="en-US" sz="2000" b="1" dirty="0">
+                <a:latin typeface="Courier New" charset="0"/>
+                <a:ea typeface="Courier New" charset="0"/>
+                <a:cs typeface="Courier New" charset="0"/>
+              </a:rPr>
+              <a:t> 'welcome' do</a:t>
+            </a:r>
+          </a:p>
+          <a:p>
+            <a:r>
+              <a:rPr lang="en-US" sz="2000" b="1" dirty="0">
+                <a:latin typeface="Courier New" charset="0"/>
+                <a:ea typeface="Courier New" charset="0"/>
+                <a:cs typeface="Courier New" charset="0"/>
+              </a:rPr>
+              <a:t>  action :delete</a:t>
+            </a:r>
+          </a:p>
+          <a:p>
+            <a:r>
+              <a:rPr lang="en-US" sz="2000" b="1" dirty="0">
+                <a:latin typeface="Courier New" charset="0"/>
+                <a:ea typeface="Courier New" charset="0"/>
+                <a:cs typeface="Courier New" charset="0"/>
+              </a:rPr>
+              <a:t>end</a:t>
+            </a:r>
+          </a:p>
+          <a:p>
+            <a:endParaRPr lang="en-US" sz="2000" b="1" dirty="0">
+              <a:latin typeface="Courier New" charset="0"/>
+              <a:ea typeface="Courier New" charset="0"/>
+              <a:cs typeface="Courier New" charset="0"/>
+            </a:endParaRPr>
+          </a:p>
+          <a:p>
+            <a:r>
+              <a:rPr lang="en-US" sz="2000" b="1" dirty="0" err="1">
+                <a:latin typeface="Courier New" charset="0"/>
+                <a:ea typeface="Courier New" charset="0"/>
+                <a:cs typeface="Courier New" charset="0"/>
+              </a:rPr>
+              <a:t>apache_vhost</a:t>
+            </a:r>
+            <a:r>
+              <a:rPr lang="en-US" sz="2000" b="1" dirty="0">
+                <a:latin typeface="Courier New" charset="0"/>
+                <a:ea typeface="Courier New" charset="0"/>
+                <a:cs typeface="Courier New" charset="0"/>
+              </a:rPr>
+              <a:t> 'users'</a:t>
+            </a:r>
+          </a:p>
+          <a:p>
+            <a:endParaRPr lang="en-US" sz="2000" b="1" dirty="0">
+              <a:latin typeface="Courier New" charset="0"/>
+              <a:ea typeface="Courier New" charset="0"/>
+              <a:cs typeface="Courier New" charset="0"/>
+            </a:endParaRPr>
+          </a:p>
+          <a:p>
+            <a:r>
+              <a:rPr lang="en-US" sz="2000" b="1" dirty="0" err="1">
+                <a:latin typeface="Courier New" charset="0"/>
+                <a:ea typeface="Courier New" charset="0"/>
+                <a:cs typeface="Courier New" charset="0"/>
+              </a:rPr>
+              <a:t>apache_vhost</a:t>
+            </a:r>
+            <a:r>
+              <a:rPr lang="en-US" sz="2000" b="1" dirty="0">
+                <a:latin typeface="Courier New" charset="0"/>
+                <a:ea typeface="Courier New" charset="0"/>
+                <a:cs typeface="Courier New" charset="0"/>
+              </a:rPr>
+              <a:t> 'admins' do</a:t>
+            </a:r>
+          </a:p>
+          <a:p>
+            <a:r>
+              <a:rPr lang="en-US" sz="2000" b="1" dirty="0">
+                <a:latin typeface="Courier New" charset="0"/>
+                <a:ea typeface="Courier New" charset="0"/>
+                <a:cs typeface="Courier New" charset="0"/>
+              </a:rPr>
+              <a:t>  </a:t>
+            </a:r>
+            <a:r>
+              <a:rPr lang="en-US" sz="2000" b="1" dirty="0" err="1">
+                <a:latin typeface="Courier New" charset="0"/>
+                <a:ea typeface="Courier New" charset="0"/>
+                <a:cs typeface="Courier New" charset="0"/>
+              </a:rPr>
+              <a:t>site_port</a:t>
+            </a:r>
+            <a:r>
+              <a:rPr lang="en-US" sz="2000" b="1" dirty="0">
+                <a:latin typeface="Courier New" charset="0"/>
+                <a:ea typeface="Courier New" charset="0"/>
+                <a:cs typeface="Courier New" charset="0"/>
+              </a:rPr>
+              <a:t> 8080</a:t>
+            </a:r>
+          </a:p>
+          <a:p>
+            <a:r>
+              <a:rPr lang="en-US" sz="2000" b="1" dirty="0">
+                <a:latin typeface="Courier New" charset="0"/>
+                <a:ea typeface="Courier New" charset="0"/>
+                <a:cs typeface="Courier New" charset="0"/>
+              </a:rPr>
+              <a:t>end</a:t>
+            </a:r>
+            <a:endParaRPr lang="en-US" sz="2000" b="1" dirty="0">
+              <a:latin typeface="Courier New" charset="0"/>
+              <a:ea typeface="Courier New" charset="0"/>
+              <a:cs typeface="Courier New" charset="0"/>
+            </a:endParaRPr>
+          </a:p>
+        </p:txBody>
+      </p:sp>
+      <p:sp>
+        <p:nvSpPr>
+          <p:cNvPr id="11" name="TextBox 10"/>
+          <p:cNvSpPr txBox="1"/>
+          <p:nvPr/>
+        </p:nvSpPr>
+        <p:spPr bwMode="white">
+          <a:xfrm>
+            <a:off x="736600" y="1912524"/>
+            <a:ext cx="14771520" cy="597568"/>
+          </a:xfrm>
+          <a:prstGeom prst="rect">
+            <a:avLst/>
+          </a:prstGeom>
+          <a:solidFill>
+            <a:schemeClr val="bg1">
+              <a:lumMod val="85000"/>
+              <a:alpha val="50000"/>
+            </a:schemeClr>
+          </a:solidFill>
+        </p:spPr>
+        <p:txBody>
+          <a:bodyPr vert="horz" wrap="square" lIns="91440" tIns="91440" rIns="91440" bIns="91440" rtlCol="0">
+            <a:normAutofit/>
+          </a:bodyPr>
+          <a:lstStyle/>
+          <a:p>
+            <a:r>
+              <a:rPr lang="en-US" b="1" dirty="0" smtClean="0">
+                <a:latin typeface="Courier New" charset="0"/>
+                <a:ea typeface="Courier New" charset="0"/>
+                <a:cs typeface="Courier New" charset="0"/>
+              </a:rPr>
+              <a:t>recipes/</a:t>
+            </a:r>
+            <a:r>
+              <a:rPr lang="en-US" b="1" dirty="0" err="1" smtClean="0">
+                <a:latin typeface="Courier New" charset="0"/>
+                <a:ea typeface="Courier New" charset="0"/>
+                <a:cs typeface="Courier New" charset="0"/>
+              </a:rPr>
+              <a:t>default.rb</a:t>
+            </a:r>
+            <a:endParaRPr lang="en-US" b="1" dirty="0" smtClean="0">
+              <a:latin typeface="Courier New" charset="0"/>
+              <a:ea typeface="Courier New" charset="0"/>
+              <a:cs typeface="Courier New" charset="0"/>
+            </a:endParaRPr>
+          </a:p>
+        </p:txBody>
+      </p:sp>
+    </p:spTree>
+    <p:extLst>
+      <p:ext uri="{BB962C8B-B14F-4D97-AF65-F5344CB8AC3E}">
+        <p14:creationId xmlns:p14="http://schemas.microsoft.com/office/powerpoint/2010/main" val="2482078144"/>
+      </p:ext>
+    </p:extLst>
+  </p:cSld>
+  <p:clrMapOvr>
+    <a:masterClrMapping/>
+  </p:clrMapOvr>
+  <p:transition xmlns:p14="http://schemas.microsoft.com/office/powerpoint/2010/main" spd="med">
+    <p:fade/>
+  </p:transition>
+  <p:timing>
+    <p:tnLst>
+      <p:par>
+        <p:cTn xmlns:p14="http://schemas.microsoft.com/office/powerpoint/2010/main" id="1" dur="indefinite" restart="never" nodeType="tmRoot"/>
+      </p:par>
+    </p:tnLst>
+  </p:timing>
+</p:sld>
+</file>
+
+<file path=ppt/slides/slide2.xml><?xml version="1.0" encoding="utf-8"?>
+<p:sld xmlns:a="http://schemas.openxmlformats.org/drawingml/2006/main" xmlns:r="http://schemas.openxmlformats.org/officeDocument/2006/relationships" xmlns:p="http://schemas.openxmlformats.org/presentationml/2006/main">
+  <p:cSld>
+    <p:spTree>
+      <p:nvGrpSpPr>
+        <p:cNvPr id="1" name=""/>
+        <p:cNvGrpSpPr/>
+        <p:nvPr/>
+      </p:nvGrpSpPr>
+      <p:grpSpPr>
+        <a:xfrm>
+          <a:off x="0" y="0"/>
+          <a:ext cx="0" cy="0"/>
+          <a:chOff x="0" y="0"/>
+          <a:chExt cx="0" cy="0"/>
+        </a:xfrm>
+      </p:grpSpPr>
+      <p:sp>
+        <p:nvSpPr>
+          <p:cNvPr id="2" name="Title 1"/>
+          <p:cNvSpPr>
+            <a:spLocks noGrp="1"/>
+          </p:cNvSpPr>
+          <p:nvPr>
+            <p:ph type="title"/>
+          </p:nvPr>
+        </p:nvSpPr>
+        <p:spPr/>
+        <p:txBody>
+          <a:bodyPr/>
+          <a:lstStyle/>
+          <a:p>
+            <a:r>
+              <a:rPr lang="en-US" dirty="0" smtClean="0"/>
+              <a:t>Objectives</a:t>
+            </a:r>
+            <a:endParaRPr lang="en-US" dirty="0"/>
+          </a:p>
+        </p:txBody>
+      </p:sp>
+      <p:sp>
+        <p:nvSpPr>
+          <p:cNvPr id="3" name="Text Placeholder 2"/>
+          <p:cNvSpPr>
+            <a:spLocks noGrp="1"/>
+          </p:cNvSpPr>
+          <p:nvPr>
+            <p:ph type="body" sz="quarter" idx="12"/>
+          </p:nvPr>
+        </p:nvSpPr>
+        <p:spPr/>
+        <p:txBody>
+          <a:bodyPr/>
+          <a:lstStyle/>
+          <a:p>
+            <a:r>
+              <a:rPr lang="en-US" dirty="0" smtClean="0"/>
+              <a:t>After completing this module, you should be able to:</a:t>
+            </a:r>
+          </a:p>
+          <a:p>
+            <a:endParaRPr lang="en-US" dirty="0"/>
+          </a:p>
+          <a:p>
+            <a:pPr marL="457200" indent="-457200">
+              <a:buFont typeface="Wingdings" charset="2"/>
+              <a:buChar char="Ø"/>
+            </a:pPr>
+            <a:r>
+              <a:rPr lang="en-US" dirty="0" smtClean="0"/>
+              <a:t>Describe the difference between:</a:t>
+            </a:r>
+          </a:p>
+          <a:p>
+            <a:pPr marL="1296988" lvl="3" indent="-457200">
+              <a:buFont typeface="Arial"/>
+              <a:buChar char="•"/>
+            </a:pPr>
+            <a:r>
+              <a:rPr lang="en-US" sz="2800" dirty="0" smtClean="0"/>
+              <a:t>Custom Resources</a:t>
+            </a:r>
+            <a:endParaRPr lang="en-US" sz="2800" dirty="0"/>
+          </a:p>
+          <a:p>
+            <a:pPr marL="1296988" lvl="3" indent="-457200">
+              <a:buFont typeface="Arial"/>
+              <a:buChar char="•"/>
+            </a:pPr>
+            <a:r>
+              <a:rPr lang="en-US" sz="2800" dirty="0" smtClean="0"/>
+              <a:t>Definitions</a:t>
+            </a:r>
+          </a:p>
+          <a:p>
+            <a:pPr marL="1296988" lvl="3" indent="-457200">
+              <a:buFont typeface="Arial"/>
+              <a:buChar char="•"/>
+            </a:pPr>
+            <a:r>
+              <a:rPr lang="en-US" sz="2800" dirty="0" smtClean="0"/>
+              <a:t>Heavy</a:t>
+            </a:r>
+            <a:r>
+              <a:rPr lang="en-US" sz="2800" dirty="0"/>
+              <a:t>-Weight Resource-</a:t>
+            </a:r>
+            <a:r>
+              <a:rPr lang="en-US" sz="2800" dirty="0" smtClean="0"/>
+              <a:t>Providers</a:t>
+            </a:r>
+          </a:p>
+          <a:p>
+            <a:pPr marL="1296988" lvl="3" indent="-457200">
+              <a:buFont typeface="Arial"/>
+              <a:buChar char="•"/>
+            </a:pPr>
+            <a:r>
+              <a:rPr lang="en-US" sz="2800" dirty="0" smtClean="0"/>
+              <a:t>Light-Weight Resource-Providers</a:t>
+            </a:r>
+          </a:p>
+        </p:txBody>
+      </p:sp>
+    </p:spTree>
+    <p:extLst>
+      <p:ext uri="{BB962C8B-B14F-4D97-AF65-F5344CB8AC3E}">
+        <p14:creationId xmlns:p14="http://schemas.microsoft.com/office/powerpoint/2010/main" val="3816834146"/>
+      </p:ext>
+    </p:extLst>
+  </p:cSld>
+  <p:clrMapOvr>
+    <a:masterClrMapping/>
+  </p:clrMapOvr>
+  <p:transition xmlns:p14="http://schemas.microsoft.com/office/powerpoint/2010/main" spd="med">
+    <p:fade/>
+  </p:transition>
+  <p:timing>
+    <p:tnLst>
+      <p:par>
+        <p:cTn xmlns:p14="http://schemas.microsoft.com/office/powerpoint/2010/main" id="1" dur="indefinite" restart="never" nodeType="tmRoot"/>
+      </p:par>
+    </p:tnLst>
+  </p:timing>
+</p:sld>
+</file>
+
+<file path=ppt/slides/slide20.xml><?xml version="1.0" encoding="utf-8"?>
+<p:sld xmlns:a="http://schemas.openxmlformats.org/drawingml/2006/main" xmlns:r="http://schemas.openxmlformats.org/officeDocument/2006/relationships" xmlns:p="http://schemas.openxmlformats.org/presentationml/2006/main">
+  <p:cSld>
+    <p:spTree>
+      <p:nvGrpSpPr>
+        <p:cNvPr id="1" name=""/>
+        <p:cNvGrpSpPr/>
+        <p:nvPr/>
+      </p:nvGrpSpPr>
+      <p:grpSpPr>
+        <a:xfrm>
+          <a:off x="0" y="0"/>
+          <a:ext cx="0" cy="0"/>
+          <a:chOff x="0" y="0"/>
+          <a:chExt cx="0" cy="0"/>
+        </a:xfrm>
+      </p:grpSpPr>
+      <p:sp>
+        <p:nvSpPr>
+          <p:cNvPr id="10" name="Title 9"/>
+          <p:cNvSpPr>
+            <a:spLocks noGrp="1"/>
+          </p:cNvSpPr>
+          <p:nvPr>
+            <p:ph type="title"/>
+          </p:nvPr>
+        </p:nvSpPr>
+        <p:spPr/>
+        <p:txBody>
+          <a:bodyPr/>
+          <a:lstStyle/>
+          <a:p>
+            <a:r>
+              <a:rPr lang="en-US" dirty="0" smtClean="0"/>
+              <a:t> </a:t>
+            </a:r>
+            <a:endParaRPr lang="en-US" dirty="0"/>
+          </a:p>
+        </p:txBody>
+      </p:sp>
+      <p:sp>
+        <p:nvSpPr>
+          <p:cNvPr id="7" name="TextBox 6"/>
+          <p:cNvSpPr txBox="1"/>
+          <p:nvPr/>
+        </p:nvSpPr>
+        <p:spPr bwMode="white">
+          <a:xfrm>
+            <a:off x="773280" y="263175"/>
+            <a:ext cx="14771520" cy="955963"/>
+          </a:xfrm>
+          <a:prstGeom prst="rect">
+            <a:avLst/>
+          </a:prstGeom>
+        </p:spPr>
+        <p:style>
+          <a:lnRef idx="2">
+            <a:schemeClr val="accent5">
+              <a:shade val="50000"/>
+            </a:schemeClr>
+          </a:lnRef>
+          <a:fillRef idx="1">
+            <a:schemeClr val="accent5"/>
+          </a:fillRef>
+          <a:effectRef idx="0">
+            <a:schemeClr val="accent5"/>
+          </a:effectRef>
+          <a:fontRef idx="minor">
+            <a:schemeClr val="lt1"/>
+          </a:fontRef>
+        </p:style>
+        <p:txBody>
+          <a:bodyPr vert="horz" wrap="square" lIns="731520" tIns="91440" rIns="91440" bIns="91440" rtlCol="0" anchor="ctr">
+            <a:normAutofit/>
+          </a:bodyPr>
+          <a:lstStyle/>
+          <a:p>
+            <a:r>
+              <a:rPr lang="en-US" sz="3600" dirty="0"/>
+              <a:t>Light-Weight  Resource-Providers (LWRP)</a:t>
+            </a:r>
+          </a:p>
+        </p:txBody>
+      </p:sp>
+      <p:sp>
+        <p:nvSpPr>
+          <p:cNvPr id="8" name="Oval 7"/>
+          <p:cNvSpPr/>
+          <p:nvPr/>
+        </p:nvSpPr>
+        <p:spPr bwMode="auto">
+          <a:xfrm>
+            <a:off x="302407" y="263175"/>
+            <a:ext cx="941746" cy="941746"/>
+          </a:xfrm>
+          <a:prstGeom prst="ellipse">
+            <a:avLst/>
+          </a:prstGeom>
+          <a:ln>
+            <a:headEnd type="none" w="med" len="med"/>
+            <a:tailEnd type="none" w="med" len="med"/>
+          </a:ln>
+        </p:spPr>
+        <p:style>
+          <a:lnRef idx="2">
+            <a:schemeClr val="accent5">
+              <a:shade val="50000"/>
+            </a:schemeClr>
+          </a:lnRef>
+          <a:fillRef idx="1">
+            <a:schemeClr val="accent5"/>
+          </a:fillRef>
+          <a:effectRef idx="0">
+            <a:schemeClr val="accent5"/>
+          </a:effectRef>
+          <a:fontRef idx="minor">
+            <a:schemeClr val="lt1"/>
+          </a:fontRef>
+        </p:style>
+        <p:txBody>
+          <a:bodyPr vert="horz" wrap="square" lIns="91436" tIns="45718" rIns="91436" bIns="45718" numCol="1" rtlCol="0" anchor="ctr" anchorCtr="0" compatLnSpc="1">
+            <a:prstTxWarp prst="textNoShape">
+              <a:avLst/>
+            </a:prstTxWarp>
+          </a:bodyPr>
+          <a:lstStyle/>
+          <a:p>
+            <a:pPr algn="ctr" defTabSz="914099"/>
+            <a:r>
+              <a:rPr lang="en-US" sz="4000" b="1" dirty="0">
+                <a:gradFill>
+                  <a:gsLst>
+                    <a:gs pos="0">
+                      <a:srgbClr val="FFFFFF"/>
+                    </a:gs>
+                    <a:gs pos="100000">
+                      <a:srgbClr val="FFFFFF"/>
+                    </a:gs>
+                  </a:gsLst>
+                  <a:lin ang="5400000" scaled="0"/>
+                </a:gradFill>
+              </a:rPr>
+              <a:t>3</a:t>
+            </a:r>
+            <a:endParaRPr lang="en-US" sz="4000" b="1" dirty="0" smtClean="0">
+              <a:gradFill>
+                <a:gsLst>
+                  <a:gs pos="0">
+                    <a:srgbClr val="FFFFFF"/>
+                  </a:gs>
+                  <a:gs pos="100000">
+                    <a:srgbClr val="FFFFFF"/>
+                  </a:gs>
+                </a:gsLst>
+                <a:lin ang="5400000" scaled="0"/>
+              </a:gradFill>
+            </a:endParaRPr>
+          </a:p>
+        </p:txBody>
+      </p:sp>
+      <p:sp>
+        <p:nvSpPr>
+          <p:cNvPr id="9" name="Rectangle 8"/>
+          <p:cNvSpPr/>
+          <p:nvPr/>
+        </p:nvSpPr>
+        <p:spPr bwMode="auto">
+          <a:xfrm>
+            <a:off x="773280" y="1240394"/>
+            <a:ext cx="14771520" cy="530141"/>
+          </a:xfrm>
+          <a:prstGeom prst="rect">
+            <a:avLst/>
+          </a:prstGeom>
+          <a:ln>
+            <a:headEnd type="none" w="med" len="med"/>
+            <a:tailEnd type="none" w="med" len="med"/>
+          </a:ln>
+        </p:spPr>
+        <p:style>
+          <a:lnRef idx="2">
+            <a:schemeClr val="dk1">
+              <a:shade val="50000"/>
+            </a:schemeClr>
+          </a:lnRef>
+          <a:fillRef idx="1">
+            <a:schemeClr val="dk1"/>
+          </a:fillRef>
+          <a:effectRef idx="0">
+            <a:schemeClr val="dk1"/>
+          </a:effectRef>
+          <a:fontRef idx="minor">
+            <a:schemeClr val="lt1"/>
+          </a:fontRef>
+        </p:style>
+        <p:txBody>
+          <a:bodyPr vert="horz" wrap="square" lIns="91436" tIns="45718" rIns="91436" bIns="45718" numCol="1" rtlCol="0" anchor="ctr" anchorCtr="0" compatLnSpc="1">
+            <a:prstTxWarp prst="textNoShape">
+              <a:avLst/>
+            </a:prstTxWarp>
+          </a:bodyPr>
+          <a:lstStyle/>
+          <a:p>
+            <a:pPr algn="r" defTabSz="914099"/>
+            <a:r>
+              <a:rPr lang="en-US" b="1" dirty="0" smtClean="0">
+                <a:gradFill>
+                  <a:gsLst>
+                    <a:gs pos="0">
+                      <a:srgbClr val="FFFFFF"/>
+                    </a:gs>
+                    <a:gs pos="100000">
+                      <a:srgbClr val="FFFFFF"/>
+                    </a:gs>
+                  </a:gsLst>
+                  <a:lin ang="5400000" scaled="0"/>
+                </a:gradFill>
+              </a:rPr>
               <a:t>BENEFITS &amp; DRAWBACKS</a:t>
             </a:r>
             <a:endParaRPr lang="en-US" b="1" dirty="0">
@@ -27742,7 +29293,11 @@
             </a:r>
             <a:r>
               <a:rPr lang="en-US" dirty="0" smtClean="0"/>
-              <a:t>X version of Chef</a:t>
+              <a:t>0.7.12 </a:t>
+            </a:r>
+            <a:r>
+              <a:rPr lang="en-US" dirty="0" smtClean="0"/>
+              <a:t>version of Chef</a:t>
             </a:r>
           </a:p>
           <a:p>
@@ -27788,20 +29343,20 @@
   <p:clrMapOvr>
     <a:masterClrMapping/>
   </p:clrMapOvr>
-  <p:transition spd="med">
+  <p:transition xmlns:p14="http://schemas.microsoft.com/office/powerpoint/2010/main" spd="med">
     <p:fade/>
   </p:transition>
   <p:timing>
     <p:tnLst>
       <p:par>
-        <p:cTn id="1" dur="indefinite" restart="never" nodeType="tmRoot"/>
+        <p:cTn xmlns:p14="http://schemas.microsoft.com/office/powerpoint/2010/main" id="1" dur="indefinite" restart="never" nodeType="tmRoot"/>
       </p:par>
     </p:tnLst>
   </p:timing>
 </p:sld>
 </file>
 
-<file path=ppt/slides/slide19.xml><?xml version="1.0" encoding="utf-8"?>
+<file path=ppt/slides/slide21.xml><?xml version="1.0" encoding="utf-8"?>
 <p:sld xmlns:a="http://schemas.openxmlformats.org/drawingml/2006/main" xmlns:r="http://schemas.openxmlformats.org/officeDocument/2006/relationships" xmlns:p="http://schemas.openxmlformats.org/presentationml/2006/main">
   <p:cSld>
     <p:spTree>
@@ -28245,19 +29800,6 @@
               </a:rPr>
               <a:t>User Defined Resource</a:t>
             </a:r>
-            <a:endParaRPr lang="en-US" sz="2400" dirty="0" smtClean="0">
-              <a:gradFill>
-                <a:gsLst>
-                  <a:gs pos="0">
-                    <a:srgbClr val="FFFFFF"/>
-                  </a:gs>
-                  <a:gs pos="100000">
-                    <a:srgbClr val="FFFFFF"/>
-                  </a:gs>
-                </a:gsLst>
-                <a:lin ang="5400000" scaled="0"/>
-              </a:gradFill>
-            </a:endParaRPr>
           </a:p>
         </p:txBody>
       </p:sp>
@@ -28343,167 +29885,20 @@
   <p:clrMapOvr>
     <a:masterClrMapping/>
   </p:clrMapOvr>
-  <p:transition spd="med">
+  <p:transition xmlns:p14="http://schemas.microsoft.com/office/powerpoint/2010/main" spd="med">
     <p:fade/>
   </p:transition>
   <p:timing>
     <p:tnLst>
       <p:par>
-        <p:cTn id="1" dur="indefinite" restart="never" nodeType="tmRoot"/>
+        <p:cTn xmlns:p14="http://schemas.microsoft.com/office/powerpoint/2010/main" id="1" dur="indefinite" restart="never" nodeType="tmRoot"/>
       </p:par>
     </p:tnLst>
   </p:timing>
 </p:sld>
 </file>
 
-<file path=ppt/slides/slide2.xml><?xml version="1.0" encoding="utf-8"?>
-<p:sld xmlns:a="http://schemas.openxmlformats.org/drawingml/2006/main" xmlns:r="http://schemas.openxmlformats.org/officeDocument/2006/relationships" xmlns:p="http://schemas.openxmlformats.org/presentationml/2006/main">
-  <p:cSld>
-    <p:spTree>
-      <p:nvGrpSpPr>
-        <p:cNvPr id="1" name=""/>
-        <p:cNvGrpSpPr/>
-        <p:nvPr/>
-      </p:nvGrpSpPr>
-      <p:grpSpPr>
-        <a:xfrm>
-          <a:off x="0" y="0"/>
-          <a:ext cx="0" cy="0"/>
-          <a:chOff x="0" y="0"/>
-          <a:chExt cx="0" cy="0"/>
-        </a:xfrm>
-      </p:grpSpPr>
-      <p:sp>
-        <p:nvSpPr>
-          <p:cNvPr id="2" name="Title 1"/>
-          <p:cNvSpPr>
-            <a:spLocks noGrp="1"/>
-          </p:cNvSpPr>
-          <p:nvPr>
-            <p:ph type="title"/>
-          </p:nvPr>
-        </p:nvSpPr>
-        <p:spPr/>
-        <p:txBody>
-          <a:bodyPr/>
-          <a:lstStyle/>
-          <a:p>
-            <a:r>
-              <a:rPr lang="en-US" dirty="0" smtClean="0"/>
-              <a:t>Objectives</a:t>
-            </a:r>
-            <a:endParaRPr lang="en-US" dirty="0"/>
-          </a:p>
-        </p:txBody>
-      </p:sp>
-      <p:sp>
-        <p:nvSpPr>
-          <p:cNvPr id="3" name="Text Placeholder 2"/>
-          <p:cNvSpPr>
-            <a:spLocks noGrp="1"/>
-          </p:cNvSpPr>
-          <p:nvPr>
-            <p:ph type="body" sz="quarter" idx="12"/>
-          </p:nvPr>
-        </p:nvSpPr>
-        <p:spPr/>
-        <p:txBody>
-          <a:bodyPr/>
-          <a:lstStyle/>
-          <a:p>
-            <a:r>
-              <a:rPr lang="en-US" dirty="0" smtClean="0"/>
-              <a:t>After completing this module, you should be able to:</a:t>
-            </a:r>
-          </a:p>
-          <a:p>
-            <a:endParaRPr lang="en-US" dirty="0"/>
-          </a:p>
-          <a:p>
-            <a:pPr marL="457200" indent="-457200">
-              <a:buFont typeface="Wingdings" charset="2"/>
-              <a:buChar char="Ø"/>
-            </a:pPr>
-            <a:r>
-              <a:rPr lang="en-US" dirty="0" smtClean="0"/>
-              <a:t>Describe the difference between:</a:t>
-            </a:r>
-          </a:p>
-          <a:p>
-            <a:pPr marL="1296988" lvl="3" indent="-457200">
-              <a:buFont typeface="Arial"/>
-              <a:buChar char="•"/>
-            </a:pPr>
-            <a:r>
-              <a:rPr lang="en-US" sz="2800" dirty="0" smtClean="0"/>
-              <a:t>Custom Resources</a:t>
-            </a:r>
-            <a:endParaRPr lang="en-US" sz="2800" dirty="0"/>
-          </a:p>
-          <a:p>
-            <a:pPr marL="1296988" lvl="3" indent="-457200">
-              <a:buFont typeface="Arial"/>
-              <a:buChar char="•"/>
-            </a:pPr>
-            <a:r>
-              <a:rPr lang="en-US" sz="2800" dirty="0" smtClean="0"/>
-              <a:t>Definitions</a:t>
-            </a:r>
-          </a:p>
-          <a:p>
-            <a:pPr marL="1296988" lvl="3" indent="-457200">
-              <a:buFont typeface="Arial"/>
-              <a:buChar char="•"/>
-            </a:pPr>
-            <a:r>
-              <a:rPr lang="en-US" sz="2800" dirty="0" smtClean="0"/>
-              <a:t>Heavy</a:t>
-            </a:r>
-            <a:r>
-              <a:rPr lang="en-US" sz="2800" dirty="0"/>
-              <a:t>-Weight Resource-</a:t>
-            </a:r>
-            <a:r>
-              <a:rPr lang="en-US" sz="2800" dirty="0" smtClean="0"/>
-              <a:t>Providers</a:t>
-            </a:r>
-          </a:p>
-          <a:p>
-            <a:pPr marL="1296988" lvl="3" indent="-457200">
-              <a:buFont typeface="Arial"/>
-              <a:buChar char="•"/>
-            </a:pPr>
-            <a:r>
-              <a:rPr lang="en-US" sz="2800" dirty="0" smtClean="0"/>
-              <a:t>Light-Weight Resource-Providers</a:t>
-            </a:r>
-          </a:p>
-        </p:txBody>
-      </p:sp>
-    </p:spTree>
-    <p:extLst>
-      <p:ext uri="{BB962C8B-B14F-4D97-AF65-F5344CB8AC3E}">
-        <p14:creationId xmlns:p14="http://schemas.microsoft.com/office/powerpoint/2010/main" val="3816834146"/>
-      </p:ext>
-    </p:extLst>
-  </p:cSld>
-  <p:clrMapOvr>
-    <a:masterClrMapping/>
-  </p:clrMapOvr>
-  <p:transition spd="med">
-    <p:fade/>
-  </p:transition>
-  <p:timing>
-    <p:tnLst>
-      <p:par>
-        <p:cTn id="1" dur="indefinite" restart="never" nodeType="tmRoot"/>
-      </p:par>
-    </p:tnLst>
-  </p:timing>
-</p:sld>
-</file>
-
-<file path=ppt/slides/slide20.xml><?xml version="1.0" encoding="utf-8"?>
+<file path=ppt/slides/slide22.xml><?xml version="1.0" encoding="utf-8"?>
 <p:sld xmlns:a="http://schemas.openxmlformats.org/drawingml/2006/main" xmlns:r="http://schemas.openxmlformats.org/officeDocument/2006/relationships" xmlns:p="http://schemas.openxmlformats.org/presentationml/2006/main">
   <p:cSld>
     <p:spTree>
@@ -29062,7 +30457,6 @@
               <a:rPr lang="en-US" dirty="0" smtClean="0"/>
               <a:t>A custom resource is defined in a single file within the resources directory.</a:t>
             </a:r>
-            <a:endParaRPr lang="en-US" dirty="0" smtClean="0"/>
           </a:p>
         </p:txBody>
       </p:sp>
@@ -29076,20 +30470,20 @@
   <p:clrMapOvr>
     <a:masterClrMapping/>
   </p:clrMapOvr>
-  <p:transition spd="med">
+  <p:transition xmlns:p14="http://schemas.microsoft.com/office/powerpoint/2010/main" spd="med">
     <p:fade/>
   </p:transition>
   <p:timing>
     <p:tnLst>
       <p:par>
-        <p:cTn id="1" dur="indefinite" restart="never" nodeType="tmRoot"/>
+        <p:cTn xmlns:p14="http://schemas.microsoft.com/office/powerpoint/2010/main" id="1" dur="indefinite" restart="never" nodeType="tmRoot"/>
       </p:par>
     </p:tnLst>
   </p:timing>
 </p:sld>
 </file>
 
-<file path=ppt/slides/slide21.xml><?xml version="1.0" encoding="utf-8"?>
+<file path=ppt/slides/slide23.xml><?xml version="1.0" encoding="utf-8"?>
 <p:sld xmlns:a="http://schemas.openxmlformats.org/drawingml/2006/main" xmlns:r="http://schemas.openxmlformats.org/officeDocument/2006/relationships" xmlns:p="http://schemas.openxmlformats.org/presentationml/2006/main">
   <p:cSld>
     <p:spTree>
@@ -29619,6 +31013,23 @@
               </a:rPr>
               <a:t>end</a:t>
             </a:r>
+          </a:p>
+          <a:p>
+            <a:endParaRPr lang="en-US" sz="2000" b="1" dirty="0">
+              <a:latin typeface="Courier New" charset="0"/>
+              <a:ea typeface="Courier New" charset="0"/>
+              <a:cs typeface="Courier New" charset="0"/>
+            </a:endParaRPr>
+          </a:p>
+          <a:p>
+            <a:r>
+              <a:rPr lang="en-US" sz="2000" b="1" dirty="0" smtClean="0">
+                <a:latin typeface="Courier New" charset="0"/>
+                <a:ea typeface="Courier New" charset="0"/>
+                <a:cs typeface="Courier New" charset="0"/>
+              </a:rPr>
+              <a:t># ... remaining actions ...</a:t>
+            </a:r>
             <a:endParaRPr lang="en-US" sz="2000" b="1" dirty="0">
               <a:latin typeface="Courier New" charset="0"/>
               <a:ea typeface="Courier New" charset="0"/>
@@ -29688,20 +31099,20 @@
   <p:clrMapOvr>
     <a:masterClrMapping/>
   </p:clrMapOvr>
-  <p:transition spd="med">
+  <p:transition xmlns:p14="http://schemas.microsoft.com/office/powerpoint/2010/main" spd="med">
     <p:fade/>
   </p:transition>
   <p:timing>
     <p:tnLst>
       <p:par>
-        <p:cTn id="1" dur="indefinite" restart="never" nodeType="tmRoot"/>
+        <p:cTn xmlns:p14="http://schemas.microsoft.com/office/powerpoint/2010/main" id="1" dur="indefinite" restart="never" nodeType="tmRoot"/>
       </p:par>
     </p:tnLst>
   </p:timing>
 </p:sld>
 </file>
 
-<file path=ppt/slides/slide22.xml><?xml version="1.0" encoding="utf-8"?>
+<file path=ppt/slides/slide24.xml><?xml version="1.0" encoding="utf-8"?>
 <p:sld xmlns:a="http://schemas.openxmlformats.org/drawingml/2006/main" xmlns:r="http://schemas.openxmlformats.org/officeDocument/2006/relationships" xmlns:p="http://schemas.openxmlformats.org/presentationml/2006/main">
   <p:cSld>
     <p:spTree>
@@ -29779,7 +31190,7 @@
           <a:lstStyle/>
           <a:p>
             <a:r>
-              <a:rPr lang="en-US" sz="3600" dirty="0" smtClean="0"/>
+              <a:rPr lang="en-US" sz="3600" dirty="0"/>
               <a:t>Custom Resources</a:t>
             </a:r>
           </a:p>
@@ -29919,6 +31330,473 @@
                   <a:lin ang="5400000" scaled="0"/>
                 </a:gradFill>
               </a:rPr>
+              <a:t>USAGE</a:t>
+            </a:r>
+            <a:endParaRPr lang="en-US" sz="2400" b="1" dirty="0" smtClean="0">
+              <a:gradFill>
+                <a:gsLst>
+                  <a:gs pos="0">
+                    <a:srgbClr val="FFFFFF"/>
+                  </a:gs>
+                  <a:gs pos="100000">
+                    <a:srgbClr val="FFFFFF"/>
+                  </a:gs>
+                </a:gsLst>
+                <a:lin ang="5400000" scaled="0"/>
+              </a:gradFill>
+            </a:endParaRPr>
+          </a:p>
+        </p:txBody>
+      </p:sp>
+      <p:sp>
+        <p:nvSpPr>
+          <p:cNvPr id="6" name="TextBox 5"/>
+          <p:cNvSpPr txBox="1"/>
+          <p:nvPr/>
+        </p:nvSpPr>
+        <p:spPr bwMode="white">
+          <a:xfrm>
+            <a:off x="736600" y="2652082"/>
+            <a:ext cx="14771520" cy="5417098"/>
+          </a:xfrm>
+          <a:prstGeom prst="rect">
+            <a:avLst/>
+          </a:prstGeom>
+          <a:ln w="12700">
+            <a:solidFill>
+              <a:schemeClr val="tx2"/>
+            </a:solidFill>
+            <a:prstDash val="dash"/>
+          </a:ln>
+        </p:spPr>
+        <p:txBody>
+          <a:bodyPr vert="horz" wrap="square" lIns="91440" tIns="91440" rIns="91440" bIns="91440" rtlCol="0">
+            <a:noAutofit/>
+          </a:bodyPr>
+          <a:lstStyle/>
+          <a:p>
+            <a:r>
+              <a:rPr lang="en-US" sz="2000" b="1" dirty="0" err="1">
+                <a:latin typeface="Courier New" charset="0"/>
+                <a:ea typeface="Courier New" charset="0"/>
+                <a:cs typeface="Courier New" charset="0"/>
+              </a:rPr>
+              <a:t>apache_vhost</a:t>
+            </a:r>
+            <a:r>
+              <a:rPr lang="en-US" sz="2000" b="1" dirty="0">
+                <a:latin typeface="Courier New" charset="0"/>
+                <a:ea typeface="Courier New" charset="0"/>
+                <a:cs typeface="Courier New" charset="0"/>
+              </a:rPr>
+              <a:t> 'welcome' do</a:t>
+            </a:r>
+          </a:p>
+          <a:p>
+            <a:r>
+              <a:rPr lang="en-US" sz="2000" b="1" dirty="0">
+                <a:latin typeface="Courier New" charset="0"/>
+                <a:ea typeface="Courier New" charset="0"/>
+                <a:cs typeface="Courier New" charset="0"/>
+              </a:rPr>
+              <a:t>  action :delete</a:t>
+            </a:r>
+          </a:p>
+          <a:p>
+            <a:r>
+              <a:rPr lang="en-US" sz="2000" b="1" dirty="0">
+                <a:latin typeface="Courier New" charset="0"/>
+                <a:ea typeface="Courier New" charset="0"/>
+                <a:cs typeface="Courier New" charset="0"/>
+              </a:rPr>
+              <a:t>end</a:t>
+            </a:r>
+          </a:p>
+          <a:p>
+            <a:endParaRPr lang="en-US" sz="2000" b="1" dirty="0">
+              <a:latin typeface="Courier New" charset="0"/>
+              <a:ea typeface="Courier New" charset="0"/>
+              <a:cs typeface="Courier New" charset="0"/>
+            </a:endParaRPr>
+          </a:p>
+          <a:p>
+            <a:r>
+              <a:rPr lang="en-US" sz="2000" b="1" dirty="0" err="1">
+                <a:latin typeface="Courier New" charset="0"/>
+                <a:ea typeface="Courier New" charset="0"/>
+                <a:cs typeface="Courier New" charset="0"/>
+              </a:rPr>
+              <a:t>apache_vhost</a:t>
+            </a:r>
+            <a:r>
+              <a:rPr lang="en-US" sz="2000" b="1" dirty="0">
+                <a:latin typeface="Courier New" charset="0"/>
+                <a:ea typeface="Courier New" charset="0"/>
+                <a:cs typeface="Courier New" charset="0"/>
+              </a:rPr>
+              <a:t> 'users'</a:t>
+            </a:r>
+          </a:p>
+          <a:p>
+            <a:endParaRPr lang="en-US" sz="2000" b="1" dirty="0">
+              <a:latin typeface="Courier New" charset="0"/>
+              <a:ea typeface="Courier New" charset="0"/>
+              <a:cs typeface="Courier New" charset="0"/>
+            </a:endParaRPr>
+          </a:p>
+          <a:p>
+            <a:r>
+              <a:rPr lang="en-US" sz="2000" b="1" dirty="0" err="1">
+                <a:latin typeface="Courier New" charset="0"/>
+                <a:ea typeface="Courier New" charset="0"/>
+                <a:cs typeface="Courier New" charset="0"/>
+              </a:rPr>
+              <a:t>apache_vhost</a:t>
+            </a:r>
+            <a:r>
+              <a:rPr lang="en-US" sz="2000" b="1" dirty="0">
+                <a:latin typeface="Courier New" charset="0"/>
+                <a:ea typeface="Courier New" charset="0"/>
+                <a:cs typeface="Courier New" charset="0"/>
+              </a:rPr>
+              <a:t> 'admins' do</a:t>
+            </a:r>
+          </a:p>
+          <a:p>
+            <a:r>
+              <a:rPr lang="en-US" sz="2000" b="1" dirty="0">
+                <a:latin typeface="Courier New" charset="0"/>
+                <a:ea typeface="Courier New" charset="0"/>
+                <a:cs typeface="Courier New" charset="0"/>
+              </a:rPr>
+              <a:t>  </a:t>
+            </a:r>
+            <a:r>
+              <a:rPr lang="en-US" sz="2000" b="1" dirty="0" err="1">
+                <a:latin typeface="Courier New" charset="0"/>
+                <a:ea typeface="Courier New" charset="0"/>
+                <a:cs typeface="Courier New" charset="0"/>
+              </a:rPr>
+              <a:t>site_port</a:t>
+            </a:r>
+            <a:r>
+              <a:rPr lang="en-US" sz="2000" b="1" dirty="0">
+                <a:latin typeface="Courier New" charset="0"/>
+                <a:ea typeface="Courier New" charset="0"/>
+                <a:cs typeface="Courier New" charset="0"/>
+              </a:rPr>
+              <a:t> 8080</a:t>
+            </a:r>
+          </a:p>
+          <a:p>
+            <a:r>
+              <a:rPr lang="en-US" sz="2000" b="1" dirty="0">
+                <a:latin typeface="Courier New" charset="0"/>
+                <a:ea typeface="Courier New" charset="0"/>
+                <a:cs typeface="Courier New" charset="0"/>
+              </a:rPr>
+              <a:t>end</a:t>
+            </a:r>
+            <a:endParaRPr lang="en-US" sz="2000" b="1" dirty="0">
+              <a:latin typeface="Courier New" charset="0"/>
+              <a:ea typeface="Courier New" charset="0"/>
+              <a:cs typeface="Courier New" charset="0"/>
+            </a:endParaRPr>
+          </a:p>
+        </p:txBody>
+      </p:sp>
+      <p:sp>
+        <p:nvSpPr>
+          <p:cNvPr id="11" name="TextBox 10"/>
+          <p:cNvSpPr txBox="1"/>
+          <p:nvPr/>
+        </p:nvSpPr>
+        <p:spPr bwMode="white">
+          <a:xfrm>
+            <a:off x="736600" y="1912524"/>
+            <a:ext cx="14771520" cy="597568"/>
+          </a:xfrm>
+          <a:prstGeom prst="rect">
+            <a:avLst/>
+          </a:prstGeom>
+          <a:solidFill>
+            <a:schemeClr val="bg1">
+              <a:lumMod val="85000"/>
+              <a:alpha val="50000"/>
+            </a:schemeClr>
+          </a:solidFill>
+        </p:spPr>
+        <p:txBody>
+          <a:bodyPr vert="horz" wrap="square" lIns="91440" tIns="91440" rIns="91440" bIns="91440" rtlCol="0">
+            <a:normAutofit/>
+          </a:bodyPr>
+          <a:lstStyle/>
+          <a:p>
+            <a:r>
+              <a:rPr lang="en-US" b="1" dirty="0" smtClean="0">
+                <a:latin typeface="Courier New" charset="0"/>
+                <a:ea typeface="Courier New" charset="0"/>
+                <a:cs typeface="Courier New" charset="0"/>
+              </a:rPr>
+              <a:t>recipes/</a:t>
+            </a:r>
+            <a:r>
+              <a:rPr lang="en-US" b="1" dirty="0" err="1" smtClean="0">
+                <a:latin typeface="Courier New" charset="0"/>
+                <a:ea typeface="Courier New" charset="0"/>
+                <a:cs typeface="Courier New" charset="0"/>
+              </a:rPr>
+              <a:t>default.rb</a:t>
+            </a:r>
+            <a:endParaRPr lang="en-US" b="1" dirty="0" smtClean="0">
+              <a:latin typeface="Courier New" charset="0"/>
+              <a:ea typeface="Courier New" charset="0"/>
+              <a:cs typeface="Courier New" charset="0"/>
+            </a:endParaRPr>
+          </a:p>
+        </p:txBody>
+      </p:sp>
+    </p:spTree>
+    <p:extLst>
+      <p:ext uri="{BB962C8B-B14F-4D97-AF65-F5344CB8AC3E}">
+        <p14:creationId xmlns:p14="http://schemas.microsoft.com/office/powerpoint/2010/main" val="326636575"/>
+      </p:ext>
+    </p:extLst>
+  </p:cSld>
+  <p:clrMapOvr>
+    <a:masterClrMapping/>
+  </p:clrMapOvr>
+  <p:transition xmlns:p14="http://schemas.microsoft.com/office/powerpoint/2010/main" spd="med">
+    <p:fade/>
+  </p:transition>
+  <p:timing>
+    <p:tnLst>
+      <p:par>
+        <p:cTn xmlns:p14="http://schemas.microsoft.com/office/powerpoint/2010/main" id="1" dur="indefinite" restart="never" nodeType="tmRoot"/>
+      </p:par>
+    </p:tnLst>
+  </p:timing>
+</p:sld>
+</file>
+
+<file path=ppt/slides/slide25.xml><?xml version="1.0" encoding="utf-8"?>
+<p:sld xmlns:a="http://schemas.openxmlformats.org/drawingml/2006/main" xmlns:r="http://schemas.openxmlformats.org/officeDocument/2006/relationships" xmlns:p="http://schemas.openxmlformats.org/presentationml/2006/main">
+  <p:cSld>
+    <p:spTree>
+      <p:nvGrpSpPr>
+        <p:cNvPr id="1" name=""/>
+        <p:cNvGrpSpPr/>
+        <p:nvPr/>
+      </p:nvGrpSpPr>
+      <p:grpSpPr>
+        <a:xfrm>
+          <a:off x="0" y="0"/>
+          <a:ext cx="0" cy="0"/>
+          <a:chOff x="0" y="0"/>
+          <a:chExt cx="0" cy="0"/>
+        </a:xfrm>
+      </p:grpSpPr>
+      <p:sp>
+        <p:nvSpPr>
+          <p:cNvPr id="10" name="Title 9"/>
+          <p:cNvSpPr>
+            <a:spLocks noGrp="1"/>
+          </p:cNvSpPr>
+          <p:nvPr>
+            <p:ph type="title"/>
+          </p:nvPr>
+        </p:nvSpPr>
+        <p:spPr/>
+        <p:txBody>
+          <a:bodyPr/>
+          <a:lstStyle/>
+          <a:p>
+            <a:r>
+              <a:rPr lang="en-US" dirty="0" smtClean="0"/>
+              <a:t> </a:t>
+            </a:r>
+            <a:endParaRPr lang="en-US" dirty="0"/>
+          </a:p>
+        </p:txBody>
+      </p:sp>
+      <p:sp>
+        <p:nvSpPr>
+          <p:cNvPr id="7" name="TextBox 6"/>
+          <p:cNvSpPr txBox="1"/>
+          <p:nvPr/>
+        </p:nvSpPr>
+        <p:spPr bwMode="white">
+          <a:xfrm>
+            <a:off x="773280" y="263175"/>
+            <a:ext cx="14771520" cy="955963"/>
+          </a:xfrm>
+          <a:prstGeom prst="rect">
+            <a:avLst/>
+          </a:prstGeom>
+        </p:spPr>
+        <p:style>
+          <a:lnRef idx="2">
+            <a:schemeClr val="accent3">
+              <a:shade val="50000"/>
+            </a:schemeClr>
+          </a:lnRef>
+          <a:fillRef idx="1">
+            <a:schemeClr val="accent3"/>
+          </a:fillRef>
+          <a:effectRef idx="0">
+            <a:schemeClr val="accent3"/>
+          </a:effectRef>
+          <a:fontRef idx="minor">
+            <a:schemeClr val="lt1"/>
+          </a:fontRef>
+        </p:style>
+        <p:txBody>
+          <a:bodyPr vert="horz" wrap="square" lIns="731520" tIns="91440" rIns="91440" bIns="91440" rtlCol="0" anchor="ctr">
+            <a:normAutofit/>
+          </a:bodyPr>
+          <a:lstStyle/>
+          <a:p>
+            <a:r>
+              <a:rPr lang="en-US" sz="3600" dirty="0" smtClean="0"/>
+              <a:t>Custom Resources</a:t>
+            </a:r>
+          </a:p>
+        </p:txBody>
+      </p:sp>
+      <p:sp>
+        <p:nvSpPr>
+          <p:cNvPr id="8" name="Oval 7"/>
+          <p:cNvSpPr/>
+          <p:nvPr/>
+        </p:nvSpPr>
+        <p:spPr bwMode="auto">
+          <a:xfrm>
+            <a:off x="302407" y="263175"/>
+            <a:ext cx="941746" cy="941746"/>
+          </a:xfrm>
+          <a:prstGeom prst="ellipse">
+            <a:avLst/>
+          </a:prstGeom>
+          <a:ln>
+            <a:headEnd type="none" w="med" len="med"/>
+            <a:tailEnd type="none" w="med" len="med"/>
+          </a:ln>
+        </p:spPr>
+        <p:style>
+          <a:lnRef idx="2">
+            <a:schemeClr val="accent3">
+              <a:shade val="50000"/>
+            </a:schemeClr>
+          </a:lnRef>
+          <a:fillRef idx="1">
+            <a:schemeClr val="accent3"/>
+          </a:fillRef>
+          <a:effectRef idx="0">
+            <a:schemeClr val="accent3"/>
+          </a:effectRef>
+          <a:fontRef idx="minor">
+            <a:schemeClr val="lt1"/>
+          </a:fontRef>
+        </p:style>
+        <p:txBody>
+          <a:bodyPr vert="horz" wrap="square" lIns="91436" tIns="45718" rIns="91436" bIns="45718" numCol="1" rtlCol="0" anchor="ctr" anchorCtr="0" compatLnSpc="1">
+            <a:prstTxWarp prst="textNoShape">
+              <a:avLst/>
+            </a:prstTxWarp>
+          </a:bodyPr>
+          <a:lstStyle/>
+          <a:p>
+            <a:pPr algn="ctr" defTabSz="914099"/>
+            <a:r>
+              <a:rPr lang="en-US" sz="4000" b="1" dirty="0">
+                <a:gradFill>
+                  <a:gsLst>
+                    <a:gs pos="0">
+                      <a:srgbClr val="FFFFFF"/>
+                    </a:gs>
+                    <a:gs pos="100000">
+                      <a:srgbClr val="FFFFFF"/>
+                    </a:gs>
+                  </a:gsLst>
+                  <a:lin ang="5400000" scaled="0"/>
+                </a:gradFill>
+              </a:rPr>
+              <a:t>4</a:t>
+            </a:r>
+            <a:endParaRPr lang="en-US" sz="4000" b="1" dirty="0" smtClean="0">
+              <a:gradFill>
+                <a:gsLst>
+                  <a:gs pos="0">
+                    <a:srgbClr val="FFFFFF"/>
+                  </a:gs>
+                  <a:gs pos="100000">
+                    <a:srgbClr val="FFFFFF"/>
+                  </a:gs>
+                </a:gsLst>
+                <a:lin ang="5400000" scaled="0"/>
+              </a:gradFill>
+            </a:endParaRPr>
+          </a:p>
+        </p:txBody>
+      </p:sp>
+      <p:sp>
+        <p:nvSpPr>
+          <p:cNvPr id="9" name="Rectangle 8"/>
+          <p:cNvSpPr/>
+          <p:nvPr/>
+        </p:nvSpPr>
+        <p:spPr bwMode="auto">
+          <a:xfrm>
+            <a:off x="773280" y="1240394"/>
+            <a:ext cx="14771520" cy="530141"/>
+          </a:xfrm>
+          <a:prstGeom prst="rect">
+            <a:avLst/>
+          </a:prstGeom>
+          <a:ln>
+            <a:headEnd type="none" w="med" len="med"/>
+            <a:tailEnd type="none" w="med" len="med"/>
+          </a:ln>
+        </p:spPr>
+        <p:style>
+          <a:lnRef idx="2">
+            <a:schemeClr val="dk1">
+              <a:shade val="50000"/>
+            </a:schemeClr>
+          </a:lnRef>
+          <a:fillRef idx="1">
+            <a:schemeClr val="dk1"/>
+          </a:fillRef>
+          <a:effectRef idx="0">
+            <a:schemeClr val="dk1"/>
+          </a:effectRef>
+          <a:fontRef idx="minor">
+            <a:schemeClr val="lt1"/>
+          </a:fontRef>
+        </p:style>
+        <p:txBody>
+          <a:bodyPr vert="horz" wrap="square" lIns="91436" tIns="45718" rIns="91436" bIns="45718" numCol="1" rtlCol="0" anchor="ctr" anchorCtr="0" compatLnSpc="1">
+            <a:prstTxWarp prst="textNoShape">
+              <a:avLst/>
+            </a:prstTxWarp>
+          </a:bodyPr>
+          <a:lstStyle/>
+          <a:p>
+            <a:pPr algn="r" defTabSz="914099"/>
+            <a:r>
+              <a:rPr lang="en-US" b="1" dirty="0" smtClean="0">
+                <a:gradFill>
+                  <a:gsLst>
+                    <a:gs pos="0">
+                      <a:srgbClr val="FFFFFF"/>
+                    </a:gs>
+                    <a:gs pos="100000">
+                      <a:srgbClr val="FFFFFF"/>
+                    </a:gs>
+                  </a:gsLst>
+                  <a:lin ang="5400000" scaled="0"/>
+                </a:gradFill>
+              </a:rPr>
               <a:t>BENEFITS &amp; DRAWBACKS</a:t>
             </a:r>
             <a:endParaRPr lang="en-US" b="1" dirty="0">
@@ -29967,7 +31845,11 @@
             </a:r>
             <a:r>
               <a:rPr lang="en-US" dirty="0" smtClean="0"/>
-              <a:t>12.5.X version of Chef</a:t>
+              <a:t>12.5.0 </a:t>
+            </a:r>
+            <a:r>
+              <a:rPr lang="en-US" dirty="0" smtClean="0"/>
+              <a:t>version of Chef</a:t>
             </a:r>
           </a:p>
           <a:p>
@@ -29977,9 +31859,12 @@
             </a:pPr>
             <a:r>
               <a:rPr lang="en-US" dirty="0" smtClean="0"/>
-              <a:t>Allows for a real resource definition without understanding Ruby (vs. HWRP)</a:t>
-            </a:r>
-            <a:endParaRPr lang="en-US" dirty="0"/>
+              <a:t>Allows for a real resource definition without understanding Ruby (vs. HWRP</a:t>
+            </a:r>
+            <a:r>
+              <a:rPr lang="en-US" dirty="0" smtClean="0"/>
+              <a:t>)</a:t>
+            </a:r>
           </a:p>
           <a:p>
             <a:pPr marL="457200" indent="-457200">
@@ -29987,9 +31872,14 @@
               <a:buChar char="•"/>
             </a:pPr>
             <a:r>
+              <a:rPr lang="en-US" dirty="0"/>
+              <a:t>Complete resource definition is defined in a single file (vs. LWRP</a:t>
+            </a:r>
+            <a:r>
               <a:rPr lang="en-US" dirty="0" smtClean="0"/>
-              <a:t>Custom resource implementation require learning a new DSL</a:t>
-            </a:r>
+              <a:t>)</a:t>
+            </a:r>
+            <a:endParaRPr lang="en-US" dirty="0"/>
           </a:p>
           <a:p>
             <a:pPr marL="457200" indent="-457200">
@@ -29998,8 +31888,13 @@
             </a:pPr>
             <a:r>
               <a:rPr lang="en-US" dirty="0" smtClean="0"/>
-              <a:t>Complete resource definition is defined in a single file</a:t>
-            </a:r>
+              <a:t>Custom resource implementation require learning a new </a:t>
+            </a:r>
+            <a:r>
+              <a:rPr lang="en-US" dirty="0" smtClean="0"/>
+              <a:t>DSL</a:t>
+            </a:r>
+            <a:endParaRPr lang="en-US" dirty="0" smtClean="0"/>
           </a:p>
         </p:txBody>
       </p:sp>
@@ -30013,20 +31908,20 @@
   <p:clrMapOvr>
     <a:masterClrMapping/>
   </p:clrMapOvr>
-  <p:transition spd="med">
+  <p:transition xmlns:p14="http://schemas.microsoft.com/office/powerpoint/2010/main" spd="med">
     <p:fade/>
   </p:transition>
   <p:timing>
     <p:tnLst>
       <p:par>
-        <p:cTn id="1" dur="indefinite" restart="never" nodeType="tmRoot"/>
+        <p:cTn xmlns:p14="http://schemas.microsoft.com/office/powerpoint/2010/main" id="1" dur="indefinite" restart="never" nodeType="tmRoot"/>
       </p:par>
     </p:tnLst>
   </p:timing>
 </p:sld>
 </file>
 
-<file path=ppt/slides/slide23.xml><?xml version="1.0" encoding="utf-8"?>
+<file path=ppt/slides/slide26.xml><?xml version="1.0" encoding="utf-8"?>
 <p:sld xmlns:a="http://schemas.openxmlformats.org/drawingml/2006/main" xmlns:r="http://schemas.openxmlformats.org/officeDocument/2006/relationships" xmlns:p="http://schemas.openxmlformats.org/presentationml/2006/main">
   <p:cSld>
     <p:spTree>
@@ -30519,20 +32414,20 @@
   <p:clrMapOvr>
     <a:masterClrMapping/>
   </p:clrMapOvr>
-  <p:transition spd="med">
+  <p:transition xmlns:p14="http://schemas.microsoft.com/office/powerpoint/2010/main" spd="med">
     <p:fade/>
   </p:transition>
   <p:timing>
     <p:tnLst>
       <p:par>
-        <p:cTn id="1" dur="indefinite" restart="never" nodeType="tmRoot"/>
+        <p:cTn xmlns:p14="http://schemas.microsoft.com/office/powerpoint/2010/main" id="1" dur="indefinite" restart="never" nodeType="tmRoot"/>
       </p:par>
     </p:tnLst>
   </p:timing>
 </p:sld>
 </file>
 
-<file path=ppt/slides/slide24.xml><?xml version="1.0" encoding="utf-8"?>
+<file path=ppt/slides/slide27.xml><?xml version="1.0" encoding="utf-8"?>
 <p:sld xmlns:a="http://schemas.openxmlformats.org/drawingml/2006/main" xmlns:r="http://schemas.openxmlformats.org/officeDocument/2006/relationships" xmlns:p="http://schemas.openxmlformats.org/presentationml/2006/main">
   <p:cSld>
     <p:spTree>
@@ -30623,19 +32518,15 @@
           <a:p>
             <a:r>
               <a:rPr lang="en-US" dirty="0" smtClean="0"/>
-              <a:t>Given a Chef </a:t>
-            </a:r>
-            <a:r>
-              <a:rPr lang="en-US" smtClean="0"/>
-              <a:t>version prior to 12.5.X, </a:t>
+              <a:t>Given a Chef version prior to </a:t>
             </a:r>
             <a:r>
               <a:rPr lang="en-US" dirty="0" smtClean="0"/>
-              <a:t>which </a:t>
-            </a:r>
-            <a:r>
-              <a:rPr lang="en-US" smtClean="0"/>
-              <a:t>approach would would you choose?</a:t>
+              <a:t>12.5.0, </a:t>
+            </a:r>
+            <a:r>
+              <a:rPr lang="en-US" dirty="0" smtClean="0"/>
+              <a:t>which approach would would you choose?</a:t>
             </a:r>
             <a:endParaRPr lang="en-US" dirty="0"/>
           </a:p>
@@ -30651,13 +32542,13 @@
   <p:clrMapOvr>
     <a:masterClrMapping/>
   </p:clrMapOvr>
-  <p:transition spd="med">
+  <p:transition xmlns:p14="http://schemas.microsoft.com/office/powerpoint/2010/main" spd="med">
     <p:fade/>
   </p:transition>
 </p:sld>
 </file>
 
-<file path=ppt/slides/slide25.xml><?xml version="1.0" encoding="utf-8"?>
+<file path=ppt/slides/slide28.xml><?xml version="1.0" encoding="utf-8"?>
 <p:sld xmlns:a="http://schemas.openxmlformats.org/drawingml/2006/main" xmlns:r="http://schemas.openxmlformats.org/officeDocument/2006/relationships" xmlns:p="http://schemas.openxmlformats.org/presentationml/2006/main">
   <p:cSld>
     <p:spTree>
@@ -30732,20 +32623,20 @@
   <p:clrMapOvr>
     <a:masterClrMapping/>
   </p:clrMapOvr>
-  <p:transition spd="med">
+  <p:transition xmlns:p14="http://schemas.microsoft.com/office/powerpoint/2010/main" spd="med">
     <p:fade/>
   </p:transition>
   <p:timing>
     <p:tnLst>
       <p:par>
-        <p:cTn id="1" dur="indefinite" restart="never" nodeType="tmRoot"/>
+        <p:cTn xmlns:p14="http://schemas.microsoft.com/office/powerpoint/2010/main" id="1" dur="indefinite" restart="never" nodeType="tmRoot"/>
       </p:par>
     </p:tnLst>
   </p:timing>
 </p:sld>
 </file>
 
-<file path=ppt/slides/slide26.xml><?xml version="1.0" encoding="utf-8"?>
+<file path=ppt/slides/slide29.xml><?xml version="1.0" encoding="utf-8"?>
 <p:sld xmlns:a="http://schemas.openxmlformats.org/drawingml/2006/main" xmlns:r="http://schemas.openxmlformats.org/officeDocument/2006/relationships" xmlns:p="http://schemas.openxmlformats.org/presentationml/2006/main">
   <p:cSld>
     <p:spTree>
@@ -30772,7 +32663,7 @@
   <p:clrMapOvr>
     <a:masterClrMapping/>
   </p:clrMapOvr>
-  <p:transition spd="med">
+  <p:transition xmlns:p14="http://schemas.microsoft.com/office/powerpoint/2010/main" spd="med">
     <p:fade/>
   </p:transition>
 </p:sld>
@@ -31271,13 +33162,13 @@
   <p:clrMapOvr>
     <a:masterClrMapping/>
   </p:clrMapOvr>
-  <p:transition spd="med">
+  <p:transition xmlns:p14="http://schemas.microsoft.com/office/powerpoint/2010/main" spd="med">
     <p:fade/>
   </p:transition>
   <p:timing>
     <p:tnLst>
       <p:par>
-        <p:cTn id="1" dur="indefinite" restart="never" nodeType="tmRoot"/>
+        <p:cTn xmlns:p14="http://schemas.microsoft.com/office/powerpoint/2010/main" id="1" dur="indefinite" restart="never" nodeType="tmRoot"/>
       </p:par>
     </p:tnLst>
   </p:timing>
@@ -31377,8 +33268,13 @@
             </a:pPr>
             <a:r>
               <a:rPr lang="en-US" sz="3600" dirty="0"/>
-              <a:t>Implementation Language</a:t>
-            </a:r>
+              <a:t>Implementation </a:t>
+            </a:r>
+            <a:r>
+              <a:rPr lang="en-US" sz="3600" dirty="0" smtClean="0"/>
+              <a:t>Language &amp; Usage</a:t>
+            </a:r>
+            <a:endParaRPr lang="en-US" sz="3600" dirty="0"/>
           </a:p>
           <a:p>
             <a:pPr marL="571500" indent="-571500">
@@ -31534,13 +33430,13 @@
   <p:clrMapOvr>
     <a:masterClrMapping/>
   </p:clrMapOvr>
-  <p:transition spd="med">
+  <p:transition xmlns:p14="http://schemas.microsoft.com/office/powerpoint/2010/main" spd="med">
     <p:fade/>
   </p:transition>
   <p:timing>
     <p:tnLst>
       <p:par>
-        <p:cTn id="1" dur="indefinite" restart="never" nodeType="tmRoot"/>
+        <p:cTn xmlns:p14="http://schemas.microsoft.com/office/powerpoint/2010/main" id="1" dur="indefinite" restart="never" nodeType="tmRoot"/>
       </p:par>
     </p:tnLst>
   </p:timing>
@@ -31889,13 +33785,13 @@
   <p:clrMapOvr>
     <a:masterClrMapping/>
   </p:clrMapOvr>
-  <p:transition spd="med">
+  <p:transition xmlns:p14="http://schemas.microsoft.com/office/powerpoint/2010/main" spd="med">
     <p:fade/>
   </p:transition>
   <p:timing>
     <p:tnLst>
       <p:par>
-        <p:cTn id="1" dur="indefinite" restart="never" nodeType="tmRoot"/>
+        <p:cTn xmlns:p14="http://schemas.microsoft.com/office/powerpoint/2010/main" id="1" dur="indefinite" restart="never" nodeType="tmRoot"/>
       </p:par>
     </p:tnLst>
   </p:timing>
@@ -32198,13 +34094,13 @@
   <p:clrMapOvr>
     <a:masterClrMapping/>
   </p:clrMapOvr>
-  <p:transition spd="med">
+  <p:transition xmlns:p14="http://schemas.microsoft.com/office/powerpoint/2010/main" spd="med">
     <p:fade/>
   </p:transition>
   <p:timing>
     <p:tnLst>
       <p:par>
-        <p:cTn id="1" dur="indefinite" restart="never" nodeType="tmRoot"/>
+        <p:cTn xmlns:p14="http://schemas.microsoft.com/office/powerpoint/2010/main" id="1" dur="indefinite" restart="never" nodeType="tmRoot"/>
       </p:par>
     </p:tnLst>
   </p:timing>
@@ -33008,13 +34904,13 @@
   <p:clrMapOvr>
     <a:masterClrMapping/>
   </p:clrMapOvr>
-  <p:transition spd="med">
+  <p:transition xmlns:p14="http://schemas.microsoft.com/office/powerpoint/2010/main" spd="med">
     <p:fade/>
   </p:transition>
   <p:timing>
     <p:tnLst>
       <p:par>
-        <p:cTn id="1" dur="indefinite" restart="never" nodeType="tmRoot"/>
+        <p:cTn xmlns:p14="http://schemas.microsoft.com/office/powerpoint/2010/main" id="1" dur="indefinite" restart="never" nodeType="tmRoot"/>
       </p:par>
     </p:tnLst>
   </p:timing>
@@ -33741,13 +35637,13 @@
   <p:clrMapOvr>
     <a:masterClrMapping/>
   </p:clrMapOvr>
-  <p:transition spd="med">
+  <p:transition xmlns:p14="http://schemas.microsoft.com/office/powerpoint/2010/main" spd="med">
     <p:fade/>
   </p:transition>
   <p:timing>
     <p:tnLst>
       <p:par>
-        <p:cTn id="1" dur="indefinite" restart="never" nodeType="tmRoot"/>
+        <p:cTn xmlns:p14="http://schemas.microsoft.com/office/powerpoint/2010/main" id="1" dur="indefinite" restart="never" nodeType="tmRoot"/>
       </p:par>
     </p:tnLst>
   </p:timing>
@@ -33787,80 +35683,9 @@
           <a:lstStyle/>
           <a:p>
             <a:r>
-              <a:rPr lang="en-US" smtClean="0"/>
+              <a:rPr lang="en-US" dirty="0" smtClean="0"/>
               <a:t> </a:t>
             </a:r>
-            <a:endParaRPr lang="en-US" dirty="0"/>
-          </a:p>
-        </p:txBody>
-      </p:sp>
-      <p:sp>
-        <p:nvSpPr>
-          <p:cNvPr id="5" name="Text Placeholder 4"/>
-          <p:cNvSpPr>
-            <a:spLocks noGrp="1"/>
-          </p:cNvSpPr>
-          <p:nvPr>
-            <p:ph type="body" sz="quarter" idx="12"/>
-          </p:nvPr>
-        </p:nvSpPr>
-        <p:spPr>
-          <a:xfrm>
-            <a:off x="736600" y="2209800"/>
-            <a:ext cx="14812064" cy="4992351"/>
-          </a:xfrm>
-        </p:spPr>
-        <p:txBody>
-          <a:bodyPr/>
-          <a:lstStyle/>
-          <a:p>
-            <a:pPr marL="457200" indent="-457200">
-              <a:buFont typeface="Arial" charset="0"/>
-              <a:buChar char="•"/>
-            </a:pPr>
-            <a:r>
-              <a:rPr lang="en-US" dirty="0" smtClean="0"/>
-              <a:t>Available in some of the earliest versions of Chef</a:t>
-            </a:r>
-          </a:p>
-          <a:p>
-            <a:pPr marL="457200" indent="-457200">
-              <a:buFont typeface="Arial" charset="0"/>
-              <a:buChar char="•"/>
-            </a:pPr>
-            <a:r>
-              <a:rPr lang="en-US" dirty="0" smtClean="0"/>
-              <a:t>Allows for extremely flexible and powerful resource implementations</a:t>
-            </a:r>
-          </a:p>
-          <a:p>
-            <a:pPr marL="457200" indent="-457200">
-              <a:buFont typeface="Arial" charset="0"/>
-              <a:buChar char="•"/>
-            </a:pPr>
-            <a:r>
-              <a:rPr lang="en-US" dirty="0" smtClean="0"/>
-              <a:t>Requires knowledge of Ruby</a:t>
-            </a:r>
-          </a:p>
-          <a:p>
-            <a:pPr marL="457200" indent="-457200">
-              <a:buFont typeface="Arial" charset="0"/>
-              <a:buChar char="•"/>
-            </a:pPr>
-            <a:r>
-              <a:rPr lang="en-US" dirty="0" smtClean="0"/>
-              <a:t>Requires knowledge of Object-Oriented Programming techniques</a:t>
-            </a:r>
-          </a:p>
-          <a:p>
-            <a:pPr marL="457200" indent="-457200">
-              <a:buFont typeface="Arial" charset="0"/>
-              <a:buChar char="•"/>
-            </a:pPr>
-            <a:endParaRPr lang="en-US" dirty="0" smtClean="0"/>
-          </a:p>
-          <a:p>
             <a:endParaRPr lang="en-US" dirty="0"/>
           </a:p>
         </p:txBody>
@@ -34043,7 +35868,7 @@
                   <a:lin ang="5400000" scaled="0"/>
                 </a:gradFill>
               </a:rPr>
-              <a:t>BENEFITS &amp; DRAWBACKS</a:t>
+              <a:t>USAGE</a:t>
             </a:r>
             <a:endParaRPr lang="en-US" sz="2400" b="1" dirty="0" smtClean="0">
               <a:gradFill>
@@ -34061,23 +35886,239 @@
           </a:p>
         </p:txBody>
       </p:sp>
+      <p:sp>
+        <p:nvSpPr>
+          <p:cNvPr id="6" name="TextBox 5"/>
+          <p:cNvSpPr txBox="1"/>
+          <p:nvPr/>
+        </p:nvSpPr>
+        <p:spPr bwMode="white">
+          <a:xfrm>
+            <a:off x="736600" y="2649065"/>
+            <a:ext cx="14771520" cy="5378117"/>
+          </a:xfrm>
+          <a:prstGeom prst="rect">
+            <a:avLst/>
+          </a:prstGeom>
+          <a:ln w="12700">
+            <a:solidFill>
+              <a:schemeClr val="tx2"/>
+            </a:solidFill>
+            <a:prstDash val="dash"/>
+          </a:ln>
+        </p:spPr>
+        <p:txBody>
+          <a:bodyPr vert="horz" wrap="square" lIns="91440" tIns="91440" rIns="91440" bIns="91440" rtlCol="0">
+            <a:noAutofit/>
+          </a:bodyPr>
+          <a:lstStyle/>
+          <a:p>
+            <a:r>
+              <a:rPr lang="en-US" sz="2000" b="1" dirty="0" err="1" smtClean="0">
+                <a:latin typeface="Courier New" charset="0"/>
+                <a:ea typeface="Courier New" charset="0"/>
+                <a:cs typeface="Courier New" charset="0"/>
+              </a:rPr>
+              <a:t>apache_vhost</a:t>
+            </a:r>
+            <a:r>
+              <a:rPr lang="en-US" sz="2000" b="1" dirty="0" smtClean="0">
+                <a:latin typeface="Courier New" charset="0"/>
+                <a:ea typeface="Courier New" charset="0"/>
+                <a:cs typeface="Courier New" charset="0"/>
+              </a:rPr>
+              <a:t> 'welcome' do</a:t>
+            </a:r>
+          </a:p>
+          <a:p>
+            <a:r>
+              <a:rPr lang="en-US" sz="2000" b="1" dirty="0" smtClean="0">
+                <a:latin typeface="Courier New" charset="0"/>
+                <a:ea typeface="Courier New" charset="0"/>
+                <a:cs typeface="Courier New" charset="0"/>
+              </a:rPr>
+              <a:t>  action :delete</a:t>
+            </a:r>
+            <a:endParaRPr lang="en-US" sz="2000" b="1" dirty="0">
+              <a:latin typeface="Courier New" charset="0"/>
+              <a:ea typeface="Courier New" charset="0"/>
+              <a:cs typeface="Courier New" charset="0"/>
+            </a:endParaRPr>
+          </a:p>
+          <a:p>
+            <a:r>
+              <a:rPr lang="en-US" sz="2000" b="1" dirty="0" smtClean="0">
+                <a:latin typeface="Courier New" charset="0"/>
+                <a:ea typeface="Courier New" charset="0"/>
+                <a:cs typeface="Courier New" charset="0"/>
+              </a:rPr>
+              <a:t>end</a:t>
+            </a:r>
+          </a:p>
+          <a:p>
+            <a:endParaRPr lang="en-US" sz="2000" b="1" dirty="0">
+              <a:latin typeface="Courier New" charset="0"/>
+              <a:ea typeface="Courier New" charset="0"/>
+              <a:cs typeface="Courier New" charset="0"/>
+            </a:endParaRPr>
+          </a:p>
+          <a:p>
+            <a:r>
+              <a:rPr lang="en-US" sz="2000" b="1" dirty="0" err="1" smtClean="0">
+                <a:latin typeface="Courier New" charset="0"/>
+                <a:ea typeface="Courier New" charset="0"/>
+                <a:cs typeface="Courier New" charset="0"/>
+              </a:rPr>
+              <a:t>apache_vhost</a:t>
+            </a:r>
+            <a:r>
+              <a:rPr lang="en-US" sz="2000" b="1" dirty="0" smtClean="0">
+                <a:latin typeface="Courier New" charset="0"/>
+                <a:ea typeface="Courier New" charset="0"/>
+                <a:cs typeface="Courier New" charset="0"/>
+              </a:rPr>
+              <a:t> </a:t>
+            </a:r>
+            <a:r>
+              <a:rPr lang="en-US" sz="2000" b="1" dirty="0">
+                <a:latin typeface="Courier New" charset="0"/>
+                <a:ea typeface="Courier New" charset="0"/>
+                <a:cs typeface="Courier New" charset="0"/>
+              </a:rPr>
+              <a:t>'users'</a:t>
+            </a:r>
+          </a:p>
+          <a:p>
+            <a:endParaRPr lang="en-US" sz="2000" b="1" dirty="0">
+              <a:latin typeface="Courier New" charset="0"/>
+              <a:ea typeface="Courier New" charset="0"/>
+              <a:cs typeface="Courier New" charset="0"/>
+            </a:endParaRPr>
+          </a:p>
+          <a:p>
+            <a:r>
+              <a:rPr lang="en-US" sz="2000" b="1" dirty="0" err="1">
+                <a:latin typeface="Courier New" charset="0"/>
+                <a:ea typeface="Courier New" charset="0"/>
+                <a:cs typeface="Courier New" charset="0"/>
+              </a:rPr>
+              <a:t>apache_vhost</a:t>
+            </a:r>
+            <a:r>
+              <a:rPr lang="en-US" sz="2000" b="1" dirty="0">
+                <a:latin typeface="Courier New" charset="0"/>
+                <a:ea typeface="Courier New" charset="0"/>
+                <a:cs typeface="Courier New" charset="0"/>
+              </a:rPr>
+              <a:t> 'admins' do</a:t>
+            </a:r>
+          </a:p>
+          <a:p>
+            <a:r>
+              <a:rPr lang="en-US" sz="2000" b="1" dirty="0">
+                <a:latin typeface="Courier New" charset="0"/>
+                <a:ea typeface="Courier New" charset="0"/>
+                <a:cs typeface="Courier New" charset="0"/>
+              </a:rPr>
+              <a:t>  </a:t>
+            </a:r>
+            <a:r>
+              <a:rPr lang="en-US" sz="2000" b="1" dirty="0" err="1">
+                <a:latin typeface="Courier New" charset="0"/>
+                <a:ea typeface="Courier New" charset="0"/>
+                <a:cs typeface="Courier New" charset="0"/>
+              </a:rPr>
+              <a:t>site_port</a:t>
+            </a:r>
+            <a:r>
+              <a:rPr lang="en-US" sz="2000" b="1" dirty="0">
+                <a:latin typeface="Courier New" charset="0"/>
+                <a:ea typeface="Courier New" charset="0"/>
+                <a:cs typeface="Courier New" charset="0"/>
+              </a:rPr>
+              <a:t> 8080</a:t>
+            </a:r>
+          </a:p>
+          <a:p>
+            <a:r>
+              <a:rPr lang="en-US" sz="2000" b="1" dirty="0">
+                <a:latin typeface="Courier New" charset="0"/>
+                <a:ea typeface="Courier New" charset="0"/>
+                <a:cs typeface="Courier New" charset="0"/>
+              </a:rPr>
+              <a:t>end</a:t>
+            </a:r>
+          </a:p>
+        </p:txBody>
+      </p:sp>
+      <p:sp>
+        <p:nvSpPr>
+          <p:cNvPr id="11" name="TextBox 10"/>
+          <p:cNvSpPr txBox="1"/>
+          <p:nvPr/>
+        </p:nvSpPr>
+        <p:spPr bwMode="white">
+          <a:xfrm>
+            <a:off x="736600" y="1911016"/>
+            <a:ext cx="14771520" cy="597568"/>
+          </a:xfrm>
+          <a:prstGeom prst="rect">
+            <a:avLst/>
+          </a:prstGeom>
+          <a:solidFill>
+            <a:schemeClr val="bg1">
+              <a:lumMod val="85000"/>
+              <a:alpha val="50000"/>
+            </a:schemeClr>
+          </a:solidFill>
+        </p:spPr>
+        <p:txBody>
+          <a:bodyPr vert="horz" wrap="square" lIns="91440" tIns="91440" rIns="91440" bIns="91440" rtlCol="0">
+            <a:normAutofit/>
+          </a:bodyPr>
+          <a:lstStyle/>
+          <a:p>
+            <a:r>
+              <a:rPr lang="en-US" b="1" dirty="0" smtClean="0">
+                <a:latin typeface="Courier New" charset="0"/>
+                <a:ea typeface="Courier New" charset="0"/>
+                <a:cs typeface="Courier New" charset="0"/>
+              </a:rPr>
+              <a:t>recipes/</a:t>
+            </a:r>
+            <a:r>
+              <a:rPr lang="en-US" b="1" dirty="0" err="1" smtClean="0">
+                <a:latin typeface="Courier New" charset="0"/>
+                <a:ea typeface="Courier New" charset="0"/>
+                <a:cs typeface="Courier New" charset="0"/>
+              </a:rPr>
+              <a:t>default.rb</a:t>
+            </a:r>
+            <a:endParaRPr lang="en-US" b="1" dirty="0" smtClean="0">
+              <a:latin typeface="Courier New" charset="0"/>
+              <a:ea typeface="Courier New" charset="0"/>
+              <a:cs typeface="Courier New" charset="0"/>
+            </a:endParaRPr>
+          </a:p>
+        </p:txBody>
+      </p:sp>
     </p:spTree>
     <p:extLst>
       <p:ext uri="{BB962C8B-B14F-4D97-AF65-F5344CB8AC3E}">
-        <p14:creationId xmlns:p14="http://schemas.microsoft.com/office/powerpoint/2010/main" val="363269115"/>
+        <p14:creationId xmlns:p14="http://schemas.microsoft.com/office/powerpoint/2010/main" val="3422040509"/>
       </p:ext>
     </p:extLst>
   </p:cSld>
   <p:clrMapOvr>
     <a:masterClrMapping/>
   </p:clrMapOvr>
-  <p:transition spd="med">
+  <p:transition xmlns:p14="http://schemas.microsoft.com/office/powerpoint/2010/main" spd="med">
     <p:fade/>
   </p:transition>
   <p:timing>
     <p:tnLst>
       <p:par>
-        <p:cTn id="1" dur="indefinite" restart="never" nodeType="tmRoot"/>
+        <p:cTn xmlns:p14="http://schemas.microsoft.com/office/powerpoint/2010/main" id="1" dur="indefinite" restart="never" nodeType="tmRoot"/>
       </p:par>
     </p:tnLst>
   </p:timing>
@@ -34460,7 +36501,7 @@
   <a:extraClrSchemeLst/>
   <a:extLst>
     <a:ext uri="{05A4C25C-085E-4340-85A3-A5531E510DB2}">
-      <thm15:themeFamily xmlns:thm15="http://schemas.microsoft.com/office/thememl/2012/main" name="Chef-TemplateComps_v09-16x9-Light.potx" id="{078CEFDB-FA7A-4E36-9964-13EF367585CB}" vid="{8B87B0F3-7308-43D5-8388-E1B49EA02652}"/>
+      <thm15:themeFamily xmlns:thm15="http://schemas.microsoft.com/office/thememl/2012/main" xmlns="" name="Chef-TemplateComps_v09-16x9-Light.potx" id="{078CEFDB-FA7A-4E36-9964-13EF367585CB}" vid="{8B87B0F3-7308-43D5-8388-E1B49EA02652}"/>
     </a:ext>
   </a:extLst>
 </a:theme>
@@ -34842,7 +36883,7 @@
   <a:extraClrSchemeLst/>
   <a:extLst>
     <a:ext uri="{05A4C25C-085E-4340-85A3-A5531E510DB2}">
-      <thm15:themeFamily xmlns:thm15="http://schemas.microsoft.com/office/thememl/2012/main" name="Chef-TemplateComps_v09-16x9-Light.potx" id="{078CEFDB-FA7A-4E36-9964-13EF367585CB}" vid="{8B87B0F3-7308-43D5-8388-E1B49EA02652}"/>
+      <thm15:themeFamily xmlns:thm15="http://schemas.microsoft.com/office/thememl/2012/main" xmlns="" name="Chef-TemplateComps_v09-16x9-Light.potx" id="{078CEFDB-FA7A-4E36-9964-13EF367585CB}" vid="{8B87B0F3-7308-43D5-8388-E1B49EA02652}"/>
     </a:ext>
   </a:extLst>
 </a:theme>

</xml_diff>

<commit_message>
Updates to the custom resources modules to the latest
</commit_message>
<xml_diff>
--- a/02-approaches_to_extending_resources.pptx
+++ b/02-approaches_to_extending_resources.pptx
@@ -9800,7 +9800,7 @@
               <a:pPr>
                 <a:defRPr/>
               </a:pPr>
-              <a:t>10/11/16</a:t>
+              <a:t>10/12/16</a:t>
             </a:fld>
             <a:endParaRPr lang="en-US" dirty="0"/>
           </a:p>
@@ -9983,7 +9983,7 @@
               <a:pPr>
                 <a:defRPr/>
               </a:pPr>
-              <a:t>10/11/16</a:t>
+              <a:t>10/12/16</a:t>
             </a:fld>
             <a:endParaRPr lang="en-US" dirty="0"/>
           </a:p>
@@ -12152,7 +12152,6 @@
               <a:rPr lang="en-US" baseline="0" dirty="0" smtClean="0"/>
               <a:t>Otherwise this is the same results as the one defined by the HWRP.</a:t>
             </a:r>
-            <a:endParaRPr lang="en-US" baseline="0" dirty="0" smtClean="0"/>
           </a:p>
         </p:txBody>
       </p:sp>
@@ -12976,11 +12975,7 @@
             </a:r>
             <a:r>
               <a:rPr lang="en-US" baseline="0" dirty="0" smtClean="0"/>
-              <a:t>' local variable or method</a:t>
-            </a:r>
-            <a:r>
-              <a:rPr lang="en-US" baseline="0" dirty="0" smtClean="0"/>
-              <a:t>. The default action is assumed to be the first action defined in this file: create.</a:t>
+              <a:t>' local variable or method. The default action is assumed to be the first action defined in this file: create.</a:t>
             </a:r>
           </a:p>
         </p:txBody>
@@ -14990,7 +14985,6 @@
               <a:rPr lang="en-US" baseline="0" dirty="0" smtClean="0"/>
               <a:t>The resource would now be available within any recipe defined in this cookbook or any cookbook that adds this cookbook as a dependency. Here in this example recipe the resources delete and creates apache sites. All three of the resources rely on the site name attribute being tied to the name provided to the resource. The first deletes the welcome site. The next two both rely on the default action of create. The second resource assumes the default site port value.</a:t>
             </a:r>
-            <a:endParaRPr lang="en-US" baseline="0" dirty="0" smtClean="0"/>
           </a:p>
         </p:txBody>
       </p:sp>
@@ -27182,29 +27176,8 @@
             </a:r>
             <a:r>
               <a:rPr lang="en-US" dirty="0" smtClean="0"/>
-              <a:t>name is combined </a:t>
-            </a:r>
-            <a:r>
-              <a:rPr lang="en-US" dirty="0" smtClean="0"/>
-              <a:t>with </a:t>
-            </a:r>
-            <a:r>
-              <a:rPr lang="en-US" dirty="0" smtClean="0"/>
-              <a:t>the </a:t>
-            </a:r>
-            <a:r>
-              <a:rPr lang="en-US" dirty="0" smtClean="0"/>
-              <a:t>file </a:t>
-            </a:r>
-            <a:r>
-              <a:rPr lang="en-US" dirty="0" smtClean="0"/>
-              <a:t>name to create the name of the </a:t>
-            </a:r>
-            <a:r>
-              <a:rPr lang="en-US" dirty="0" smtClean="0"/>
-              <a:t>resource.</a:t>
-            </a:r>
-            <a:endParaRPr lang="en-US" dirty="0" smtClean="0"/>
+              <a:t>name is combined with the file name to create the name of the resource.</a:t>
+            </a:r>
           </a:p>
         </p:txBody>
       </p:sp>
@@ -28798,11 +28771,6 @@
               </a:rPr>
               <a:t>end</a:t>
             </a:r>
-            <a:endParaRPr lang="en-US" sz="2000" b="1" dirty="0">
-              <a:latin typeface="Courier New" charset="0"/>
-              <a:ea typeface="Courier New" charset="0"/>
-              <a:cs typeface="Courier New" charset="0"/>
-            </a:endParaRPr>
           </a:p>
         </p:txBody>
       </p:sp>
@@ -29293,11 +29261,7 @@
             </a:r>
             <a:r>
               <a:rPr lang="en-US" dirty="0" smtClean="0"/>
-              <a:t>0.7.12 </a:t>
-            </a:r>
-            <a:r>
-              <a:rPr lang="en-US" dirty="0" smtClean="0"/>
-              <a:t>version of Chef</a:t>
+              <a:t>0.7.12 version of Chef</a:t>
             </a:r>
           </a:p>
           <a:p>
@@ -31497,11 +31461,6 @@
               </a:rPr>
               <a:t>end</a:t>
             </a:r>
-            <a:endParaRPr lang="en-US" sz="2000" b="1" dirty="0">
-              <a:latin typeface="Courier New" charset="0"/>
-              <a:ea typeface="Courier New" charset="0"/>
-              <a:cs typeface="Courier New" charset="0"/>
-            </a:endParaRPr>
           </a:p>
         </p:txBody>
       </p:sp>
@@ -31845,11 +31804,7 @@
             </a:r>
             <a:r>
               <a:rPr lang="en-US" dirty="0" smtClean="0"/>
-              <a:t>12.5.0 </a:t>
-            </a:r>
-            <a:r>
-              <a:rPr lang="en-US" dirty="0" smtClean="0"/>
-              <a:t>version of Chef</a:t>
+              <a:t>12.5.0 version of Chef</a:t>
             </a:r>
           </a:p>
           <a:p>
@@ -31859,11 +31814,7 @@
             </a:pPr>
             <a:r>
               <a:rPr lang="en-US" dirty="0" smtClean="0"/>
-              <a:t>Allows for a real resource definition without understanding Ruby (vs. HWRP</a:t>
-            </a:r>
-            <a:r>
-              <a:rPr lang="en-US" dirty="0" smtClean="0"/>
-              <a:t>)</a:t>
+              <a:t>Allows for a real resource definition without understanding Ruby (vs. HWRP)</a:t>
             </a:r>
           </a:p>
           <a:p>
@@ -31888,13 +31839,8 @@
             </a:pPr>
             <a:r>
               <a:rPr lang="en-US" dirty="0" smtClean="0"/>
-              <a:t>Custom resource implementation require learning a new </a:t>
-            </a:r>
-            <a:r>
-              <a:rPr lang="en-US" dirty="0" smtClean="0"/>
-              <a:t>DSL</a:t>
-            </a:r>
-            <a:endParaRPr lang="en-US" dirty="0" smtClean="0"/>
+              <a:t>Custom resource implementation require learning a new DSL</a:t>
+            </a:r>
           </a:p>
         </p:txBody>
       </p:sp>
@@ -32518,15 +32464,15 @@
           <a:p>
             <a:r>
               <a:rPr lang="en-US" dirty="0" smtClean="0"/>
-              <a:t>Given a Chef version prior to </a:t>
+              <a:t>Given a Chef version prior to 12.5.0, which approach would </a:t>
             </a:r>
             <a:r>
               <a:rPr lang="en-US" dirty="0" smtClean="0"/>
-              <a:t>12.5.0, </a:t>
+              <a:t>you </a:t>
             </a:r>
             <a:r>
               <a:rPr lang="en-US" dirty="0" smtClean="0"/>
-              <a:t>which approach would would you choose?</a:t>
+              <a:t>choose?</a:t>
             </a:r>
             <a:endParaRPr lang="en-US" dirty="0"/>
           </a:p>
@@ -32545,6 +32491,13 @@
   <p:transition xmlns:p14="http://schemas.microsoft.com/office/powerpoint/2010/main" spd="med">
     <p:fade/>
   </p:transition>
+  <p:timing>
+    <p:tnLst>
+      <p:par>
+        <p:cTn xmlns:p14="http://schemas.microsoft.com/office/powerpoint/2010/main" id="1" dur="indefinite" restart="never" nodeType="tmRoot"/>
+      </p:par>
+    </p:tnLst>
+  </p:timing>
 </p:sld>
 </file>
 
@@ -32666,6 +32619,13 @@
   <p:transition xmlns:p14="http://schemas.microsoft.com/office/powerpoint/2010/main" spd="med">
     <p:fade/>
   </p:transition>
+  <p:timing>
+    <p:tnLst>
+      <p:par>
+        <p:cTn xmlns:p14="http://schemas.microsoft.com/office/powerpoint/2010/main" id="1" dur="indefinite" restart="never" nodeType="tmRoot"/>
+      </p:par>
+    </p:tnLst>
+  </p:timing>
 </p:sld>
 </file>
 

</xml_diff>